<commit_message>
During writing how to use PyPy as framework
</commit_message>
<xml_diff>
--- a/master/Fundamental Technologies Used in PyPy JIT Compiler.pptx
+++ b/master/Fundamental Technologies Used in PyPy JIT Compiler.pptx
@@ -9,14 +9,24 @@
     <p:sldId id="258" r:id="rId3"/>
     <p:sldId id="260" r:id="rId4"/>
     <p:sldId id="257" r:id="rId5"/>
-    <p:sldId id="261" r:id="rId6"/>
-    <p:sldId id="262" r:id="rId7"/>
-    <p:sldId id="263" r:id="rId8"/>
-    <p:sldId id="264" r:id="rId9"/>
-    <p:sldId id="268" r:id="rId10"/>
-    <p:sldId id="265" r:id="rId11"/>
-    <p:sldId id="266" r:id="rId12"/>
-    <p:sldId id="267" r:id="rId13"/>
+    <p:sldId id="270" r:id="rId6"/>
+    <p:sldId id="261" r:id="rId7"/>
+    <p:sldId id="262" r:id="rId8"/>
+    <p:sldId id="263" r:id="rId9"/>
+    <p:sldId id="264" r:id="rId10"/>
+    <p:sldId id="271" r:id="rId11"/>
+    <p:sldId id="268" r:id="rId12"/>
+    <p:sldId id="269" r:id="rId13"/>
+    <p:sldId id="273" r:id="rId14"/>
+    <p:sldId id="276" r:id="rId15"/>
+    <p:sldId id="277" r:id="rId16"/>
+    <p:sldId id="278" r:id="rId17"/>
+    <p:sldId id="275" r:id="rId18"/>
+    <p:sldId id="274" r:id="rId19"/>
+    <p:sldId id="272" r:id="rId20"/>
+    <p:sldId id="265" r:id="rId21"/>
+    <p:sldId id="266" r:id="rId22"/>
+    <p:sldId id="267" r:id="rId23"/>
   </p:sldIdLst>
   <p:sldSz cx="9144000" cy="6858000" type="screen4x3"/>
   <p:notesSz cx="6858000" cy="9144000"/>
@@ -300,7 +310,7 @@
             <a:fld id="{1A7682F5-8C93-4132-B79A-93E5F4AEEA23}" type="datetimeFigureOut">
               <a:rPr kumimoji="1" lang="ja-JP" altLang="en-US" smtClean="0"/>
               <a:pPr/>
-              <a:t>2012/9/9</a:t>
+              <a:t>12/09/09</a:t>
             </a:fld>
             <a:endParaRPr kumimoji="1" lang="ja-JP" altLang="en-US"/>
           </a:p>
@@ -343,7 +353,7 @@
             <a:fld id="{E1CBB85E-0FC7-4529-81C2-ADA4CDAB7C87}" type="slidenum">
               <a:rPr kumimoji="1" lang="ja-JP" altLang="en-US" smtClean="0"/>
               <a:pPr/>
-              <a:t>&lt;#&gt;</a:t>
+              <a:t>‹#›</a:t>
             </a:fld>
             <a:endParaRPr kumimoji="1" lang="ja-JP" altLang="en-US"/>
           </a:p>
@@ -499,7 +509,7 @@
             <a:fld id="{1A7682F5-8C93-4132-B79A-93E5F4AEEA23}" type="datetimeFigureOut">
               <a:rPr kumimoji="1" lang="ja-JP" altLang="en-US" smtClean="0"/>
               <a:pPr/>
-              <a:t>2012/9/9</a:t>
+              <a:t>12/09/09</a:t>
             </a:fld>
             <a:endParaRPr kumimoji="1" lang="ja-JP" altLang="en-US"/>
           </a:p>
@@ -542,7 +552,7 @@
             <a:fld id="{E1CBB85E-0FC7-4529-81C2-ADA4CDAB7C87}" type="slidenum">
               <a:rPr kumimoji="1" lang="ja-JP" altLang="en-US" smtClean="0"/>
               <a:pPr/>
-              <a:t>&lt;#&gt;</a:t>
+              <a:t>‹#›</a:t>
             </a:fld>
             <a:endParaRPr kumimoji="1" lang="ja-JP" altLang="en-US"/>
           </a:p>
@@ -708,7 +718,7 @@
             <a:fld id="{1A7682F5-8C93-4132-B79A-93E5F4AEEA23}" type="datetimeFigureOut">
               <a:rPr kumimoji="1" lang="ja-JP" altLang="en-US" smtClean="0"/>
               <a:pPr/>
-              <a:t>2012/9/9</a:t>
+              <a:t>12/09/09</a:t>
             </a:fld>
             <a:endParaRPr kumimoji="1" lang="ja-JP" altLang="en-US"/>
           </a:p>
@@ -751,7 +761,7 @@
             <a:fld id="{E1CBB85E-0FC7-4529-81C2-ADA4CDAB7C87}" type="slidenum">
               <a:rPr kumimoji="1" lang="ja-JP" altLang="en-US" smtClean="0"/>
               <a:pPr/>
-              <a:t>&lt;#&gt;</a:t>
+              <a:t>‹#›</a:t>
             </a:fld>
             <a:endParaRPr kumimoji="1" lang="ja-JP" altLang="en-US"/>
           </a:p>
@@ -907,7 +917,7 @@
             <a:fld id="{1A7682F5-8C93-4132-B79A-93E5F4AEEA23}" type="datetimeFigureOut">
               <a:rPr kumimoji="1" lang="ja-JP" altLang="en-US" smtClean="0"/>
               <a:pPr/>
-              <a:t>2012/9/9</a:t>
+              <a:t>12/09/09</a:t>
             </a:fld>
             <a:endParaRPr kumimoji="1" lang="ja-JP" altLang="en-US"/>
           </a:p>
@@ -950,7 +960,7 @@
             <a:fld id="{E1CBB85E-0FC7-4529-81C2-ADA4CDAB7C87}" type="slidenum">
               <a:rPr kumimoji="1" lang="ja-JP" altLang="en-US" smtClean="0"/>
               <a:pPr/>
-              <a:t>&lt;#&gt;</a:t>
+              <a:t>‹#›</a:t>
             </a:fld>
             <a:endParaRPr kumimoji="1" lang="ja-JP" altLang="en-US"/>
           </a:p>
@@ -1150,7 +1160,7 @@
             <a:fld id="{1A7682F5-8C93-4132-B79A-93E5F4AEEA23}" type="datetimeFigureOut">
               <a:rPr kumimoji="1" lang="ja-JP" altLang="en-US" smtClean="0"/>
               <a:pPr/>
-              <a:t>2012/9/9</a:t>
+              <a:t>12/09/09</a:t>
             </a:fld>
             <a:endParaRPr kumimoji="1" lang="ja-JP" altLang="en-US"/>
           </a:p>
@@ -1193,7 +1203,7 @@
             <a:fld id="{E1CBB85E-0FC7-4529-81C2-ADA4CDAB7C87}" type="slidenum">
               <a:rPr kumimoji="1" lang="ja-JP" altLang="en-US" smtClean="0"/>
               <a:pPr/>
-              <a:t>&lt;#&gt;</a:t>
+              <a:t>‹#›</a:t>
             </a:fld>
             <a:endParaRPr kumimoji="1" lang="ja-JP" altLang="en-US"/>
           </a:p>
@@ -1499,7 +1509,7 @@
             <a:fld id="{1A7682F5-8C93-4132-B79A-93E5F4AEEA23}" type="datetimeFigureOut">
               <a:rPr kumimoji="1" lang="ja-JP" altLang="en-US" smtClean="0"/>
               <a:pPr/>
-              <a:t>2012/9/9</a:t>
+              <a:t>12/09/09</a:t>
             </a:fld>
             <a:endParaRPr kumimoji="1" lang="ja-JP" altLang="en-US"/>
           </a:p>
@@ -1542,7 +1552,7 @@
             <a:fld id="{E1CBB85E-0FC7-4529-81C2-ADA4CDAB7C87}" type="slidenum">
               <a:rPr kumimoji="1" lang="ja-JP" altLang="en-US" smtClean="0"/>
               <a:pPr/>
-              <a:t>&lt;#&gt;</a:t>
+              <a:t>‹#›</a:t>
             </a:fld>
             <a:endParaRPr kumimoji="1" lang="ja-JP" altLang="en-US"/>
           </a:p>
@@ -1982,7 +1992,7 @@
             <a:fld id="{1A7682F5-8C93-4132-B79A-93E5F4AEEA23}" type="datetimeFigureOut">
               <a:rPr kumimoji="1" lang="ja-JP" altLang="en-US" smtClean="0"/>
               <a:pPr/>
-              <a:t>2012/9/9</a:t>
+              <a:t>12/09/09</a:t>
             </a:fld>
             <a:endParaRPr kumimoji="1" lang="ja-JP" altLang="en-US"/>
           </a:p>
@@ -2025,7 +2035,7 @@
             <a:fld id="{E1CBB85E-0FC7-4529-81C2-ADA4CDAB7C87}" type="slidenum">
               <a:rPr kumimoji="1" lang="ja-JP" altLang="en-US" smtClean="0"/>
               <a:pPr/>
-              <a:t>&lt;#&gt;</a:t>
+              <a:t>‹#›</a:t>
             </a:fld>
             <a:endParaRPr kumimoji="1" lang="ja-JP" altLang="en-US"/>
           </a:p>
@@ -2097,7 +2107,7 @@
             <a:fld id="{1A7682F5-8C93-4132-B79A-93E5F4AEEA23}" type="datetimeFigureOut">
               <a:rPr kumimoji="1" lang="ja-JP" altLang="en-US" smtClean="0"/>
               <a:pPr/>
-              <a:t>2012/9/9</a:t>
+              <a:t>12/09/09</a:t>
             </a:fld>
             <a:endParaRPr kumimoji="1" lang="ja-JP" altLang="en-US"/>
           </a:p>
@@ -2140,7 +2150,7 @@
             <a:fld id="{E1CBB85E-0FC7-4529-81C2-ADA4CDAB7C87}" type="slidenum">
               <a:rPr kumimoji="1" lang="ja-JP" altLang="en-US" smtClean="0"/>
               <a:pPr/>
-              <a:t>&lt;#&gt;</a:t>
+              <a:t>‹#›</a:t>
             </a:fld>
             <a:endParaRPr kumimoji="1" lang="ja-JP" altLang="en-US"/>
           </a:p>
@@ -2189,7 +2199,7 @@
             <a:fld id="{1A7682F5-8C93-4132-B79A-93E5F4AEEA23}" type="datetimeFigureOut">
               <a:rPr kumimoji="1" lang="ja-JP" altLang="en-US" smtClean="0"/>
               <a:pPr/>
-              <a:t>2012/9/9</a:t>
+              <a:t>12/09/09</a:t>
             </a:fld>
             <a:endParaRPr kumimoji="1" lang="ja-JP" altLang="en-US"/>
           </a:p>
@@ -2232,7 +2242,7 @@
             <a:fld id="{E1CBB85E-0FC7-4529-81C2-ADA4CDAB7C87}" type="slidenum">
               <a:rPr kumimoji="1" lang="ja-JP" altLang="en-US" smtClean="0"/>
               <a:pPr/>
-              <a:t>&lt;#&gt;</a:t>
+              <a:t>‹#›</a:t>
             </a:fld>
             <a:endParaRPr kumimoji="1" lang="ja-JP" altLang="en-US"/>
           </a:p>
@@ -2495,7 +2505,7 @@
             <a:fld id="{1A7682F5-8C93-4132-B79A-93E5F4AEEA23}" type="datetimeFigureOut">
               <a:rPr kumimoji="1" lang="ja-JP" altLang="en-US" smtClean="0"/>
               <a:pPr/>
-              <a:t>2012/9/9</a:t>
+              <a:t>12/09/09</a:t>
             </a:fld>
             <a:endParaRPr kumimoji="1" lang="ja-JP" altLang="en-US"/>
           </a:p>
@@ -2538,7 +2548,7 @@
             <a:fld id="{E1CBB85E-0FC7-4529-81C2-ADA4CDAB7C87}" type="slidenum">
               <a:rPr kumimoji="1" lang="ja-JP" altLang="en-US" smtClean="0"/>
               <a:pPr/>
-              <a:t>&lt;#&gt;</a:t>
+              <a:t>‹#›</a:t>
             </a:fld>
             <a:endParaRPr kumimoji="1" lang="ja-JP" altLang="en-US"/>
           </a:p>
@@ -2745,7 +2755,7 @@
             <a:fld id="{1A7682F5-8C93-4132-B79A-93E5F4AEEA23}" type="datetimeFigureOut">
               <a:rPr kumimoji="1" lang="ja-JP" altLang="en-US" smtClean="0"/>
               <a:pPr/>
-              <a:t>2012/9/9</a:t>
+              <a:t>12/09/09</a:t>
             </a:fld>
             <a:endParaRPr kumimoji="1" lang="ja-JP" altLang="en-US"/>
           </a:p>
@@ -2788,7 +2798,7 @@
             <a:fld id="{E1CBB85E-0FC7-4529-81C2-ADA4CDAB7C87}" type="slidenum">
               <a:rPr kumimoji="1" lang="ja-JP" altLang="en-US" smtClean="0"/>
               <a:pPr/>
-              <a:t>&lt;#&gt;</a:t>
+              <a:t>‹#›</a:t>
             </a:fld>
             <a:endParaRPr kumimoji="1" lang="ja-JP" altLang="en-US"/>
           </a:p>
@@ -2987,7 +2997,7 @@
             <a:fld id="{1A7682F5-8C93-4132-B79A-93E5F4AEEA23}" type="datetimeFigureOut">
               <a:rPr kumimoji="1" lang="ja-JP" altLang="en-US" smtClean="0"/>
               <a:pPr/>
-              <a:t>2012/9/9</a:t>
+              <a:t>12/09/09</a:t>
             </a:fld>
             <a:endParaRPr kumimoji="1" lang="ja-JP" altLang="en-US"/>
           </a:p>
@@ -3066,7 +3076,7 @@
             <a:fld id="{E1CBB85E-0FC7-4529-81C2-ADA4CDAB7C87}" type="slidenum">
               <a:rPr kumimoji="1" lang="ja-JP" altLang="en-US" smtClean="0"/>
               <a:pPr/>
-              <a:t>&lt;#&gt;</a:t>
+              <a:t>‹#›</a:t>
             </a:fld>
             <a:endParaRPr kumimoji="1" lang="ja-JP" altLang="en-US"/>
           </a:p>
@@ -3440,7 +3450,7 @@
   <p:timing>
     <p:tnLst>
       <p:par>
-        <p:cTn id="1" dur="indefinite" restart="never" nodeType="tmRoot"/>
+        <p:cTn xmlns:p14="http://schemas.microsoft.com/office/powerpoint/2010/main" id="1" dur="indefinite" restart="never" nodeType="tmRoot"/>
       </p:par>
     </p:tnLst>
   </p:timing>
@@ -3474,14 +3484,23 @@
             <p:ph type="title"/>
           </p:nvPr>
         </p:nvSpPr>
-        <p:spPr/>
+        <p:spPr>
+          <a:xfrm>
+            <a:off x="457200" y="-243408"/>
+            <a:ext cx="8229600" cy="1143000"/>
+          </a:xfrm>
+        </p:spPr>
         <p:txBody>
           <a:bodyPr/>
           <a:lstStyle/>
           <a:p>
             <a:r>
               <a:rPr kumimoji="1" lang="en-US" altLang="ja-JP" dirty="0" smtClean="0"/>
-              <a:t>Templates</a:t>
+              <a:t>Python implemented by </a:t>
+            </a:r>
+            <a:r>
+              <a:rPr kumimoji="1" lang="en-US" altLang="ja-JP" dirty="0" err="1" smtClean="0"/>
+              <a:t>RPython</a:t>
             </a:r>
             <a:endParaRPr kumimoji="1" lang="ja-JP" altLang="en-US" dirty="0"/>
           </a:p>
@@ -3489,24 +3508,136 @@
       </p:sp>
       <p:sp>
         <p:nvSpPr>
-          <p:cNvPr id="5" name="正方形/長方形 4"/>
+          <p:cNvPr id="4" name="円/楕円 3"/>
           <p:cNvSpPr/>
           <p:nvPr/>
         </p:nvSpPr>
         <p:spPr>
           <a:xfrm>
-            <a:off x="323528" y="1412776"/>
-            <a:ext cx="4032448" cy="1728192"/>
+            <a:off x="1074672" y="966738"/>
+            <a:ext cx="576064" cy="576064"/>
+          </a:xfrm>
+          <a:prstGeom prst="ellipse">
+            <a:avLst/>
+          </a:prstGeom>
+        </p:spPr>
+        <p:style>
+          <a:lnRef idx="2">
+            <a:schemeClr val="dk1"/>
+          </a:lnRef>
+          <a:fillRef idx="1">
+            <a:schemeClr val="lt1"/>
+          </a:fillRef>
+          <a:effectRef idx="0">
+            <a:schemeClr val="dk1"/>
+          </a:effectRef>
+          <a:fontRef idx="minor">
+            <a:schemeClr val="dk1"/>
+          </a:fontRef>
+        </p:style>
+        <p:txBody>
+          <a:bodyPr rtlCol="0" anchor="ctr"/>
+          <a:lstStyle/>
+          <a:p>
+            <a:pPr algn="ctr"/>
+            <a:endParaRPr kumimoji="1" lang="ja-JP" altLang="en-US"/>
+          </a:p>
+        </p:txBody>
+      </p:sp>
+      <p:sp>
+        <p:nvSpPr>
+          <p:cNvPr id="5" name="フローチャート: 手作業 4"/>
+          <p:cNvSpPr/>
+          <p:nvPr/>
+        </p:nvSpPr>
+        <p:spPr>
+          <a:xfrm flipV="1">
+            <a:off x="1043608" y="1542802"/>
+            <a:ext cx="648072" cy="648072"/>
+          </a:xfrm>
+          <a:prstGeom prst="flowChartManualOperation">
+            <a:avLst/>
+          </a:prstGeom>
+        </p:spPr>
+        <p:style>
+          <a:lnRef idx="2">
+            <a:schemeClr val="dk1"/>
+          </a:lnRef>
+          <a:fillRef idx="1">
+            <a:schemeClr val="lt1"/>
+          </a:fillRef>
+          <a:effectRef idx="0">
+            <a:schemeClr val="dk1"/>
+          </a:effectRef>
+          <a:fontRef idx="minor">
+            <a:schemeClr val="dk1"/>
+          </a:fontRef>
+        </p:style>
+        <p:txBody>
+          <a:bodyPr rtlCol="0" anchor="ctr"/>
+          <a:lstStyle/>
+          <a:p>
+            <a:pPr algn="ctr"/>
+            <a:endParaRPr kumimoji="1" lang="ja-JP" altLang="en-US"/>
+          </a:p>
+        </p:txBody>
+      </p:sp>
+      <p:sp>
+        <p:nvSpPr>
+          <p:cNvPr id="6" name="テキスト ボックス 5"/>
+          <p:cNvSpPr txBox="1"/>
+          <p:nvPr/>
+        </p:nvSpPr>
+        <p:spPr>
+          <a:xfrm>
+            <a:off x="539552" y="2190874"/>
+            <a:ext cx="1848326" cy="830997"/>
           </a:xfrm>
           <a:prstGeom prst="rect">
             <a:avLst/>
           </a:prstGeom>
-          <a:solidFill>
-            <a:schemeClr val="accent5">
-              <a:lumMod val="20000"/>
-              <a:lumOff val="80000"/>
-            </a:schemeClr>
-          </a:solidFill>
+          <a:noFill/>
+        </p:spPr>
+        <p:txBody>
+          <a:bodyPr wrap="none" rtlCol="0">
+            <a:spAutoFit/>
+          </a:bodyPr>
+          <a:lstStyle/>
+          <a:p>
+            <a:pPr algn="ctr"/>
+            <a:r>
+              <a:rPr kumimoji="1" lang="en-US" altLang="ja-JP" sz="2400" b="1" dirty="0" smtClean="0">
+                <a:solidFill>
+                  <a:srgbClr val="FF0000"/>
+                </a:solidFill>
+              </a:rPr>
+              <a:t>Python</a:t>
+            </a:r>
+          </a:p>
+          <a:p>
+            <a:pPr algn="ctr"/>
+            <a:r>
+              <a:rPr kumimoji="1" lang="en-US" altLang="ja-JP" sz="2400" b="1" dirty="0" smtClean="0"/>
+              <a:t>Implementer</a:t>
+            </a:r>
+            <a:endParaRPr kumimoji="1" lang="ja-JP" altLang="en-US" sz="2400" b="1" dirty="0"/>
+          </a:p>
+        </p:txBody>
+      </p:sp>
+      <p:sp>
+        <p:nvSpPr>
+          <p:cNvPr id="7" name="直角三角形 6"/>
+          <p:cNvSpPr/>
+          <p:nvPr/>
+        </p:nvSpPr>
+        <p:spPr>
+          <a:xfrm rot="13500000">
+            <a:off x="1896719" y="1319412"/>
+            <a:ext cx="654689" cy="647451"/>
+          </a:xfrm>
+          <a:prstGeom prst="rtTriangle">
+            <a:avLst/>
+          </a:prstGeom>
         </p:spPr>
         <p:style>
           <a:lnRef idx="1">
@@ -3531,18 +3662,101 @@
           </a:p>
         </p:txBody>
       </p:sp>
-      <p:sp>
-        <p:nvSpPr>
-          <p:cNvPr id="4" name="テキスト ボックス 3"/>
-          <p:cNvSpPr txBox="1"/>
+      <p:pic>
+        <p:nvPicPr>
+          <p:cNvPr id="8" name="Picture 2" descr="http://adammiels.com/images/codeIcon.jpg"/>
+          <p:cNvPicPr>
+            <a:picLocks noChangeAspect="1" noChangeArrowheads="1"/>
+          </p:cNvPicPr>
           <p:nvPr/>
-        </p:nvSpPr>
-        <p:spPr>
-          <a:xfrm>
-            <a:off x="323528" y="1412776"/>
-            <a:ext cx="1951225" cy="707886"/>
+        </p:nvPicPr>
+        <p:blipFill>
+          <a:blip r:embed="rId2" cstate="print"/>
+          <a:srcRect/>
+          <a:stretch>
+            <a:fillRect/>
+          </a:stretch>
+        </p:blipFill>
+        <p:spPr bwMode="auto">
+          <a:xfrm>
+            <a:off x="2915816" y="966738"/>
+            <a:ext cx="1386249" cy="1296144"/>
           </a:xfrm>
           <a:prstGeom prst="rect">
+            <a:avLst/>
+          </a:prstGeom>
+          <a:noFill/>
+        </p:spPr>
+      </p:pic>
+      <p:sp>
+        <p:nvSpPr>
+          <p:cNvPr id="9" name="正方形/長方形 8"/>
+          <p:cNvSpPr/>
+          <p:nvPr/>
+        </p:nvSpPr>
+        <p:spPr>
+          <a:xfrm>
+            <a:off x="2316223" y="2262882"/>
+            <a:ext cx="2634825" cy="830997"/>
+          </a:xfrm>
+          <a:prstGeom prst="rect">
+            <a:avLst/>
+          </a:prstGeom>
+        </p:spPr>
+        <p:txBody>
+          <a:bodyPr wrap="none">
+            <a:spAutoFit/>
+          </a:bodyPr>
+          <a:lstStyle/>
+          <a:p>
+            <a:pPr algn="ctr"/>
+            <a:r>
+              <a:rPr lang="en-US" altLang="ja-JP" sz="2400" b="1" dirty="0" smtClean="0">
+                <a:solidFill>
+                  <a:srgbClr val="FF0000"/>
+                </a:solidFill>
+              </a:rPr>
+              <a:t>Python</a:t>
+            </a:r>
+            <a:r>
+              <a:rPr lang="en-US" altLang="ja-JP" sz="2400" b="1" dirty="0" smtClean="0"/>
+              <a:t> code</a:t>
+            </a:r>
+          </a:p>
+          <a:p>
+            <a:pPr algn="ctr"/>
+            <a:r>
+              <a:rPr lang="en-US" altLang="ja-JP" sz="2400" b="1" dirty="0" smtClean="0"/>
+              <a:t>Written in </a:t>
+            </a:r>
+            <a:r>
+              <a:rPr lang="en-US" altLang="ja-JP" sz="2400" b="1" dirty="0" err="1" smtClean="0">
+                <a:solidFill>
+                  <a:srgbClr val="FF0000"/>
+                </a:solidFill>
+              </a:rPr>
+              <a:t>RPython</a:t>
+            </a:r>
+            <a:endParaRPr lang="ja-JP" altLang="en-US" sz="2400" b="1" dirty="0">
+              <a:solidFill>
+                <a:srgbClr val="FF0000"/>
+              </a:solidFill>
+            </a:endParaRPr>
+          </a:p>
+        </p:txBody>
+      </p:sp>
+      <p:sp>
+        <p:nvSpPr>
+          <p:cNvPr id="10" name="直角三角形 9"/>
+          <p:cNvSpPr/>
+          <p:nvPr/>
+        </p:nvSpPr>
+        <p:spPr>
+          <a:xfrm rot="13500000">
+            <a:off x="4272983" y="1319413"/>
+            <a:ext cx="654689" cy="647451"/>
+          </a:xfrm>
+          <a:prstGeom prst="rtTriangle">
             <a:avLst/>
           </a:prstGeom>
         </p:spPr>
@@ -3561,39 +3775,140 @@
           </a:fontRef>
         </p:style>
         <p:txBody>
-          <a:bodyPr wrap="none" rtlCol="0">
-            <a:spAutoFit/>
-          </a:bodyPr>
-          <a:lstStyle/>
-          <a:p>
-            <a:r>
-              <a:rPr kumimoji="1" lang="en-US" altLang="ja-JP" sz="4000" dirty="0" smtClean="0"/>
-              <a:t>Problem</a:t>
-            </a:r>
-            <a:endParaRPr kumimoji="1" lang="ja-JP" altLang="en-US" sz="4000" dirty="0"/>
-          </a:p>
-        </p:txBody>
-      </p:sp>
-      <p:sp>
-        <p:nvSpPr>
-          <p:cNvPr id="6" name="正方形/長方形 5"/>
-          <p:cNvSpPr/>
+          <a:bodyPr rtlCol="0" anchor="ctr"/>
+          <a:lstStyle/>
+          <a:p>
+            <a:pPr algn="ctr"/>
+            <a:endParaRPr kumimoji="1" lang="ja-JP" altLang="en-US"/>
+          </a:p>
+        </p:txBody>
+      </p:sp>
+      <p:pic>
+        <p:nvPicPr>
+          <p:cNvPr id="11" name="Picture 4" descr="http://2.bp.blogspot.com/_4gR6Ggu8oHQ/TNmLArIQa0I/AAAAAAAAAKk/S86e8w4lF6g/s400/pypy.png"/>
+          <p:cNvPicPr>
+            <a:picLocks noChangeAspect="1" noChangeArrowheads="1"/>
+          </p:cNvPicPr>
           <p:nvPr/>
-        </p:nvSpPr>
-        <p:spPr>
-          <a:xfrm>
-            <a:off x="4644008" y="1412776"/>
-            <a:ext cx="4032448" cy="1728192"/>
+        </p:nvPicPr>
+        <p:blipFill>
+          <a:blip r:embed="rId3" cstate="print"/>
+          <a:srcRect/>
+          <a:stretch>
+            <a:fillRect/>
+          </a:stretch>
+        </p:blipFill>
+        <p:spPr bwMode="auto">
+          <a:xfrm>
+            <a:off x="5220072" y="1182762"/>
+            <a:ext cx="1318321" cy="1080120"/>
           </a:xfrm>
           <a:prstGeom prst="rect">
             <a:avLst/>
           </a:prstGeom>
-          <a:solidFill>
-            <a:schemeClr val="accent3">
-              <a:lumMod val="20000"/>
-              <a:lumOff val="80000"/>
-            </a:schemeClr>
-          </a:solidFill>
+          <a:noFill/>
+        </p:spPr>
+      </p:pic>
+      <p:sp>
+        <p:nvSpPr>
+          <p:cNvPr id="12" name="正方形/長方形 11"/>
+          <p:cNvSpPr/>
+          <p:nvPr/>
+        </p:nvSpPr>
+        <p:spPr>
+          <a:xfrm>
+            <a:off x="5363089" y="2262882"/>
+            <a:ext cx="1014638" cy="584775"/>
+          </a:xfrm>
+          <a:prstGeom prst="rect">
+            <a:avLst/>
+          </a:prstGeom>
+        </p:spPr>
+        <p:txBody>
+          <a:bodyPr wrap="none">
+            <a:spAutoFit/>
+          </a:bodyPr>
+          <a:lstStyle/>
+          <a:p>
+            <a:pPr algn="ctr"/>
+            <a:r>
+              <a:rPr lang="en-US" altLang="ja-JP" sz="3200" b="1" dirty="0" err="1" smtClean="0"/>
+              <a:t>PyPy</a:t>
+            </a:r>
+            <a:endParaRPr lang="ja-JP" altLang="en-US" sz="3200" b="1" dirty="0"/>
+          </a:p>
+        </p:txBody>
+      </p:sp>
+      <p:pic>
+        <p:nvPicPr>
+          <p:cNvPr id="14" name="Picture 6" descr="http://icons.iconseeker.com/png/fullsize/glaze/source-c.png"/>
+          <p:cNvPicPr>
+            <a:picLocks noChangeAspect="1" noChangeArrowheads="1"/>
+          </p:cNvPicPr>
+          <p:nvPr/>
+        </p:nvPicPr>
+        <p:blipFill>
+          <a:blip r:embed="rId4" cstate="print"/>
+          <a:srcRect/>
+          <a:stretch>
+            <a:fillRect/>
+          </a:stretch>
+        </p:blipFill>
+        <p:spPr bwMode="auto">
+          <a:xfrm>
+            <a:off x="7164288" y="1110754"/>
+            <a:ext cx="1080119" cy="1080120"/>
+          </a:xfrm>
+          <a:prstGeom prst="rect">
+            <a:avLst/>
+          </a:prstGeom>
+          <a:noFill/>
+        </p:spPr>
+      </p:pic>
+      <p:sp>
+        <p:nvSpPr>
+          <p:cNvPr id="19" name="正方形/長方形 18"/>
+          <p:cNvSpPr/>
+          <p:nvPr/>
+        </p:nvSpPr>
+        <p:spPr>
+          <a:xfrm>
+            <a:off x="6876256" y="2118866"/>
+            <a:ext cx="1810560" cy="584775"/>
+          </a:xfrm>
+          <a:prstGeom prst="rect">
+            <a:avLst/>
+          </a:prstGeom>
+        </p:spPr>
+        <p:txBody>
+          <a:bodyPr wrap="none">
+            <a:spAutoFit/>
+          </a:bodyPr>
+          <a:lstStyle/>
+          <a:p>
+            <a:pPr algn="ctr"/>
+            <a:r>
+              <a:rPr lang="en-US" altLang="ja-JP" sz="3200" b="1" dirty="0" smtClean="0"/>
+              <a:t>C (native)</a:t>
+            </a:r>
+            <a:endParaRPr lang="ja-JP" altLang="en-US" sz="3200" b="1" dirty="0"/>
+          </a:p>
+        </p:txBody>
+      </p:sp>
+      <p:sp>
+        <p:nvSpPr>
+          <p:cNvPr id="22" name="直角三角形 21"/>
+          <p:cNvSpPr/>
+          <p:nvPr/>
+        </p:nvSpPr>
+        <p:spPr>
+          <a:xfrm rot="13500000">
+            <a:off x="6289206" y="1391419"/>
+            <a:ext cx="654689" cy="647451"/>
+          </a:xfrm>
+          <a:prstGeom prst="rtTriangle">
+            <a:avLst/>
+          </a:prstGeom>
         </p:spPr>
         <p:style>
           <a:lnRef idx="1">
@@ -3620,33 +3935,61 @@
       </p:sp>
       <p:sp>
         <p:nvSpPr>
-          <p:cNvPr id="7" name="テキスト ボックス 6"/>
+          <p:cNvPr id="23" name="四角形吹き出し 22"/>
+          <p:cNvSpPr/>
+          <p:nvPr/>
+        </p:nvSpPr>
+        <p:spPr>
+          <a:xfrm>
+            <a:off x="683568" y="3126978"/>
+            <a:ext cx="7848872" cy="3542382"/>
+          </a:xfrm>
+          <a:prstGeom prst="wedgeRectCallout">
+            <a:avLst>
+              <a:gd name="adj1" fmla="val 34635"/>
+              <a:gd name="adj2" fmla="val -65298"/>
+            </a:avLst>
+          </a:prstGeom>
+        </p:spPr>
+        <p:style>
+          <a:lnRef idx="2">
+            <a:schemeClr val="accent1"/>
+          </a:lnRef>
+          <a:fillRef idx="1">
+            <a:schemeClr val="lt1"/>
+          </a:fillRef>
+          <a:effectRef idx="0">
+            <a:schemeClr val="accent1"/>
+          </a:effectRef>
+          <a:fontRef idx="minor">
+            <a:schemeClr val="dk1"/>
+          </a:fontRef>
+        </p:style>
+        <p:txBody>
+          <a:bodyPr rtlCol="0" anchor="ctr"/>
+          <a:lstStyle/>
+          <a:p>
+            <a:pPr algn="ctr"/>
+            <a:endParaRPr kumimoji="1" lang="ja-JP" altLang="en-US"/>
+          </a:p>
+        </p:txBody>
+      </p:sp>
+      <p:sp>
+        <p:nvSpPr>
+          <p:cNvPr id="24" name="テキスト ボックス 23"/>
           <p:cNvSpPr txBox="1"/>
           <p:nvPr/>
         </p:nvSpPr>
         <p:spPr>
           <a:xfrm>
-            <a:off x="4644008" y="1412776"/>
-            <a:ext cx="1951225" cy="707886"/>
+            <a:off x="1763688" y="3019599"/>
+            <a:ext cx="5798447" cy="769441"/>
           </a:xfrm>
           <a:prstGeom prst="rect">
             <a:avLst/>
           </a:prstGeom>
-        </p:spPr>
-        <p:style>
-          <a:lnRef idx="1">
-            <a:schemeClr val="accent3"/>
-          </a:lnRef>
-          <a:fillRef idx="3">
-            <a:schemeClr val="accent3"/>
-          </a:fillRef>
-          <a:effectRef idx="2">
-            <a:schemeClr val="accent3"/>
-          </a:effectRef>
-          <a:fontRef idx="minor">
-            <a:schemeClr val="lt1"/>
-          </a:fontRef>
-        </p:style>
+          <a:noFill/>
+        </p:spPr>
         <p:txBody>
           <a:bodyPr wrap="none" rtlCol="0">
             <a:spAutoFit/>
@@ -3654,171 +3997,107 @@
           <a:lstStyle/>
           <a:p>
             <a:r>
-              <a:rPr kumimoji="1" lang="en-US" altLang="ja-JP" sz="4000" dirty="0" smtClean="0"/>
-              <a:t>Problem</a:t>
-            </a:r>
-            <a:endParaRPr kumimoji="1" lang="ja-JP" altLang="en-US" sz="4000" dirty="0"/>
-          </a:p>
-        </p:txBody>
-      </p:sp>
-      <p:sp>
-        <p:nvSpPr>
-          <p:cNvPr id="8" name="下矢印 7"/>
-          <p:cNvSpPr/>
+              <a:rPr kumimoji="1" lang="en-US" altLang="ja-JP" sz="4400" dirty="0" smtClean="0"/>
+              <a:t>This is what they know!</a:t>
+            </a:r>
+            <a:endParaRPr kumimoji="1" lang="ja-JP" altLang="en-US" sz="4400" dirty="0"/>
+          </a:p>
+        </p:txBody>
+      </p:sp>
+      <p:grpSp>
+        <p:nvGrpSpPr>
+          <p:cNvPr id="27" name="グループ化 26"/>
+          <p:cNvGrpSpPr/>
           <p:nvPr/>
-        </p:nvSpPr>
-        <p:spPr>
-          <a:xfrm>
-            <a:off x="251520" y="3717032"/>
-            <a:ext cx="4536504" cy="504056"/>
-          </a:xfrm>
-          <a:prstGeom prst="downArrow">
-            <a:avLst/>
-          </a:prstGeom>
-        </p:spPr>
-        <p:style>
-          <a:lnRef idx="1">
-            <a:schemeClr val="dk1"/>
-          </a:lnRef>
-          <a:fillRef idx="3">
-            <a:schemeClr val="dk1"/>
-          </a:fillRef>
-          <a:effectRef idx="2">
-            <a:schemeClr val="dk1"/>
-          </a:effectRef>
-          <a:fontRef idx="minor">
-            <a:schemeClr val="lt1"/>
-          </a:fontRef>
-        </p:style>
-        <p:txBody>
-          <a:bodyPr rtlCol="0" anchor="ctr"/>
-          <a:lstStyle/>
-          <a:p>
-            <a:pPr algn="ctr"/>
-            <a:endParaRPr kumimoji="1" lang="ja-JP" altLang="en-US"/>
-          </a:p>
-        </p:txBody>
-      </p:sp>
-      <p:sp>
-        <p:nvSpPr>
-          <p:cNvPr id="9" name="直角三角形 8"/>
-          <p:cNvSpPr/>
-          <p:nvPr/>
-        </p:nvSpPr>
-        <p:spPr>
-          <a:xfrm rot="13500000">
-            <a:off x="133031" y="4717780"/>
-            <a:ext cx="654689" cy="647451"/>
-          </a:xfrm>
-          <a:prstGeom prst="rtTriangle">
-            <a:avLst/>
-          </a:prstGeom>
-        </p:spPr>
-        <p:style>
-          <a:lnRef idx="1">
-            <a:schemeClr val="accent1"/>
-          </a:lnRef>
-          <a:fillRef idx="3">
-            <a:schemeClr val="accent1"/>
-          </a:fillRef>
-          <a:effectRef idx="2">
-            <a:schemeClr val="accent1"/>
-          </a:effectRef>
-          <a:fontRef idx="minor">
-            <a:schemeClr val="lt1"/>
-          </a:fontRef>
-        </p:style>
-        <p:txBody>
-          <a:bodyPr rtlCol="0" anchor="ctr"/>
-          <a:lstStyle/>
-          <a:p>
-            <a:pPr algn="ctr"/>
-            <a:endParaRPr kumimoji="1" lang="ja-JP" altLang="en-US"/>
-          </a:p>
-        </p:txBody>
-      </p:sp>
-      <p:sp>
-        <p:nvSpPr>
-          <p:cNvPr id="10" name="直角三角形 9"/>
-          <p:cNvSpPr/>
-          <p:nvPr/>
-        </p:nvSpPr>
-        <p:spPr>
-          <a:xfrm rot="13500000">
-            <a:off x="744591" y="4717779"/>
-            <a:ext cx="654689" cy="647451"/>
-          </a:xfrm>
-          <a:prstGeom prst="rtTriangle">
-            <a:avLst/>
-          </a:prstGeom>
-        </p:spPr>
-        <p:style>
-          <a:lnRef idx="1">
-            <a:schemeClr val="accent2"/>
-          </a:lnRef>
-          <a:fillRef idx="3">
-            <a:schemeClr val="accent2"/>
-          </a:fillRef>
-          <a:effectRef idx="2">
-            <a:schemeClr val="accent2"/>
-          </a:effectRef>
-          <a:fontRef idx="minor">
-            <a:schemeClr val="lt1"/>
-          </a:fontRef>
-        </p:style>
-        <p:txBody>
-          <a:bodyPr rtlCol="0" anchor="ctr"/>
-          <a:lstStyle/>
-          <a:p>
-            <a:pPr algn="ctr"/>
-            <a:endParaRPr kumimoji="1" lang="ja-JP" altLang="en-US"/>
-          </a:p>
-        </p:txBody>
-      </p:sp>
-      <p:sp>
-        <p:nvSpPr>
-          <p:cNvPr id="11" name="直角三角形 10"/>
-          <p:cNvSpPr/>
-          <p:nvPr/>
-        </p:nvSpPr>
-        <p:spPr>
-          <a:xfrm rot="13500000">
-            <a:off x="1392665" y="4717779"/>
-            <a:ext cx="654689" cy="647451"/>
-          </a:xfrm>
-          <a:prstGeom prst="rtTriangle">
-            <a:avLst/>
-          </a:prstGeom>
-        </p:spPr>
-        <p:style>
-          <a:lnRef idx="1">
-            <a:schemeClr val="accent3"/>
-          </a:lnRef>
-          <a:fillRef idx="3">
-            <a:schemeClr val="accent3"/>
-          </a:fillRef>
-          <a:effectRef idx="2">
-            <a:schemeClr val="accent3"/>
-          </a:effectRef>
-          <a:fontRef idx="minor">
-            <a:schemeClr val="lt1"/>
-          </a:fontRef>
-        </p:style>
-        <p:txBody>
-          <a:bodyPr rtlCol="0" anchor="ctr"/>
-          <a:lstStyle/>
-          <a:p>
-            <a:pPr algn="ctr"/>
-            <a:endParaRPr kumimoji="1" lang="ja-JP" altLang="en-US"/>
-          </a:p>
-        </p:txBody>
-      </p:sp>
+        </p:nvGrpSpPr>
+        <p:grpSpPr>
+          <a:xfrm>
+            <a:off x="2411760" y="3760328"/>
+            <a:ext cx="4320480" cy="2909032"/>
+            <a:chOff x="2411760" y="3760328"/>
+            <a:chExt cx="4320480" cy="2909032"/>
+          </a:xfrm>
+        </p:grpSpPr>
+        <p:pic>
+          <p:nvPicPr>
+            <p:cNvPr id="1026" name="Picture 2"/>
+            <p:cNvPicPr>
+              <a:picLocks noChangeAspect="1" noChangeArrowheads="1"/>
+            </p:cNvPicPr>
+            <p:nvPr/>
+          </p:nvPicPr>
+          <p:blipFill>
+            <a:blip r:embed="rId5" cstate="print"/>
+            <a:srcRect/>
+            <a:stretch>
+              <a:fillRect/>
+            </a:stretch>
+          </p:blipFill>
+          <p:spPr bwMode="auto">
+            <a:xfrm>
+              <a:off x="2411760" y="3760328"/>
+              <a:ext cx="4320480" cy="2837024"/>
+            </a:xfrm>
+            <a:prstGeom prst="rect">
+              <a:avLst/>
+            </a:prstGeom>
+            <a:ln w="38100" cap="sq">
+              <a:solidFill>
+                <a:srgbClr val="000000"/>
+              </a:solidFill>
+              <a:prstDash val="solid"/>
+              <a:miter lim="800000"/>
+            </a:ln>
+            <a:effectLst>
+              <a:outerShdw blurRad="50800" dist="38100" dir="2700000" algn="tl" rotWithShape="0">
+                <a:srgbClr val="000000">
+                  <a:alpha val="43000"/>
+                </a:srgbClr>
+              </a:outerShdw>
+            </a:effectLst>
+          </p:spPr>
+        </p:pic>
+        <p:sp>
+          <p:nvSpPr>
+            <p:cNvPr id="26" name="円/楕円 25"/>
+            <p:cNvSpPr/>
+            <p:nvPr/>
+          </p:nvSpPr>
+          <p:spPr>
+            <a:xfrm>
+              <a:off x="3059832" y="6309320"/>
+              <a:ext cx="1440160" cy="360040"/>
+            </a:xfrm>
+            <a:prstGeom prst="ellipse">
+              <a:avLst/>
+            </a:prstGeom>
+            <a:noFill/>
+          </p:spPr>
+          <p:style>
+            <a:lnRef idx="2">
+              <a:schemeClr val="accent2"/>
+            </a:lnRef>
+            <a:fillRef idx="1">
+              <a:schemeClr val="lt1"/>
+            </a:fillRef>
+            <a:effectRef idx="0">
+              <a:schemeClr val="accent2"/>
+            </a:effectRef>
+            <a:fontRef idx="minor">
+              <a:schemeClr val="dk1"/>
+            </a:fontRef>
+          </p:style>
+          <p:txBody>
+            <a:bodyPr rtlCol="0" anchor="ctr"/>
+            <a:lstStyle/>
+            <a:p>
+              <a:pPr algn="ctr"/>
+              <a:endParaRPr kumimoji="1" lang="ja-JP" altLang="en-US"/>
+            </a:p>
+          </p:txBody>
+        </p:sp>
+      </p:grpSp>
     </p:spTree>
-    <p:extLst>
-      <p:ext uri="{BB962C8B-B14F-4D97-AF65-F5344CB8AC3E}">
-        <p14:creationId xmlns:p14="http://schemas.microsoft.com/office/powerpoint/2010/main" xmlns="" val="1477573084"/>
-      </p:ext>
-    </p:extLst>
   </p:cSld>
   <p:clrMapOvr>
     <a:masterClrMapping/>
@@ -3858,13 +4137,25 @@
           <a:bodyPr/>
           <a:lstStyle/>
           <a:p>
-            <a:endParaRPr kumimoji="1" lang="ja-JP" altLang="en-US"/>
-          </a:p>
-        </p:txBody>
-      </p:sp>
-      <p:sp>
-        <p:nvSpPr>
-          <p:cNvPr id="3" name="コンテンツ プレースホルダー 2"/>
+            <a:r>
+              <a:rPr kumimoji="1" lang="en-US" altLang="ja-JP" dirty="0" smtClean="0"/>
+              <a:t>What is </a:t>
+            </a:r>
+            <a:r>
+              <a:rPr kumimoji="1" lang="en-US" altLang="ja-JP" dirty="0" err="1" smtClean="0"/>
+              <a:t>RPython</a:t>
+            </a:r>
+            <a:r>
+              <a:rPr kumimoji="1" lang="en-US" altLang="ja-JP" dirty="0" smtClean="0"/>
+              <a:t>?</a:t>
+            </a:r>
+            <a:endParaRPr kumimoji="1" lang="ja-JP" altLang="en-US" dirty="0"/>
+          </a:p>
+        </p:txBody>
+      </p:sp>
+      <p:sp>
+        <p:nvSpPr>
+          <p:cNvPr id="3" name="コンテンツ プレースホルダ 2"/>
           <p:cNvSpPr>
             <a:spLocks noGrp="1"/>
           </p:cNvSpPr>
@@ -3872,21 +4163,285 @@
             <p:ph idx="1"/>
           </p:nvPr>
         </p:nvSpPr>
-        <p:spPr/>
-        <p:txBody>
-          <a:bodyPr/>
-          <a:lstStyle/>
-          <a:p>
-            <a:endParaRPr kumimoji="1" lang="ja-JP" altLang="en-US"/>
+        <p:spPr>
+          <a:xfrm>
+            <a:off x="395536" y="1268760"/>
+            <a:ext cx="8352928" cy="648072"/>
+          </a:xfrm>
+        </p:spPr>
+        <p:txBody>
+          <a:bodyPr>
+            <a:normAutofit fontScale="92500"/>
+          </a:bodyPr>
+          <a:lstStyle/>
+          <a:p>
+            <a:r>
+              <a:rPr kumimoji="1" lang="en-US" altLang="ja-JP" dirty="0" smtClean="0"/>
+              <a:t>It is abbreviated for </a:t>
+            </a:r>
+            <a:r>
+              <a:rPr kumimoji="1" lang="en-US" altLang="ja-JP" b="1" dirty="0" smtClean="0">
+                <a:solidFill>
+                  <a:srgbClr val="FF0000"/>
+                </a:solidFill>
+              </a:rPr>
+              <a:t>R</a:t>
+            </a:r>
+            <a:r>
+              <a:rPr kumimoji="1" lang="en-US" altLang="ja-JP" dirty="0" smtClean="0"/>
+              <a:t>estricted subset </a:t>
+            </a:r>
+            <a:r>
+              <a:rPr lang="en-US" altLang="ja-JP" dirty="0" smtClean="0"/>
+              <a:t>of </a:t>
+            </a:r>
+            <a:r>
+              <a:rPr kumimoji="1" lang="en-US" altLang="ja-JP" b="1" dirty="0" smtClean="0">
+                <a:solidFill>
+                  <a:srgbClr val="FF0000"/>
+                </a:solidFill>
+              </a:rPr>
+              <a:t>Python</a:t>
+            </a:r>
+            <a:endParaRPr kumimoji="1" lang="ja-JP" altLang="en-US" b="1" dirty="0">
+              <a:solidFill>
+                <a:srgbClr val="FF0000"/>
+              </a:solidFill>
+            </a:endParaRPr>
+          </a:p>
+        </p:txBody>
+      </p:sp>
+      <p:sp>
+        <p:nvSpPr>
+          <p:cNvPr id="6" name="テキスト ボックス 5"/>
+          <p:cNvSpPr txBox="1"/>
+          <p:nvPr/>
+        </p:nvSpPr>
+        <p:spPr>
+          <a:xfrm>
+            <a:off x="395536" y="2132856"/>
+            <a:ext cx="8407943" cy="1815882"/>
+          </a:xfrm>
+          <a:prstGeom prst="rect">
+            <a:avLst/>
+          </a:prstGeom>
+        </p:spPr>
+        <p:style>
+          <a:lnRef idx="2">
+            <a:schemeClr val="accent1"/>
+          </a:lnRef>
+          <a:fillRef idx="1">
+            <a:schemeClr val="lt1"/>
+          </a:fillRef>
+          <a:effectRef idx="0">
+            <a:schemeClr val="accent1"/>
+          </a:effectRef>
+          <a:fontRef idx="minor">
+            <a:schemeClr val="dk1"/>
+          </a:fontRef>
+        </p:style>
+        <p:txBody>
+          <a:bodyPr wrap="none" rtlCol="0">
+            <a:spAutoFit/>
+          </a:bodyPr>
+          <a:lstStyle/>
+          <a:p>
+            <a:pPr>
+              <a:buFont typeface="Arial" pitchFamily="34" charset="0"/>
+              <a:buChar char="•"/>
+            </a:pPr>
+            <a:r>
+              <a:rPr lang="en-US" altLang="ja-JP" sz="2800" dirty="0" smtClean="0"/>
+              <a:t> Only single inheritance is allowed</a:t>
+            </a:r>
+          </a:p>
+          <a:p>
+            <a:pPr>
+              <a:buFont typeface="Arial" pitchFamily="34" charset="0"/>
+              <a:buChar char="•"/>
+            </a:pPr>
+            <a:r>
+              <a:rPr kumimoji="1" lang="en-US" altLang="ja-JP" sz="2800" dirty="0" smtClean="0"/>
+              <a:t> “</a:t>
+            </a:r>
+            <a:r>
+              <a:rPr lang="en-US" altLang="ja-JP" sz="2800" dirty="0" smtClean="0"/>
+              <a:t>For loop” only supports built-in type</a:t>
+            </a:r>
+          </a:p>
+          <a:p>
+            <a:pPr>
+              <a:buFont typeface="Arial" pitchFamily="34" charset="0"/>
+              <a:buChar char="•"/>
+            </a:pPr>
+            <a:r>
+              <a:rPr kumimoji="1" lang="en-US" altLang="ja-JP" sz="2800" dirty="0" smtClean="0"/>
+              <a:t> </a:t>
+            </a:r>
+            <a:r>
+              <a:rPr lang="en-US" altLang="ja-JP" sz="2800" dirty="0" smtClean="0"/>
+              <a:t>Generator is supported, but exact scope is  very limited</a:t>
+            </a:r>
+          </a:p>
+          <a:p>
+            <a:pPr>
+              <a:buFont typeface="Arial" pitchFamily="34" charset="0"/>
+              <a:buChar char="•"/>
+            </a:pPr>
+            <a:r>
+              <a:rPr lang="en-US" altLang="ja-JP" sz="2800" dirty="0" smtClean="0"/>
+              <a:t> Dynamic dispatch to class is not supported</a:t>
+            </a:r>
+          </a:p>
+        </p:txBody>
+      </p:sp>
+      <p:sp>
+        <p:nvSpPr>
+          <p:cNvPr id="8" name="下矢印 7"/>
+          <p:cNvSpPr/>
+          <p:nvPr/>
+        </p:nvSpPr>
+        <p:spPr>
+          <a:xfrm>
+            <a:off x="2303748" y="4149080"/>
+            <a:ext cx="4536504" cy="504056"/>
+          </a:xfrm>
+          <a:prstGeom prst="downArrow">
+            <a:avLst/>
+          </a:prstGeom>
+        </p:spPr>
+        <p:style>
+          <a:lnRef idx="1">
+            <a:schemeClr val="dk1"/>
+          </a:lnRef>
+          <a:fillRef idx="3">
+            <a:schemeClr val="dk1"/>
+          </a:fillRef>
+          <a:effectRef idx="2">
+            <a:schemeClr val="dk1"/>
+          </a:effectRef>
+          <a:fontRef idx="minor">
+            <a:schemeClr val="lt1"/>
+          </a:fontRef>
+        </p:style>
+        <p:txBody>
+          <a:bodyPr rtlCol="0" anchor="ctr"/>
+          <a:lstStyle/>
+          <a:p>
+            <a:pPr algn="ctr"/>
+            <a:endParaRPr kumimoji="1" lang="ja-JP" altLang="en-US"/>
+          </a:p>
+        </p:txBody>
+      </p:sp>
+      <p:sp>
+        <p:nvSpPr>
+          <p:cNvPr id="9" name="テキスト ボックス 8"/>
+          <p:cNvSpPr txBox="1"/>
+          <p:nvPr/>
+        </p:nvSpPr>
+        <p:spPr>
+          <a:xfrm>
+            <a:off x="1076204" y="4653136"/>
+            <a:ext cx="6991594" cy="1200329"/>
+          </a:xfrm>
+          <a:prstGeom prst="rect">
+            <a:avLst/>
+          </a:prstGeom>
+          <a:noFill/>
+        </p:spPr>
+        <p:txBody>
+          <a:bodyPr wrap="none" rtlCol="0">
+            <a:spAutoFit/>
+          </a:bodyPr>
+          <a:lstStyle/>
+          <a:p>
+            <a:pPr algn="ctr"/>
+            <a:r>
+              <a:rPr kumimoji="1" lang="en-US" altLang="ja-JP" sz="3600" dirty="0" smtClean="0"/>
+              <a:t>These are required to static analysis</a:t>
+            </a:r>
+          </a:p>
+          <a:p>
+            <a:pPr algn="ctr"/>
+            <a:r>
+              <a:rPr lang="en-US" altLang="ja-JP" sz="3600" dirty="0" smtClean="0"/>
+              <a:t>(it is for translating other back-ends)</a:t>
+            </a:r>
+            <a:endParaRPr kumimoji="1" lang="ja-JP" altLang="en-US" sz="3600" dirty="0"/>
+          </a:p>
+        </p:txBody>
+      </p:sp>
+      <p:sp>
+        <p:nvSpPr>
+          <p:cNvPr id="10" name="テキスト ボックス 9"/>
+          <p:cNvSpPr txBox="1"/>
+          <p:nvPr/>
+        </p:nvSpPr>
+        <p:spPr>
+          <a:xfrm>
+            <a:off x="1475656" y="5877272"/>
+            <a:ext cx="7626318" cy="646331"/>
+          </a:xfrm>
+          <a:prstGeom prst="rect">
+            <a:avLst/>
+          </a:prstGeom>
+          <a:noFill/>
+        </p:spPr>
+        <p:txBody>
+          <a:bodyPr wrap="none" rtlCol="0">
+            <a:spAutoFit/>
+          </a:bodyPr>
+          <a:lstStyle/>
+          <a:p>
+            <a:r>
+              <a:rPr kumimoji="1" lang="en-US" altLang="ja-JP" sz="3600" dirty="0" smtClean="0">
+                <a:solidFill>
+                  <a:srgbClr val="FF0000"/>
+                </a:solidFill>
+              </a:rPr>
+              <a:t>* </a:t>
+            </a:r>
+            <a:r>
+              <a:rPr kumimoji="1" lang="en-US" altLang="ja-JP" sz="3600" dirty="0" err="1" smtClean="0">
+                <a:solidFill>
+                  <a:srgbClr val="FF0000"/>
+                </a:solidFill>
+              </a:rPr>
+              <a:t>RPython</a:t>
+            </a:r>
+            <a:r>
+              <a:rPr kumimoji="1" lang="en-US" altLang="ja-JP" sz="3600" dirty="0" smtClean="0">
+                <a:solidFill>
+                  <a:srgbClr val="FF0000"/>
+                </a:solidFill>
+              </a:rPr>
+              <a:t> can be executed by </a:t>
+            </a:r>
+            <a:r>
+              <a:rPr kumimoji="1" lang="en-US" altLang="ja-JP" sz="3600" dirty="0" err="1" smtClean="0">
+                <a:solidFill>
+                  <a:srgbClr val="FF0000"/>
+                </a:solidFill>
+              </a:rPr>
+              <a:t>CPython</a:t>
+            </a:r>
+            <a:r>
+              <a:rPr kumimoji="1" lang="en-US" altLang="ja-JP" sz="3600" dirty="0" smtClean="0">
+                <a:solidFill>
+                  <a:srgbClr val="FF0000"/>
+                </a:solidFill>
+              </a:rPr>
+              <a:t>!</a:t>
+            </a:r>
+            <a:endParaRPr kumimoji="1" lang="ja-JP" altLang="en-US" sz="3600" dirty="0">
+              <a:solidFill>
+                <a:srgbClr val="FF0000"/>
+              </a:solidFill>
+            </a:endParaRPr>
           </a:p>
         </p:txBody>
       </p:sp>
     </p:spTree>
-    <p:extLst>
-      <p:ext uri="{BB962C8B-B14F-4D97-AF65-F5344CB8AC3E}">
-        <p14:creationId xmlns:p14="http://schemas.microsoft.com/office/powerpoint/2010/main" xmlns="" val="2094830404"/>
-      </p:ext>
-    </p:extLst>
   </p:cSld>
   <p:clrMapOvr>
     <a:masterClrMapping/>
@@ -3921,40 +4476,975 @@
             <p:ph type="title"/>
           </p:nvPr>
         </p:nvSpPr>
-        <p:spPr/>
+        <p:spPr>
+          <a:xfrm>
+            <a:off x="457200" y="-90264"/>
+            <a:ext cx="8229600" cy="1143000"/>
+          </a:xfrm>
+        </p:spPr>
         <p:txBody>
           <a:bodyPr/>
           <a:lstStyle/>
           <a:p>
+            <a:r>
+              <a:rPr lang="en-US" altLang="ja-JP" dirty="0" smtClean="0"/>
+              <a:t>How to use </a:t>
+            </a:r>
+            <a:r>
+              <a:rPr lang="en-US" altLang="ja-JP" dirty="0" err="1" smtClean="0"/>
+              <a:t>PyPy</a:t>
+            </a:r>
+            <a:r>
+              <a:rPr lang="en-US" altLang="ja-JP" dirty="0" smtClean="0"/>
+              <a:t> (as framework)?</a:t>
+            </a:r>
             <a:endParaRPr kumimoji="1" lang="ja-JP" altLang="en-US" dirty="0"/>
           </a:p>
         </p:txBody>
       </p:sp>
-      <p:sp>
-        <p:nvSpPr>
-          <p:cNvPr id="3" name="コンテンツ プレースホルダー 2"/>
-          <p:cNvSpPr>
-            <a:spLocks noGrp="1"/>
-          </p:cNvSpPr>
-          <p:nvPr>
-            <p:ph idx="1"/>
-          </p:nvPr>
-        </p:nvSpPr>
-        <p:spPr/>
+      <p:grpSp>
+        <p:nvGrpSpPr>
+          <p:cNvPr id="11" name="グループ化 10"/>
+          <p:cNvGrpSpPr/>
+          <p:nvPr/>
+        </p:nvGrpSpPr>
+        <p:grpSpPr>
+          <a:xfrm>
+            <a:off x="827584" y="1484784"/>
+            <a:ext cx="7543948" cy="4078025"/>
+            <a:chOff x="52389" y="1052736"/>
+            <a:chExt cx="7543948" cy="4078025"/>
+          </a:xfrm>
+        </p:grpSpPr>
+        <p:pic>
+          <p:nvPicPr>
+            <p:cNvPr id="2052" name="Picture 4"/>
+            <p:cNvPicPr>
+              <a:picLocks noChangeAspect="1" noChangeArrowheads="1"/>
+            </p:cNvPicPr>
+            <p:nvPr/>
+          </p:nvPicPr>
+          <p:blipFill>
+            <a:blip r:embed="rId2" cstate="print"/>
+            <a:srcRect/>
+            <a:stretch>
+              <a:fillRect/>
+            </a:stretch>
+          </p:blipFill>
+          <p:spPr bwMode="auto">
+            <a:xfrm>
+              <a:off x="52389" y="1052736"/>
+              <a:ext cx="7543948" cy="4078025"/>
+            </a:xfrm>
+            <a:prstGeom prst="rect">
+              <a:avLst/>
+            </a:prstGeom>
+            <a:noFill/>
+            <a:ln w="9525">
+              <a:noFill/>
+              <a:miter lim="800000"/>
+              <a:headEnd/>
+              <a:tailEnd/>
+            </a:ln>
+          </p:spPr>
+        </p:pic>
+        <p:sp>
+          <p:nvSpPr>
+            <p:cNvPr id="7" name="円/楕円 6"/>
+            <p:cNvSpPr/>
+            <p:nvPr/>
+          </p:nvSpPr>
+          <p:spPr>
+            <a:xfrm>
+              <a:off x="484370" y="4005064"/>
+              <a:ext cx="4807710" cy="698556"/>
+            </a:xfrm>
+            <a:prstGeom prst="ellipse">
+              <a:avLst/>
+            </a:prstGeom>
+            <a:noFill/>
+            <a:ln>
+              <a:solidFill>
+                <a:srgbClr val="FF0000"/>
+              </a:solidFill>
+            </a:ln>
+          </p:spPr>
+          <p:style>
+            <a:lnRef idx="2">
+              <a:schemeClr val="accent1">
+                <a:shade val="50000"/>
+              </a:schemeClr>
+            </a:lnRef>
+            <a:fillRef idx="1">
+              <a:schemeClr val="accent1"/>
+            </a:fillRef>
+            <a:effectRef idx="0">
+              <a:schemeClr val="accent1"/>
+            </a:effectRef>
+            <a:fontRef idx="minor">
+              <a:schemeClr val="lt1"/>
+            </a:fontRef>
+          </p:style>
+          <p:txBody>
+            <a:bodyPr rtlCol="0" anchor="ctr"/>
+            <a:lstStyle/>
+            <a:p>
+              <a:pPr algn="ctr"/>
+              <a:endParaRPr kumimoji="1" lang="ja-JP" altLang="en-US"/>
+            </a:p>
+          </p:txBody>
+        </p:sp>
+        <p:sp>
+          <p:nvSpPr>
+            <p:cNvPr id="9" name="円/楕円 8"/>
+            <p:cNvSpPr/>
+            <p:nvPr/>
+          </p:nvSpPr>
+          <p:spPr>
+            <a:xfrm>
+              <a:off x="467544" y="2250945"/>
+              <a:ext cx="4807710" cy="1106047"/>
+            </a:xfrm>
+            <a:prstGeom prst="ellipse">
+              <a:avLst/>
+            </a:prstGeom>
+            <a:noFill/>
+            <a:ln>
+              <a:solidFill>
+                <a:srgbClr val="FF0000"/>
+              </a:solidFill>
+            </a:ln>
+          </p:spPr>
+          <p:style>
+            <a:lnRef idx="2">
+              <a:schemeClr val="accent1">
+                <a:shade val="50000"/>
+              </a:schemeClr>
+            </a:lnRef>
+            <a:fillRef idx="1">
+              <a:schemeClr val="accent1"/>
+            </a:fillRef>
+            <a:effectRef idx="0">
+              <a:schemeClr val="accent1"/>
+            </a:effectRef>
+            <a:fontRef idx="minor">
+              <a:schemeClr val="lt1"/>
+            </a:fontRef>
+          </p:style>
+          <p:txBody>
+            <a:bodyPr rtlCol="0" anchor="ctr"/>
+            <a:lstStyle/>
+            <a:p>
+              <a:pPr algn="ctr"/>
+              <a:endParaRPr kumimoji="1" lang="ja-JP" altLang="en-US"/>
+            </a:p>
+          </p:txBody>
+        </p:sp>
+      </p:grpSp>
+      <p:sp>
+        <p:nvSpPr>
+          <p:cNvPr id="10" name="テキスト ボックス 9"/>
+          <p:cNvSpPr txBox="1"/>
+          <p:nvPr/>
+        </p:nvSpPr>
+        <p:spPr>
+          <a:xfrm>
+            <a:off x="723105" y="6021288"/>
+            <a:ext cx="8420895" cy="584775"/>
+          </a:xfrm>
+          <a:prstGeom prst="rect">
+            <a:avLst/>
+          </a:prstGeom>
+          <a:noFill/>
+        </p:spPr>
+        <p:txBody>
+          <a:bodyPr wrap="none" rtlCol="0">
+            <a:spAutoFit/>
+          </a:bodyPr>
+          <a:lstStyle/>
+          <a:p>
+            <a:r>
+              <a:rPr kumimoji="1" lang="en-US" altLang="ja-JP" sz="3200" dirty="0" smtClean="0">
+                <a:solidFill>
+                  <a:srgbClr val="FF0000"/>
+                </a:solidFill>
+              </a:rPr>
+              <a:t>* </a:t>
+            </a:r>
+            <a:r>
+              <a:rPr kumimoji="1" lang="en-US" altLang="ja-JP" sz="3200" dirty="0" err="1" smtClean="0">
+                <a:solidFill>
+                  <a:srgbClr val="FF0000"/>
+                </a:solidFill>
+              </a:rPr>
+              <a:t>Toolchain</a:t>
+            </a:r>
+            <a:r>
+              <a:rPr kumimoji="1" lang="en-US" altLang="ja-JP" sz="3200" dirty="0" smtClean="0">
+                <a:solidFill>
+                  <a:srgbClr val="FF0000"/>
+                </a:solidFill>
+              </a:rPr>
+              <a:t> is not contained in binary distribution</a:t>
+            </a:r>
+            <a:endParaRPr kumimoji="1" lang="ja-JP" altLang="en-US" sz="3200" dirty="0">
+              <a:solidFill>
+                <a:srgbClr val="FF0000"/>
+              </a:solidFill>
+            </a:endParaRPr>
+          </a:p>
+        </p:txBody>
+      </p:sp>
+      <p:sp>
+        <p:nvSpPr>
+          <p:cNvPr id="12" name="テキスト ボックス 11"/>
+          <p:cNvSpPr txBox="1"/>
+          <p:nvPr/>
+        </p:nvSpPr>
+        <p:spPr>
+          <a:xfrm>
+            <a:off x="467544" y="900009"/>
+            <a:ext cx="6991273" cy="584775"/>
+          </a:xfrm>
+          <a:prstGeom prst="rect">
+            <a:avLst/>
+          </a:prstGeom>
+          <a:noFill/>
+        </p:spPr>
+        <p:txBody>
+          <a:bodyPr wrap="none" rtlCol="0">
+            <a:spAutoFit/>
+          </a:bodyPr>
+          <a:lstStyle/>
+          <a:p>
+            <a:r>
+              <a:rPr kumimoji="1" lang="en-US" altLang="ja-JP" sz="3200" dirty="0" smtClean="0"/>
+              <a:t>1. Download source code edition of </a:t>
+            </a:r>
+            <a:r>
+              <a:rPr kumimoji="1" lang="en-US" altLang="ja-JP" sz="3200" dirty="0" err="1" smtClean="0"/>
+              <a:t>PyPy</a:t>
+            </a:r>
+            <a:endParaRPr kumimoji="1" lang="ja-JP" altLang="en-US" sz="3200" dirty="0"/>
+          </a:p>
+        </p:txBody>
+      </p:sp>
+    </p:spTree>
+  </p:cSld>
+  <p:clrMapOvr>
+    <a:masterClrMapping/>
+  </p:clrMapOvr>
+</p:sld>
+</file>
+
+<file path=ppt/slides/slide13.xml><?xml version="1.0" encoding="utf-8"?>
+<p:sld xmlns:a="http://schemas.openxmlformats.org/drawingml/2006/main" xmlns:r="http://schemas.openxmlformats.org/officeDocument/2006/relationships" xmlns:p="http://schemas.openxmlformats.org/presentationml/2006/main">
+  <p:cSld>
+    <p:spTree>
+      <p:nvGrpSpPr>
+        <p:cNvPr id="1" name=""/>
+        <p:cNvGrpSpPr/>
+        <p:nvPr/>
+      </p:nvGrpSpPr>
+      <p:grpSpPr>
+        <a:xfrm>
+          <a:off x="0" y="0"/>
+          <a:ext cx="0" cy="0"/>
+          <a:chOff x="0" y="0"/>
+          <a:chExt cx="0" cy="0"/>
+        </a:xfrm>
+      </p:grpSpPr>
+      <p:sp>
+        <p:nvSpPr>
+          <p:cNvPr id="2" name="タイトル 1"/>
+          <p:cNvSpPr>
+            <a:spLocks noGrp="1"/>
+          </p:cNvSpPr>
+          <p:nvPr>
+            <p:ph type="title"/>
+          </p:nvPr>
+        </p:nvSpPr>
+        <p:spPr>
+          <a:xfrm>
+            <a:off x="457200" y="-90264"/>
+            <a:ext cx="8229600" cy="1143000"/>
+          </a:xfrm>
+        </p:spPr>
         <p:txBody>
           <a:bodyPr/>
           <a:lstStyle/>
           <a:p>
-            <a:endParaRPr kumimoji="1" lang="ja-JP" altLang="en-US"/>
+            <a:r>
+              <a:rPr lang="en-US" altLang="ja-JP" dirty="0" smtClean="0"/>
+              <a:t>How to use </a:t>
+            </a:r>
+            <a:r>
+              <a:rPr lang="en-US" altLang="ja-JP" dirty="0" err="1" smtClean="0"/>
+              <a:t>PyPy</a:t>
+            </a:r>
+            <a:r>
+              <a:rPr lang="en-US" altLang="ja-JP" dirty="0" smtClean="0"/>
+              <a:t> (as framework)?</a:t>
+            </a:r>
+            <a:endParaRPr kumimoji="1" lang="ja-JP" altLang="en-US" dirty="0"/>
+          </a:p>
+        </p:txBody>
+      </p:sp>
+      <p:pic>
+        <p:nvPicPr>
+          <p:cNvPr id="8" name="Picture 2"/>
+          <p:cNvPicPr>
+            <a:picLocks noChangeAspect="1" noChangeArrowheads="1"/>
+          </p:cNvPicPr>
+          <p:nvPr/>
+        </p:nvPicPr>
+        <p:blipFill>
+          <a:blip r:embed="rId2" cstate="print"/>
+          <a:srcRect/>
+          <a:stretch>
+            <a:fillRect/>
+          </a:stretch>
+        </p:blipFill>
+        <p:spPr bwMode="auto">
+          <a:xfrm>
+            <a:off x="1403648" y="1484784"/>
+            <a:ext cx="6383161" cy="4752528"/>
+          </a:xfrm>
+          <a:prstGeom prst="rect">
+            <a:avLst/>
+          </a:prstGeom>
+          <a:noFill/>
+          <a:ln w="9525">
+            <a:noFill/>
+            <a:miter lim="800000"/>
+            <a:headEnd/>
+            <a:tailEnd/>
+          </a:ln>
+        </p:spPr>
+      </p:pic>
+      <p:sp>
+        <p:nvSpPr>
+          <p:cNvPr id="11" name="テキスト ボックス 10"/>
+          <p:cNvSpPr txBox="1"/>
+          <p:nvPr/>
+        </p:nvSpPr>
+        <p:spPr>
+          <a:xfrm>
+            <a:off x="467544" y="900009"/>
+            <a:ext cx="6240426" cy="584775"/>
+          </a:xfrm>
+          <a:prstGeom prst="rect">
+            <a:avLst/>
+          </a:prstGeom>
+          <a:noFill/>
+        </p:spPr>
+        <p:txBody>
+          <a:bodyPr wrap="none" rtlCol="0">
+            <a:spAutoFit/>
+          </a:bodyPr>
+          <a:lstStyle/>
+          <a:p>
+            <a:r>
+              <a:rPr lang="en-US" altLang="ja-JP" sz="3200" dirty="0" smtClean="0"/>
+              <a:t>2</a:t>
+            </a:r>
+            <a:r>
+              <a:rPr kumimoji="1" lang="en-US" altLang="ja-JP" sz="3200" dirty="0" smtClean="0"/>
+              <a:t>. Write interpreter code in </a:t>
+            </a:r>
+            <a:r>
+              <a:rPr kumimoji="1" lang="en-US" altLang="ja-JP" sz="3200" dirty="0" err="1" smtClean="0"/>
+              <a:t>RPython</a:t>
+            </a:r>
+            <a:endParaRPr kumimoji="1" lang="ja-JP" altLang="en-US" sz="3200" dirty="0"/>
+          </a:p>
+        </p:txBody>
+      </p:sp>
+      <p:sp>
+        <p:nvSpPr>
+          <p:cNvPr id="12" name="テキスト ボックス 11"/>
+          <p:cNvSpPr txBox="1"/>
+          <p:nvPr/>
+        </p:nvSpPr>
+        <p:spPr>
+          <a:xfrm>
+            <a:off x="185673" y="6211669"/>
+            <a:ext cx="8958327" cy="646331"/>
+          </a:xfrm>
+          <a:prstGeom prst="rect">
+            <a:avLst/>
+          </a:prstGeom>
+          <a:noFill/>
+        </p:spPr>
+        <p:txBody>
+          <a:bodyPr wrap="none" rtlCol="0">
+            <a:spAutoFit/>
+          </a:bodyPr>
+          <a:lstStyle/>
+          <a:p>
+            <a:r>
+              <a:rPr kumimoji="1" lang="en-US" altLang="ja-JP" sz="3600" dirty="0" smtClean="0">
+                <a:solidFill>
+                  <a:srgbClr val="FF0000"/>
+                </a:solidFill>
+              </a:rPr>
+              <a:t>* </a:t>
+            </a:r>
+            <a:r>
+              <a:rPr kumimoji="1" lang="en-US" altLang="ja-JP" sz="3600" dirty="0" smtClean="0">
+                <a:solidFill>
+                  <a:srgbClr val="FF0000"/>
+                </a:solidFill>
+              </a:rPr>
+              <a:t>Note that it </a:t>
+            </a:r>
+            <a:r>
+              <a:rPr kumimoji="1" lang="en-US" altLang="ja-JP" sz="3600" dirty="0" smtClean="0">
+                <a:solidFill>
+                  <a:srgbClr val="FF0000"/>
+                </a:solidFill>
+              </a:rPr>
+              <a:t>can also be executed by </a:t>
+            </a:r>
+            <a:r>
+              <a:rPr kumimoji="1" lang="en-US" altLang="ja-JP" sz="3600" dirty="0" err="1" smtClean="0">
+                <a:solidFill>
+                  <a:srgbClr val="FF0000"/>
+                </a:solidFill>
+              </a:rPr>
+              <a:t>CPython</a:t>
+            </a:r>
+            <a:endParaRPr kumimoji="1" lang="ja-JP" altLang="en-US" sz="3600" dirty="0">
+              <a:solidFill>
+                <a:srgbClr val="FF0000"/>
+              </a:solidFill>
+            </a:endParaRPr>
+          </a:p>
+        </p:txBody>
+      </p:sp>
+    </p:spTree>
+  </p:cSld>
+  <p:clrMapOvr>
+    <a:masterClrMapping/>
+  </p:clrMapOvr>
+</p:sld>
+</file>
+
+<file path=ppt/slides/slide14.xml><?xml version="1.0" encoding="utf-8"?>
+<p:sld xmlns:a="http://schemas.openxmlformats.org/drawingml/2006/main" xmlns:r="http://schemas.openxmlformats.org/officeDocument/2006/relationships" xmlns:p="http://schemas.openxmlformats.org/presentationml/2006/main">
+  <p:cSld>
+    <p:spTree>
+      <p:nvGrpSpPr>
+        <p:cNvPr id="1" name=""/>
+        <p:cNvGrpSpPr/>
+        <p:nvPr/>
+      </p:nvGrpSpPr>
+      <p:grpSpPr>
+        <a:xfrm>
+          <a:off x="0" y="0"/>
+          <a:ext cx="0" cy="0"/>
+          <a:chOff x="0" y="0"/>
+          <a:chExt cx="0" cy="0"/>
+        </a:xfrm>
+      </p:grpSpPr>
+      <p:sp>
+        <p:nvSpPr>
+          <p:cNvPr id="2" name="タイトル 1"/>
+          <p:cNvSpPr>
+            <a:spLocks noGrp="1"/>
+          </p:cNvSpPr>
+          <p:nvPr>
+            <p:ph type="title"/>
+          </p:nvPr>
+        </p:nvSpPr>
+        <p:spPr>
+          <a:xfrm>
+            <a:off x="457200" y="-90264"/>
+            <a:ext cx="8229600" cy="1143000"/>
+          </a:xfrm>
+        </p:spPr>
+        <p:txBody>
+          <a:bodyPr/>
+          <a:lstStyle/>
+          <a:p>
+            <a:r>
+              <a:rPr lang="en-US" altLang="ja-JP" dirty="0" smtClean="0"/>
+              <a:t>How to use </a:t>
+            </a:r>
+            <a:r>
+              <a:rPr lang="en-US" altLang="ja-JP" dirty="0" err="1" smtClean="0"/>
+              <a:t>PyPy</a:t>
+            </a:r>
+            <a:r>
+              <a:rPr lang="en-US" altLang="ja-JP" dirty="0" smtClean="0"/>
+              <a:t> (as framework)?</a:t>
+            </a:r>
+            <a:endParaRPr kumimoji="1" lang="ja-JP" altLang="en-US" dirty="0"/>
+          </a:p>
+        </p:txBody>
+      </p:sp>
+      <p:sp>
+        <p:nvSpPr>
+          <p:cNvPr id="11" name="テキスト ボックス 10"/>
+          <p:cNvSpPr txBox="1"/>
+          <p:nvPr/>
+        </p:nvSpPr>
+        <p:spPr>
+          <a:xfrm>
+            <a:off x="467544" y="900009"/>
+            <a:ext cx="3016595" cy="584775"/>
+          </a:xfrm>
+          <a:prstGeom prst="rect">
+            <a:avLst/>
+          </a:prstGeom>
+          <a:noFill/>
+        </p:spPr>
+        <p:txBody>
+          <a:bodyPr wrap="none" rtlCol="0">
+            <a:spAutoFit/>
+          </a:bodyPr>
+          <a:lstStyle/>
+          <a:p>
+            <a:r>
+              <a:rPr lang="en-US" altLang="ja-JP" sz="3200" dirty="0" smtClean="0"/>
+              <a:t>3</a:t>
+            </a:r>
+            <a:r>
+              <a:rPr kumimoji="1" lang="en-US" altLang="ja-JP" sz="3200" dirty="0" smtClean="0"/>
+              <a:t>. Use </a:t>
+            </a:r>
+            <a:r>
+              <a:rPr kumimoji="1" lang="en-US" altLang="ja-JP" sz="3200" dirty="0" err="1" smtClean="0"/>
+              <a:t>translater</a:t>
+            </a:r>
+            <a:r>
+              <a:rPr kumimoji="1" lang="en-US" altLang="ja-JP" sz="3200" dirty="0" smtClean="0"/>
+              <a:t> </a:t>
+            </a:r>
+            <a:endParaRPr kumimoji="1" lang="ja-JP" altLang="en-US" sz="3200" dirty="0"/>
+          </a:p>
+        </p:txBody>
+      </p:sp>
+    </p:spTree>
+  </p:cSld>
+  <p:clrMapOvr>
+    <a:masterClrMapping/>
+  </p:clrMapOvr>
+</p:sld>
+</file>
+
+<file path=ppt/slides/slide15.xml><?xml version="1.0" encoding="utf-8"?>
+<p:sld xmlns:a="http://schemas.openxmlformats.org/drawingml/2006/main" xmlns:r="http://schemas.openxmlformats.org/officeDocument/2006/relationships" xmlns:p="http://schemas.openxmlformats.org/presentationml/2006/main">
+  <p:cSld>
+    <p:spTree>
+      <p:nvGrpSpPr>
+        <p:cNvPr id="1" name=""/>
+        <p:cNvGrpSpPr/>
+        <p:nvPr/>
+      </p:nvGrpSpPr>
+      <p:grpSpPr>
+        <a:xfrm>
+          <a:off x="0" y="0"/>
+          <a:ext cx="0" cy="0"/>
+          <a:chOff x="0" y="0"/>
+          <a:chExt cx="0" cy="0"/>
+        </a:xfrm>
+      </p:grpSpPr>
+      <p:sp>
+        <p:nvSpPr>
+          <p:cNvPr id="2" name="タイトル 1"/>
+          <p:cNvSpPr>
+            <a:spLocks noGrp="1"/>
+          </p:cNvSpPr>
+          <p:nvPr>
+            <p:ph type="title"/>
+          </p:nvPr>
+        </p:nvSpPr>
+        <p:spPr>
+          <a:xfrm>
+            <a:off x="457200" y="-90264"/>
+            <a:ext cx="8229600" cy="1143000"/>
+          </a:xfrm>
+        </p:spPr>
+        <p:txBody>
+          <a:bodyPr/>
+          <a:lstStyle/>
+          <a:p>
+            <a:r>
+              <a:rPr lang="en-US" altLang="ja-JP" dirty="0" smtClean="0"/>
+              <a:t>How to use </a:t>
+            </a:r>
+            <a:r>
+              <a:rPr lang="en-US" altLang="ja-JP" dirty="0" err="1" smtClean="0"/>
+              <a:t>PyPy</a:t>
+            </a:r>
+            <a:r>
+              <a:rPr lang="en-US" altLang="ja-JP" dirty="0" smtClean="0"/>
+              <a:t> (as framework)?</a:t>
+            </a:r>
+            <a:endParaRPr kumimoji="1" lang="ja-JP" altLang="en-US" dirty="0"/>
+          </a:p>
+        </p:txBody>
+      </p:sp>
+      <p:sp>
+        <p:nvSpPr>
+          <p:cNvPr id="11" name="テキスト ボックス 10"/>
+          <p:cNvSpPr txBox="1"/>
+          <p:nvPr/>
+        </p:nvSpPr>
+        <p:spPr>
+          <a:xfrm>
+            <a:off x="467544" y="900009"/>
+            <a:ext cx="2716208" cy="584776"/>
+          </a:xfrm>
+          <a:prstGeom prst="rect">
+            <a:avLst/>
+          </a:prstGeom>
+          <a:noFill/>
+        </p:spPr>
+        <p:txBody>
+          <a:bodyPr wrap="none" rtlCol="0">
+            <a:spAutoFit/>
+          </a:bodyPr>
+          <a:lstStyle/>
+          <a:p>
+            <a:r>
+              <a:rPr lang="en-US" altLang="ja-JP" sz="3200" dirty="0"/>
+              <a:t>4</a:t>
+            </a:r>
+            <a:r>
+              <a:rPr kumimoji="1" lang="en-US" altLang="ja-JP" sz="3200" dirty="0" smtClean="0"/>
+              <a:t>. Translating…</a:t>
+            </a:r>
+            <a:endParaRPr kumimoji="1" lang="ja-JP" altLang="en-US" sz="3200" dirty="0"/>
           </a:p>
         </p:txBody>
       </p:sp>
     </p:spTree>
     <p:extLst>
       <p:ext uri="{BB962C8B-B14F-4D97-AF65-F5344CB8AC3E}">
-        <p14:creationId xmlns:p14="http://schemas.microsoft.com/office/powerpoint/2010/main" xmlns="" val="519101280"/>
+        <p14:creationId xmlns:p14="http://schemas.microsoft.com/office/powerpoint/2010/main" val="2965792853"/>
       </p:ext>
     </p:extLst>
+  </p:cSld>
+  <p:clrMapOvr>
+    <a:masterClrMapping/>
+  </p:clrMapOvr>
+</p:sld>
+</file>
+
+<file path=ppt/slides/slide16.xml><?xml version="1.0" encoding="utf-8"?>
+<p:sld xmlns:a="http://schemas.openxmlformats.org/drawingml/2006/main" xmlns:r="http://schemas.openxmlformats.org/officeDocument/2006/relationships" xmlns:p="http://schemas.openxmlformats.org/presentationml/2006/main">
+  <p:cSld>
+    <p:spTree>
+      <p:nvGrpSpPr>
+        <p:cNvPr id="1" name=""/>
+        <p:cNvGrpSpPr/>
+        <p:nvPr/>
+      </p:nvGrpSpPr>
+      <p:grpSpPr>
+        <a:xfrm>
+          <a:off x="0" y="0"/>
+          <a:ext cx="0" cy="0"/>
+          <a:chOff x="0" y="0"/>
+          <a:chExt cx="0" cy="0"/>
+        </a:xfrm>
+      </p:grpSpPr>
+      <p:sp>
+        <p:nvSpPr>
+          <p:cNvPr id="2" name="タイトル 1"/>
+          <p:cNvSpPr>
+            <a:spLocks noGrp="1"/>
+          </p:cNvSpPr>
+          <p:nvPr>
+            <p:ph type="title"/>
+          </p:nvPr>
+        </p:nvSpPr>
+        <p:spPr>
+          <a:xfrm>
+            <a:off x="457200" y="-90264"/>
+            <a:ext cx="8229600" cy="1143000"/>
+          </a:xfrm>
+        </p:spPr>
+        <p:txBody>
+          <a:bodyPr/>
+          <a:lstStyle/>
+          <a:p>
+            <a:r>
+              <a:rPr lang="en-US" altLang="ja-JP" dirty="0" smtClean="0"/>
+              <a:t>How to use </a:t>
+            </a:r>
+            <a:r>
+              <a:rPr lang="en-US" altLang="ja-JP" dirty="0" err="1" smtClean="0"/>
+              <a:t>PyPy</a:t>
+            </a:r>
+            <a:r>
+              <a:rPr lang="en-US" altLang="ja-JP" dirty="0" smtClean="0"/>
+              <a:t> (as framework)?</a:t>
+            </a:r>
+            <a:endParaRPr kumimoji="1" lang="ja-JP" altLang="en-US" dirty="0"/>
+          </a:p>
+        </p:txBody>
+      </p:sp>
+      <p:sp>
+        <p:nvSpPr>
+          <p:cNvPr id="11" name="テキスト ボックス 10"/>
+          <p:cNvSpPr txBox="1"/>
+          <p:nvPr/>
+        </p:nvSpPr>
+        <p:spPr>
+          <a:xfrm>
+            <a:off x="467544" y="900009"/>
+            <a:ext cx="8508459" cy="584776"/>
+          </a:xfrm>
+          <a:prstGeom prst="rect">
+            <a:avLst/>
+          </a:prstGeom>
+          <a:noFill/>
+        </p:spPr>
+        <p:txBody>
+          <a:bodyPr wrap="none" rtlCol="0">
+            <a:spAutoFit/>
+          </a:bodyPr>
+          <a:lstStyle/>
+          <a:p>
+            <a:r>
+              <a:rPr lang="en-US" altLang="ja-JP" sz="3200" dirty="0" smtClean="0"/>
+              <a:t>5</a:t>
+            </a:r>
+            <a:r>
+              <a:rPr kumimoji="1" lang="en-US" altLang="ja-JP" sz="3200" dirty="0" smtClean="0"/>
+              <a:t>. Faster version of your implementation is made!</a:t>
+            </a:r>
+            <a:endParaRPr kumimoji="1" lang="ja-JP" altLang="en-US" sz="3200" dirty="0"/>
+          </a:p>
+        </p:txBody>
+      </p:sp>
+    </p:spTree>
+    <p:extLst>
+      <p:ext uri="{BB962C8B-B14F-4D97-AF65-F5344CB8AC3E}">
+        <p14:creationId xmlns:p14="http://schemas.microsoft.com/office/powerpoint/2010/main" val="694122298"/>
+      </p:ext>
+    </p:extLst>
+  </p:cSld>
+  <p:clrMapOvr>
+    <a:masterClrMapping/>
+  </p:clrMapOvr>
+</p:sld>
+</file>
+
+<file path=ppt/slides/slide17.xml><?xml version="1.0" encoding="utf-8"?>
+<p:sld xmlns:a="http://schemas.openxmlformats.org/drawingml/2006/main" xmlns:r="http://schemas.openxmlformats.org/officeDocument/2006/relationships" xmlns:p="http://schemas.openxmlformats.org/presentationml/2006/main">
+  <p:cSld>
+    <p:spTree>
+      <p:nvGrpSpPr>
+        <p:cNvPr id="1" name=""/>
+        <p:cNvGrpSpPr/>
+        <p:nvPr/>
+      </p:nvGrpSpPr>
+      <p:grpSpPr>
+        <a:xfrm>
+          <a:off x="0" y="0"/>
+          <a:ext cx="0" cy="0"/>
+          <a:chOff x="0" y="0"/>
+          <a:chExt cx="0" cy="0"/>
+        </a:xfrm>
+      </p:grpSpPr>
+      <p:sp>
+        <p:nvSpPr>
+          <p:cNvPr id="2" name="タイトル 1"/>
+          <p:cNvSpPr>
+            <a:spLocks noGrp="1"/>
+          </p:cNvSpPr>
+          <p:nvPr>
+            <p:ph type="title"/>
+          </p:nvPr>
+        </p:nvSpPr>
+        <p:spPr/>
+        <p:txBody>
+          <a:bodyPr/>
+          <a:lstStyle/>
+          <a:p>
+            <a:endParaRPr kumimoji="1" lang="ja-JP" altLang="en-US"/>
+          </a:p>
+        </p:txBody>
+      </p:sp>
+      <p:sp>
+        <p:nvSpPr>
+          <p:cNvPr id="3" name="コンテンツ プレースホルダ 2"/>
+          <p:cNvSpPr>
+            <a:spLocks noGrp="1"/>
+          </p:cNvSpPr>
+          <p:nvPr>
+            <p:ph idx="1"/>
+          </p:nvPr>
+        </p:nvSpPr>
+        <p:spPr/>
+        <p:txBody>
+          <a:bodyPr/>
+          <a:lstStyle/>
+          <a:p>
+            <a:endParaRPr kumimoji="1" lang="ja-JP" altLang="en-US"/>
+          </a:p>
+        </p:txBody>
+      </p:sp>
+    </p:spTree>
+  </p:cSld>
+  <p:clrMapOvr>
+    <a:masterClrMapping/>
+  </p:clrMapOvr>
+</p:sld>
+</file>
+
+<file path=ppt/slides/slide18.xml><?xml version="1.0" encoding="utf-8"?>
+<p:sld xmlns:a="http://schemas.openxmlformats.org/drawingml/2006/main" xmlns:r="http://schemas.openxmlformats.org/officeDocument/2006/relationships" xmlns:p="http://schemas.openxmlformats.org/presentationml/2006/main">
+  <p:cSld>
+    <p:spTree>
+      <p:nvGrpSpPr>
+        <p:cNvPr id="1" name=""/>
+        <p:cNvGrpSpPr/>
+        <p:nvPr/>
+      </p:nvGrpSpPr>
+      <p:grpSpPr>
+        <a:xfrm>
+          <a:off x="0" y="0"/>
+          <a:ext cx="0" cy="0"/>
+          <a:chOff x="0" y="0"/>
+          <a:chExt cx="0" cy="0"/>
+        </a:xfrm>
+      </p:grpSpPr>
+      <p:sp>
+        <p:nvSpPr>
+          <p:cNvPr id="2" name="タイトル 1"/>
+          <p:cNvSpPr>
+            <a:spLocks noGrp="1"/>
+          </p:cNvSpPr>
+          <p:nvPr>
+            <p:ph type="title"/>
+          </p:nvPr>
+        </p:nvSpPr>
+        <p:spPr>
+          <a:xfrm>
+            <a:off x="457200" y="-90264"/>
+            <a:ext cx="8229600" cy="1143000"/>
+          </a:xfrm>
+        </p:spPr>
+        <p:txBody>
+          <a:bodyPr/>
+          <a:lstStyle/>
+          <a:p>
+            <a:r>
+              <a:rPr lang="en-US" altLang="ja-JP" dirty="0" smtClean="0"/>
+              <a:t>How to use </a:t>
+            </a:r>
+            <a:r>
+              <a:rPr lang="en-US" altLang="ja-JP" dirty="0" err="1" smtClean="0"/>
+              <a:t>PyPy</a:t>
+            </a:r>
+            <a:r>
+              <a:rPr lang="en-US" altLang="ja-JP" dirty="0" smtClean="0"/>
+              <a:t> (as framework)?</a:t>
+            </a:r>
+            <a:endParaRPr kumimoji="1" lang="ja-JP" altLang="en-US" dirty="0"/>
+          </a:p>
+        </p:txBody>
+      </p:sp>
+    </p:spTree>
+  </p:cSld>
+  <p:clrMapOvr>
+    <a:masterClrMapping/>
+  </p:clrMapOvr>
+</p:sld>
+</file>
+
+<file path=ppt/slides/slide19.xml><?xml version="1.0" encoding="utf-8"?>
+<p:sld xmlns:a="http://schemas.openxmlformats.org/drawingml/2006/main" xmlns:r="http://schemas.openxmlformats.org/officeDocument/2006/relationships" xmlns:p="http://schemas.openxmlformats.org/presentationml/2006/main">
+  <p:cSld>
+    <p:spTree>
+      <p:nvGrpSpPr>
+        <p:cNvPr id="1" name=""/>
+        <p:cNvGrpSpPr/>
+        <p:nvPr/>
+      </p:nvGrpSpPr>
+      <p:grpSpPr>
+        <a:xfrm>
+          <a:off x="0" y="0"/>
+          <a:ext cx="0" cy="0"/>
+          <a:chOff x="0" y="0"/>
+          <a:chExt cx="0" cy="0"/>
+        </a:xfrm>
+      </p:grpSpPr>
+      <p:sp>
+        <p:nvSpPr>
+          <p:cNvPr id="2" name="タイトル 1"/>
+          <p:cNvSpPr>
+            <a:spLocks noGrp="1"/>
+          </p:cNvSpPr>
+          <p:nvPr>
+            <p:ph type="title"/>
+          </p:nvPr>
+        </p:nvSpPr>
+        <p:spPr/>
+        <p:txBody>
+          <a:bodyPr/>
+          <a:lstStyle/>
+          <a:p>
+            <a:endParaRPr kumimoji="1" lang="ja-JP" altLang="en-US"/>
+          </a:p>
+        </p:txBody>
+      </p:sp>
+      <p:sp>
+        <p:nvSpPr>
+          <p:cNvPr id="3" name="コンテンツ プレースホルダ 2"/>
+          <p:cNvSpPr>
+            <a:spLocks noGrp="1"/>
+          </p:cNvSpPr>
+          <p:nvPr>
+            <p:ph idx="1"/>
+          </p:nvPr>
+        </p:nvSpPr>
+        <p:spPr/>
+        <p:txBody>
+          <a:bodyPr/>
+          <a:lstStyle/>
+          <a:p>
+            <a:endParaRPr kumimoji="1" lang="ja-JP" altLang="en-US"/>
+          </a:p>
+        </p:txBody>
+      </p:sp>
+      <p:pic>
+        <p:nvPicPr>
+          <p:cNvPr id="3074" name="Picture 2"/>
+          <p:cNvPicPr>
+            <a:picLocks noChangeAspect="1" noChangeArrowheads="1"/>
+          </p:cNvPicPr>
+          <p:nvPr/>
+        </p:nvPicPr>
+        <p:blipFill>
+          <a:blip r:embed="rId2" cstate="print"/>
+          <a:srcRect/>
+          <a:stretch>
+            <a:fillRect/>
+          </a:stretch>
+        </p:blipFill>
+        <p:spPr bwMode="auto">
+          <a:xfrm>
+            <a:off x="2390775" y="1804988"/>
+            <a:ext cx="4362450" cy="3248025"/>
+          </a:xfrm>
+          <a:prstGeom prst="rect">
+            <a:avLst/>
+          </a:prstGeom>
+          <a:noFill/>
+          <a:ln w="9525">
+            <a:noFill/>
+            <a:miter lim="800000"/>
+            <a:headEnd/>
+            <a:tailEnd/>
+          </a:ln>
+        </p:spPr>
+      </p:pic>
+    </p:spTree>
   </p:cSld>
   <p:clrMapOvr>
     <a:masterClrMapping/>
@@ -4211,7 +5701,7 @@
   <p:timing>
     <p:tnLst>
       <p:par>
-        <p:cTn id="1" dur="indefinite" restart="never" nodeType="tmRoot">
+        <p:cTn xmlns:p14="http://schemas.microsoft.com/office/powerpoint/2010/main" id="1" dur="indefinite" restart="never" nodeType="tmRoot">
           <p:childTnLst>
             <p:seq concurrent="1" nextAc="seek">
               <p:cTn id="2" dur="indefinite" nodeType="mainSeq">
@@ -4286,6 +5776,521 @@
 </p:sld>
 </file>
 
+<file path=ppt/slides/slide20.xml><?xml version="1.0" encoding="utf-8"?>
+<p:sld xmlns:a="http://schemas.openxmlformats.org/drawingml/2006/main" xmlns:r="http://schemas.openxmlformats.org/officeDocument/2006/relationships" xmlns:p="http://schemas.openxmlformats.org/presentationml/2006/main">
+  <p:cSld>
+    <p:spTree>
+      <p:nvGrpSpPr>
+        <p:cNvPr id="1" name=""/>
+        <p:cNvGrpSpPr/>
+        <p:nvPr/>
+      </p:nvGrpSpPr>
+      <p:grpSpPr>
+        <a:xfrm>
+          <a:off x="0" y="0"/>
+          <a:ext cx="0" cy="0"/>
+          <a:chOff x="0" y="0"/>
+          <a:chExt cx="0" cy="0"/>
+        </a:xfrm>
+      </p:grpSpPr>
+      <p:sp>
+        <p:nvSpPr>
+          <p:cNvPr id="2" name="タイトル 1"/>
+          <p:cNvSpPr>
+            <a:spLocks noGrp="1"/>
+          </p:cNvSpPr>
+          <p:nvPr>
+            <p:ph type="title"/>
+          </p:nvPr>
+        </p:nvSpPr>
+        <p:spPr/>
+        <p:txBody>
+          <a:bodyPr/>
+          <a:lstStyle/>
+          <a:p>
+            <a:r>
+              <a:rPr kumimoji="1" lang="en-US" altLang="ja-JP" dirty="0" smtClean="0"/>
+              <a:t>Templates</a:t>
+            </a:r>
+            <a:endParaRPr kumimoji="1" lang="ja-JP" altLang="en-US" dirty="0"/>
+          </a:p>
+        </p:txBody>
+      </p:sp>
+      <p:sp>
+        <p:nvSpPr>
+          <p:cNvPr id="5" name="正方形/長方形 4"/>
+          <p:cNvSpPr/>
+          <p:nvPr/>
+        </p:nvSpPr>
+        <p:spPr>
+          <a:xfrm>
+            <a:off x="323528" y="1412776"/>
+            <a:ext cx="4032448" cy="1728192"/>
+          </a:xfrm>
+          <a:prstGeom prst="rect">
+            <a:avLst/>
+          </a:prstGeom>
+          <a:solidFill>
+            <a:schemeClr val="accent5">
+              <a:lumMod val="20000"/>
+              <a:lumOff val="80000"/>
+            </a:schemeClr>
+          </a:solidFill>
+        </p:spPr>
+        <p:style>
+          <a:lnRef idx="1">
+            <a:schemeClr val="accent1"/>
+          </a:lnRef>
+          <a:fillRef idx="3">
+            <a:schemeClr val="accent1"/>
+          </a:fillRef>
+          <a:effectRef idx="2">
+            <a:schemeClr val="accent1"/>
+          </a:effectRef>
+          <a:fontRef idx="minor">
+            <a:schemeClr val="lt1"/>
+          </a:fontRef>
+        </p:style>
+        <p:txBody>
+          <a:bodyPr rtlCol="0" anchor="ctr"/>
+          <a:lstStyle/>
+          <a:p>
+            <a:pPr algn="ctr"/>
+            <a:endParaRPr kumimoji="1" lang="ja-JP" altLang="en-US"/>
+          </a:p>
+        </p:txBody>
+      </p:sp>
+      <p:sp>
+        <p:nvSpPr>
+          <p:cNvPr id="4" name="テキスト ボックス 3"/>
+          <p:cNvSpPr txBox="1"/>
+          <p:nvPr/>
+        </p:nvSpPr>
+        <p:spPr>
+          <a:xfrm>
+            <a:off x="323528" y="1412776"/>
+            <a:ext cx="1951225" cy="707886"/>
+          </a:xfrm>
+          <a:prstGeom prst="rect">
+            <a:avLst/>
+          </a:prstGeom>
+        </p:spPr>
+        <p:style>
+          <a:lnRef idx="1">
+            <a:schemeClr val="accent1"/>
+          </a:lnRef>
+          <a:fillRef idx="3">
+            <a:schemeClr val="accent1"/>
+          </a:fillRef>
+          <a:effectRef idx="2">
+            <a:schemeClr val="accent1"/>
+          </a:effectRef>
+          <a:fontRef idx="minor">
+            <a:schemeClr val="lt1"/>
+          </a:fontRef>
+        </p:style>
+        <p:txBody>
+          <a:bodyPr wrap="none" rtlCol="0">
+            <a:spAutoFit/>
+          </a:bodyPr>
+          <a:lstStyle/>
+          <a:p>
+            <a:r>
+              <a:rPr kumimoji="1" lang="en-US" altLang="ja-JP" sz="4000" dirty="0" smtClean="0"/>
+              <a:t>Problem</a:t>
+            </a:r>
+            <a:endParaRPr kumimoji="1" lang="ja-JP" altLang="en-US" sz="4000" dirty="0"/>
+          </a:p>
+        </p:txBody>
+      </p:sp>
+      <p:sp>
+        <p:nvSpPr>
+          <p:cNvPr id="6" name="正方形/長方形 5"/>
+          <p:cNvSpPr/>
+          <p:nvPr/>
+        </p:nvSpPr>
+        <p:spPr>
+          <a:xfrm>
+            <a:off x="4644008" y="1412776"/>
+            <a:ext cx="4032448" cy="1728192"/>
+          </a:xfrm>
+          <a:prstGeom prst="rect">
+            <a:avLst/>
+          </a:prstGeom>
+          <a:solidFill>
+            <a:schemeClr val="accent3">
+              <a:lumMod val="20000"/>
+              <a:lumOff val="80000"/>
+            </a:schemeClr>
+          </a:solidFill>
+        </p:spPr>
+        <p:style>
+          <a:lnRef idx="1">
+            <a:schemeClr val="accent1"/>
+          </a:lnRef>
+          <a:fillRef idx="3">
+            <a:schemeClr val="accent1"/>
+          </a:fillRef>
+          <a:effectRef idx="2">
+            <a:schemeClr val="accent1"/>
+          </a:effectRef>
+          <a:fontRef idx="minor">
+            <a:schemeClr val="lt1"/>
+          </a:fontRef>
+        </p:style>
+        <p:txBody>
+          <a:bodyPr rtlCol="0" anchor="ctr"/>
+          <a:lstStyle/>
+          <a:p>
+            <a:pPr algn="ctr"/>
+            <a:endParaRPr kumimoji="1" lang="ja-JP" altLang="en-US"/>
+          </a:p>
+        </p:txBody>
+      </p:sp>
+      <p:sp>
+        <p:nvSpPr>
+          <p:cNvPr id="7" name="テキスト ボックス 6"/>
+          <p:cNvSpPr txBox="1"/>
+          <p:nvPr/>
+        </p:nvSpPr>
+        <p:spPr>
+          <a:xfrm>
+            <a:off x="4644008" y="1412776"/>
+            <a:ext cx="1951225" cy="707886"/>
+          </a:xfrm>
+          <a:prstGeom prst="rect">
+            <a:avLst/>
+          </a:prstGeom>
+        </p:spPr>
+        <p:style>
+          <a:lnRef idx="1">
+            <a:schemeClr val="accent3"/>
+          </a:lnRef>
+          <a:fillRef idx="3">
+            <a:schemeClr val="accent3"/>
+          </a:fillRef>
+          <a:effectRef idx="2">
+            <a:schemeClr val="accent3"/>
+          </a:effectRef>
+          <a:fontRef idx="minor">
+            <a:schemeClr val="lt1"/>
+          </a:fontRef>
+        </p:style>
+        <p:txBody>
+          <a:bodyPr wrap="none" rtlCol="0">
+            <a:spAutoFit/>
+          </a:bodyPr>
+          <a:lstStyle/>
+          <a:p>
+            <a:r>
+              <a:rPr kumimoji="1" lang="en-US" altLang="ja-JP" sz="4000" dirty="0" smtClean="0"/>
+              <a:t>Problem</a:t>
+            </a:r>
+            <a:endParaRPr kumimoji="1" lang="ja-JP" altLang="en-US" sz="4000" dirty="0"/>
+          </a:p>
+        </p:txBody>
+      </p:sp>
+      <p:sp>
+        <p:nvSpPr>
+          <p:cNvPr id="8" name="下矢印 7"/>
+          <p:cNvSpPr/>
+          <p:nvPr/>
+        </p:nvSpPr>
+        <p:spPr>
+          <a:xfrm>
+            <a:off x="251520" y="3717032"/>
+            <a:ext cx="4536504" cy="504056"/>
+          </a:xfrm>
+          <a:prstGeom prst="downArrow">
+            <a:avLst/>
+          </a:prstGeom>
+        </p:spPr>
+        <p:style>
+          <a:lnRef idx="1">
+            <a:schemeClr val="dk1"/>
+          </a:lnRef>
+          <a:fillRef idx="3">
+            <a:schemeClr val="dk1"/>
+          </a:fillRef>
+          <a:effectRef idx="2">
+            <a:schemeClr val="dk1"/>
+          </a:effectRef>
+          <a:fontRef idx="minor">
+            <a:schemeClr val="lt1"/>
+          </a:fontRef>
+        </p:style>
+        <p:txBody>
+          <a:bodyPr rtlCol="0" anchor="ctr"/>
+          <a:lstStyle/>
+          <a:p>
+            <a:pPr algn="ctr"/>
+            <a:endParaRPr kumimoji="1" lang="ja-JP" altLang="en-US"/>
+          </a:p>
+        </p:txBody>
+      </p:sp>
+      <p:sp>
+        <p:nvSpPr>
+          <p:cNvPr id="9" name="直角三角形 8"/>
+          <p:cNvSpPr/>
+          <p:nvPr/>
+        </p:nvSpPr>
+        <p:spPr>
+          <a:xfrm rot="13500000">
+            <a:off x="133031" y="4717780"/>
+            <a:ext cx="654689" cy="647451"/>
+          </a:xfrm>
+          <a:prstGeom prst="rtTriangle">
+            <a:avLst/>
+          </a:prstGeom>
+        </p:spPr>
+        <p:style>
+          <a:lnRef idx="1">
+            <a:schemeClr val="accent1"/>
+          </a:lnRef>
+          <a:fillRef idx="3">
+            <a:schemeClr val="accent1"/>
+          </a:fillRef>
+          <a:effectRef idx="2">
+            <a:schemeClr val="accent1"/>
+          </a:effectRef>
+          <a:fontRef idx="minor">
+            <a:schemeClr val="lt1"/>
+          </a:fontRef>
+        </p:style>
+        <p:txBody>
+          <a:bodyPr rtlCol="0" anchor="ctr"/>
+          <a:lstStyle/>
+          <a:p>
+            <a:pPr algn="ctr"/>
+            <a:endParaRPr kumimoji="1" lang="ja-JP" altLang="en-US"/>
+          </a:p>
+        </p:txBody>
+      </p:sp>
+      <p:sp>
+        <p:nvSpPr>
+          <p:cNvPr id="10" name="直角三角形 9"/>
+          <p:cNvSpPr/>
+          <p:nvPr/>
+        </p:nvSpPr>
+        <p:spPr>
+          <a:xfrm rot="13500000">
+            <a:off x="744591" y="4717779"/>
+            <a:ext cx="654689" cy="647451"/>
+          </a:xfrm>
+          <a:prstGeom prst="rtTriangle">
+            <a:avLst/>
+          </a:prstGeom>
+        </p:spPr>
+        <p:style>
+          <a:lnRef idx="1">
+            <a:schemeClr val="accent2"/>
+          </a:lnRef>
+          <a:fillRef idx="3">
+            <a:schemeClr val="accent2"/>
+          </a:fillRef>
+          <a:effectRef idx="2">
+            <a:schemeClr val="accent2"/>
+          </a:effectRef>
+          <a:fontRef idx="minor">
+            <a:schemeClr val="lt1"/>
+          </a:fontRef>
+        </p:style>
+        <p:txBody>
+          <a:bodyPr rtlCol="0" anchor="ctr"/>
+          <a:lstStyle/>
+          <a:p>
+            <a:pPr algn="ctr"/>
+            <a:endParaRPr kumimoji="1" lang="ja-JP" altLang="en-US"/>
+          </a:p>
+        </p:txBody>
+      </p:sp>
+      <p:sp>
+        <p:nvSpPr>
+          <p:cNvPr id="11" name="直角三角形 10"/>
+          <p:cNvSpPr/>
+          <p:nvPr/>
+        </p:nvSpPr>
+        <p:spPr>
+          <a:xfrm rot="13500000">
+            <a:off x="1392665" y="4717779"/>
+            <a:ext cx="654689" cy="647451"/>
+          </a:xfrm>
+          <a:prstGeom prst="rtTriangle">
+            <a:avLst/>
+          </a:prstGeom>
+        </p:spPr>
+        <p:style>
+          <a:lnRef idx="1">
+            <a:schemeClr val="accent3"/>
+          </a:lnRef>
+          <a:fillRef idx="3">
+            <a:schemeClr val="accent3"/>
+          </a:fillRef>
+          <a:effectRef idx="2">
+            <a:schemeClr val="accent3"/>
+          </a:effectRef>
+          <a:fontRef idx="minor">
+            <a:schemeClr val="lt1"/>
+          </a:fontRef>
+        </p:style>
+        <p:txBody>
+          <a:bodyPr rtlCol="0" anchor="ctr"/>
+          <a:lstStyle/>
+          <a:p>
+            <a:pPr algn="ctr"/>
+            <a:endParaRPr kumimoji="1" lang="ja-JP" altLang="en-US"/>
+          </a:p>
+        </p:txBody>
+      </p:sp>
+    </p:spTree>
+    <p:extLst>
+      <p:ext uri="{BB962C8B-B14F-4D97-AF65-F5344CB8AC3E}">
+        <p14:creationId xmlns:p14="http://schemas.microsoft.com/office/powerpoint/2010/main" val="1477573084"/>
+      </p:ext>
+    </p:extLst>
+  </p:cSld>
+  <p:clrMapOvr>
+    <a:masterClrMapping/>
+  </p:clrMapOvr>
+</p:sld>
+</file>
+
+<file path=ppt/slides/slide21.xml><?xml version="1.0" encoding="utf-8"?>
+<p:sld xmlns:a="http://schemas.openxmlformats.org/drawingml/2006/main" xmlns:r="http://schemas.openxmlformats.org/officeDocument/2006/relationships" xmlns:p="http://schemas.openxmlformats.org/presentationml/2006/main">
+  <p:cSld>
+    <p:spTree>
+      <p:nvGrpSpPr>
+        <p:cNvPr id="1" name=""/>
+        <p:cNvGrpSpPr/>
+        <p:nvPr/>
+      </p:nvGrpSpPr>
+      <p:grpSpPr>
+        <a:xfrm>
+          <a:off x="0" y="0"/>
+          <a:ext cx="0" cy="0"/>
+          <a:chOff x="0" y="0"/>
+          <a:chExt cx="0" cy="0"/>
+        </a:xfrm>
+      </p:grpSpPr>
+      <p:sp>
+        <p:nvSpPr>
+          <p:cNvPr id="2" name="タイトル 1"/>
+          <p:cNvSpPr>
+            <a:spLocks noGrp="1"/>
+          </p:cNvSpPr>
+          <p:nvPr>
+            <p:ph type="title"/>
+          </p:nvPr>
+        </p:nvSpPr>
+        <p:spPr/>
+        <p:txBody>
+          <a:bodyPr/>
+          <a:lstStyle/>
+          <a:p>
+            <a:endParaRPr kumimoji="1" lang="ja-JP" altLang="en-US"/>
+          </a:p>
+        </p:txBody>
+      </p:sp>
+      <p:sp>
+        <p:nvSpPr>
+          <p:cNvPr id="3" name="コンテンツ プレースホルダー 2"/>
+          <p:cNvSpPr>
+            <a:spLocks noGrp="1"/>
+          </p:cNvSpPr>
+          <p:nvPr>
+            <p:ph idx="1"/>
+          </p:nvPr>
+        </p:nvSpPr>
+        <p:spPr/>
+        <p:txBody>
+          <a:bodyPr/>
+          <a:lstStyle/>
+          <a:p>
+            <a:endParaRPr kumimoji="1" lang="ja-JP" altLang="en-US"/>
+          </a:p>
+        </p:txBody>
+      </p:sp>
+    </p:spTree>
+    <p:extLst>
+      <p:ext uri="{BB962C8B-B14F-4D97-AF65-F5344CB8AC3E}">
+        <p14:creationId xmlns:p14="http://schemas.microsoft.com/office/powerpoint/2010/main" val="2094830404"/>
+      </p:ext>
+    </p:extLst>
+  </p:cSld>
+  <p:clrMapOvr>
+    <a:masterClrMapping/>
+  </p:clrMapOvr>
+</p:sld>
+</file>
+
+<file path=ppt/slides/slide22.xml><?xml version="1.0" encoding="utf-8"?>
+<p:sld xmlns:a="http://schemas.openxmlformats.org/drawingml/2006/main" xmlns:r="http://schemas.openxmlformats.org/officeDocument/2006/relationships" xmlns:p="http://schemas.openxmlformats.org/presentationml/2006/main">
+  <p:cSld>
+    <p:spTree>
+      <p:nvGrpSpPr>
+        <p:cNvPr id="1" name=""/>
+        <p:cNvGrpSpPr/>
+        <p:nvPr/>
+      </p:nvGrpSpPr>
+      <p:grpSpPr>
+        <a:xfrm>
+          <a:off x="0" y="0"/>
+          <a:ext cx="0" cy="0"/>
+          <a:chOff x="0" y="0"/>
+          <a:chExt cx="0" cy="0"/>
+        </a:xfrm>
+      </p:grpSpPr>
+      <p:sp>
+        <p:nvSpPr>
+          <p:cNvPr id="2" name="タイトル 1"/>
+          <p:cNvSpPr>
+            <a:spLocks noGrp="1"/>
+          </p:cNvSpPr>
+          <p:nvPr>
+            <p:ph type="title"/>
+          </p:nvPr>
+        </p:nvSpPr>
+        <p:spPr/>
+        <p:txBody>
+          <a:bodyPr/>
+          <a:lstStyle/>
+          <a:p>
+            <a:endParaRPr kumimoji="1" lang="ja-JP" altLang="en-US" dirty="0"/>
+          </a:p>
+        </p:txBody>
+      </p:sp>
+      <p:sp>
+        <p:nvSpPr>
+          <p:cNvPr id="3" name="コンテンツ プレースホルダー 2"/>
+          <p:cNvSpPr>
+            <a:spLocks noGrp="1"/>
+          </p:cNvSpPr>
+          <p:nvPr>
+            <p:ph idx="1"/>
+          </p:nvPr>
+        </p:nvSpPr>
+        <p:spPr/>
+        <p:txBody>
+          <a:bodyPr/>
+          <a:lstStyle/>
+          <a:p>
+            <a:endParaRPr kumimoji="1" lang="ja-JP" altLang="en-US"/>
+          </a:p>
+        </p:txBody>
+      </p:sp>
+    </p:spTree>
+    <p:extLst>
+      <p:ext uri="{BB962C8B-B14F-4D97-AF65-F5344CB8AC3E}">
+        <p14:creationId xmlns:p14="http://schemas.microsoft.com/office/powerpoint/2010/main" val="519101280"/>
+      </p:ext>
+    </p:extLst>
+  </p:cSld>
+  <p:clrMapOvr>
+    <a:masterClrMapping/>
+  </p:clrMapOvr>
+</p:sld>
+</file>
+
 <file path=ppt/slides/slide3.xml><?xml version="1.0" encoding="utf-8"?>
 <p:sld xmlns:a="http://schemas.openxmlformats.org/drawingml/2006/main" xmlns:r="http://schemas.openxmlformats.org/officeDocument/2006/relationships" xmlns:p="http://schemas.openxmlformats.org/presentationml/2006/main">
   <p:cSld>
@@ -4548,7 +6553,7 @@
   <p:timing>
     <p:tnLst>
       <p:par>
-        <p:cTn id="1" dur="indefinite" restart="never" nodeType="tmRoot"/>
+        <p:cTn xmlns:p14="http://schemas.microsoft.com/office/powerpoint/2010/main" id="1" dur="indefinite" restart="never" nodeType="tmRoot"/>
       </p:par>
     </p:tnLst>
   </p:timing>
@@ -4658,7 +6663,7 @@
   <p:timing>
     <p:tnLst>
       <p:par>
-        <p:cTn id="1" dur="indefinite" restart="never" nodeType="tmRoot"/>
+        <p:cTn xmlns:p14="http://schemas.microsoft.com/office/powerpoint/2010/main" id="1" dur="indefinite" restart="never" nodeType="tmRoot"/>
       </p:par>
     </p:tnLst>
   </p:timing>
@@ -4666,6 +6671,69 @@
 </file>
 
 <file path=ppt/slides/slide5.xml><?xml version="1.0" encoding="utf-8"?>
+<p:sld xmlns:a="http://schemas.openxmlformats.org/drawingml/2006/main" xmlns:r="http://schemas.openxmlformats.org/officeDocument/2006/relationships" xmlns:p="http://schemas.openxmlformats.org/presentationml/2006/main">
+  <p:cSld>
+    <p:spTree>
+      <p:nvGrpSpPr>
+        <p:cNvPr id="1" name=""/>
+        <p:cNvGrpSpPr/>
+        <p:nvPr/>
+      </p:nvGrpSpPr>
+      <p:grpSpPr>
+        <a:xfrm>
+          <a:off x="0" y="0"/>
+          <a:ext cx="0" cy="0"/>
+          <a:chOff x="0" y="0"/>
+          <a:chExt cx="0" cy="0"/>
+        </a:xfrm>
+      </p:grpSpPr>
+      <p:sp>
+        <p:nvSpPr>
+          <p:cNvPr id="2" name="タイトル 1"/>
+          <p:cNvSpPr>
+            <a:spLocks noGrp="1"/>
+          </p:cNvSpPr>
+          <p:nvPr>
+            <p:ph type="title"/>
+          </p:nvPr>
+        </p:nvSpPr>
+        <p:spPr>
+          <a:xfrm>
+            <a:off x="457200" y="2852936"/>
+            <a:ext cx="8229600" cy="1143000"/>
+          </a:xfrm>
+        </p:spPr>
+        <p:txBody>
+          <a:bodyPr>
+            <a:normAutofit/>
+          </a:bodyPr>
+          <a:lstStyle/>
+          <a:p>
+            <a:r>
+              <a:rPr kumimoji="1" lang="en-US" altLang="ja-JP" sz="6000" dirty="0" smtClean="0"/>
+              <a:t>What is </a:t>
+            </a:r>
+            <a:r>
+              <a:rPr kumimoji="1" lang="en-US" altLang="ja-JP" sz="6000" dirty="0" err="1" smtClean="0"/>
+              <a:t>PyPy</a:t>
+            </a:r>
+            <a:r>
+              <a:rPr lang="en-US" altLang="ja-JP" sz="6000" dirty="0" smtClean="0"/>
+              <a:t>?</a:t>
+            </a:r>
+            <a:endParaRPr kumimoji="1" lang="ja-JP" altLang="en-US" sz="6000" dirty="0"/>
+          </a:p>
+        </p:txBody>
+      </p:sp>
+    </p:spTree>
+  </p:cSld>
+  <p:clrMapOvr>
+    <a:masterClrMapping/>
+  </p:clrMapOvr>
+</p:sld>
+</file>
+
+<file path=ppt/slides/slide6.xml><?xml version="1.0" encoding="utf-8"?>
 <p:sld xmlns:a="http://schemas.openxmlformats.org/drawingml/2006/main" xmlns:r="http://schemas.openxmlformats.org/officeDocument/2006/relationships" xmlns:p="http://schemas.openxmlformats.org/presentationml/2006/main">
   <p:cSld>
     <p:spTree>
@@ -4730,11 +6798,7 @@
           <a:p>
             <a:r>
               <a:rPr kumimoji="1" lang="en-US" altLang="ja-JP" sz="5400" dirty="0" smtClean="0"/>
-              <a:t>Please raise your hand if you know </a:t>
-            </a:r>
-            <a:r>
-              <a:rPr kumimoji="1" lang="en-US" altLang="ja-JP" sz="5400" dirty="0" smtClean="0"/>
-              <a:t>briefly what </a:t>
+              <a:t>Please raise your hand if you know briefly what </a:t>
             </a:r>
             <a:r>
               <a:rPr kumimoji="1" lang="en-US" altLang="ja-JP" sz="5400" dirty="0" err="1" smtClean="0"/>
@@ -4751,7 +6815,7 @@
     </p:spTree>
     <p:extLst>
       <p:ext uri="{BB962C8B-B14F-4D97-AF65-F5344CB8AC3E}">
-        <p14:creationId xmlns:p14="http://schemas.microsoft.com/office/powerpoint/2010/main" xmlns="" val="2258680520"/>
+        <p14:creationId xmlns:p14="http://schemas.microsoft.com/office/powerpoint/2010/main" val="2258680520"/>
       </p:ext>
     </p:extLst>
   </p:cSld>
@@ -4761,7 +6825,7 @@
 </p:sld>
 </file>
 
-<file path=ppt/slides/slide6.xml><?xml version="1.0" encoding="utf-8"?>
+<file path=ppt/slides/slide7.xml><?xml version="1.0" encoding="utf-8"?>
 <p:sld xmlns:a="http://schemas.openxmlformats.org/drawingml/2006/main" xmlns:r="http://schemas.openxmlformats.org/officeDocument/2006/relationships" xmlns:p="http://schemas.openxmlformats.org/presentationml/2006/main">
   <p:cSld>
     <p:spTree>
@@ -4790,18 +6854,20 @@
         </p:nvSpPr>
         <p:spPr/>
         <p:txBody>
-          <a:bodyPr/>
-          <a:lstStyle/>
-          <a:p>
-            <a:r>
-              <a:rPr kumimoji="1" lang="en-US" altLang="ja-JP" dirty="0" err="1" smtClean="0"/>
+          <a:bodyPr>
+            <a:normAutofit/>
+          </a:bodyPr>
+          <a:lstStyle/>
+          <a:p>
+            <a:r>
+              <a:rPr kumimoji="1" lang="en-US" altLang="ja-JP" sz="5400" dirty="0" err="1" smtClean="0"/>
               <a:t>PyPy</a:t>
             </a:r>
             <a:r>
-              <a:rPr kumimoji="1" lang="en-US" altLang="ja-JP" dirty="0" smtClean="0"/>
+              <a:rPr kumimoji="1" lang="en-US" altLang="ja-JP" sz="5400" dirty="0" smtClean="0"/>
               <a:t> is regarded as …</a:t>
             </a:r>
-            <a:endParaRPr kumimoji="1" lang="ja-JP" altLang="en-US" dirty="0"/>
+            <a:endParaRPr kumimoji="1" lang="ja-JP" altLang="en-US" sz="5400" dirty="0"/>
           </a:p>
         </p:txBody>
       </p:sp>
@@ -4817,39 +6883,50 @@
         </p:nvSpPr>
         <p:spPr>
           <a:xfrm>
-            <a:off x="457200" y="1600201"/>
-            <a:ext cx="8229600" cy="2620888"/>
-          </a:xfrm>
-        </p:spPr>
-        <p:txBody>
-          <a:bodyPr/>
-          <a:lstStyle/>
-          <a:p>
-            <a:r>
-              <a:rPr lang="en-US" altLang="ja-JP" dirty="0" smtClean="0"/>
+            <a:off x="457200" y="1816225"/>
+            <a:ext cx="8229600" cy="2044823"/>
+          </a:xfrm>
+        </p:spPr>
+        <p:txBody>
+          <a:bodyPr>
+            <a:noAutofit/>
+          </a:bodyPr>
+          <a:lstStyle/>
+          <a:p>
+            <a:r>
+              <a:rPr lang="en-US" altLang="ja-JP" sz="4400" dirty="0" smtClean="0">
+                <a:solidFill>
+                  <a:srgbClr val="FF0000"/>
+                </a:solidFill>
+              </a:rPr>
               <a:t>Faster p</a:t>
             </a:r>
             <a:r>
-              <a:rPr kumimoji="1" lang="en-US" altLang="ja-JP" dirty="0" smtClean="0"/>
-              <a:t>ython implementation </a:t>
-            </a:r>
-          </a:p>
-          <a:p>
-            <a:r>
-              <a:rPr lang="en-US" altLang="ja-JP" dirty="0" smtClean="0"/>
-              <a:t>Framework used to develop language implementation</a:t>
-            </a:r>
-          </a:p>
-          <a:p>
-            <a:r>
-              <a:rPr lang="en-US" altLang="ja-JP" dirty="0" smtClean="0"/>
-              <a:t>Source-to-source compiler used for </a:t>
-            </a:r>
-            <a:r>
-              <a:rPr lang="en-US" altLang="ja-JP" dirty="0" err="1" smtClean="0"/>
-              <a:t>RPython</a:t>
-            </a:r>
-            <a:endParaRPr lang="en-US" altLang="ja-JP" dirty="0" smtClean="0"/>
+              <a:rPr kumimoji="1" lang="en-US" altLang="ja-JP" sz="4400" dirty="0" smtClean="0">
+                <a:solidFill>
+                  <a:srgbClr val="FF0000"/>
+                </a:solidFill>
+              </a:rPr>
+              <a:t>ython </a:t>
+            </a:r>
+            <a:r>
+              <a:rPr kumimoji="1" lang="en-US" altLang="ja-JP" sz="4400" dirty="0" smtClean="0"/>
+              <a:t>implementation </a:t>
+            </a:r>
+          </a:p>
+          <a:p>
+            <a:r>
+              <a:rPr lang="en-US" altLang="ja-JP" sz="4400" dirty="0" smtClean="0">
+                <a:solidFill>
+                  <a:srgbClr val="FF0000"/>
+                </a:solidFill>
+              </a:rPr>
+              <a:t>Framework</a:t>
+            </a:r>
+            <a:r>
+              <a:rPr lang="en-US" altLang="ja-JP" sz="4400" dirty="0" smtClean="0"/>
+              <a:t> used to develop language implementation</a:t>
+            </a:r>
           </a:p>
         </p:txBody>
       </p:sp>
@@ -4861,8 +6938,8 @@
         </p:nvSpPr>
         <p:spPr>
           <a:xfrm>
-            <a:off x="755576" y="5085184"/>
-            <a:ext cx="7820595" cy="769441"/>
+            <a:off x="610339" y="5085184"/>
+            <a:ext cx="7923323" cy="923330"/>
           </a:xfrm>
           <a:prstGeom prst="rect">
             <a:avLst/>
@@ -4876,17 +6953,17 @@
           <a:lstStyle/>
           <a:p>
             <a:r>
-              <a:rPr kumimoji="1" lang="en-US" altLang="ja-JP" sz="4400" dirty="0" smtClean="0"/>
-              <a:t>All of them are definitely correct! </a:t>
-            </a:r>
-            <a:endParaRPr kumimoji="1" lang="ja-JP" altLang="en-US" sz="4400" dirty="0"/>
+              <a:rPr kumimoji="1" lang="en-US" altLang="ja-JP" sz="5400" dirty="0" smtClean="0"/>
+              <a:t>Both are definitely correct! </a:t>
+            </a:r>
+            <a:endParaRPr kumimoji="1" lang="ja-JP" altLang="en-US" sz="5400" dirty="0"/>
           </a:p>
         </p:txBody>
       </p:sp>
     </p:spTree>
     <p:extLst>
       <p:ext uri="{BB962C8B-B14F-4D97-AF65-F5344CB8AC3E}">
-        <p14:creationId xmlns:p14="http://schemas.microsoft.com/office/powerpoint/2010/main" xmlns="" val="1374909894"/>
+        <p14:creationId xmlns:p14="http://schemas.microsoft.com/office/powerpoint/2010/main" val="1374909894"/>
       </p:ext>
     </p:extLst>
   </p:cSld>
@@ -4896,7 +6973,7 @@
 </p:sld>
 </file>
 
-<file path=ppt/slides/slide7.xml><?xml version="1.0" encoding="utf-8"?>
+<file path=ppt/slides/slide8.xml><?xml version="1.0" encoding="utf-8"?>
 <p:sld xmlns:a="http://schemas.openxmlformats.org/drawingml/2006/main" xmlns:r="http://schemas.openxmlformats.org/officeDocument/2006/relationships" xmlns:p="http://schemas.openxmlformats.org/presentationml/2006/main">
   <p:cSld>
     <p:spTree>
@@ -5079,11 +7156,7 @@
             </a:pPr>
             <a:r>
               <a:rPr lang="en-US" altLang="ja-JP" sz="3600" dirty="0" smtClean="0"/>
-              <a:t> </a:t>
-            </a:r>
-            <a:r>
-              <a:rPr lang="en-US" altLang="ja-JP" sz="3600" dirty="0" smtClean="0"/>
-              <a:t>Creating interpreter requires a lot of work</a:t>
+              <a:t> Creating interpreter requires a lot of work</a:t>
             </a:r>
             <a:endParaRPr kumimoji="1" lang="ja-JP" altLang="en-US" sz="3600" dirty="0"/>
           </a:p>
@@ -5218,11 +7291,7 @@
             </a:pPr>
             <a:r>
               <a:rPr kumimoji="1" lang="en-US" altLang="ja-JP" sz="3600" dirty="0" smtClean="0"/>
-              <a:t> </a:t>
-            </a:r>
-            <a:r>
-              <a:rPr kumimoji="1" lang="en-US" altLang="ja-JP" sz="3600" dirty="0" smtClean="0"/>
-              <a:t>With high-level language like Python</a:t>
+              <a:t> With high-level language like Python</a:t>
             </a:r>
           </a:p>
           <a:p>
@@ -5232,11 +7301,7 @@
             </a:pPr>
             <a:r>
               <a:rPr lang="en-US" altLang="ja-JP" sz="3600" dirty="0" smtClean="0"/>
-              <a:t> </a:t>
-            </a:r>
-            <a:r>
-              <a:rPr lang="en-US" altLang="ja-JP" sz="3600" dirty="0" smtClean="0"/>
-              <a:t>Without giving up performance</a:t>
+              <a:t> Without giving up performance</a:t>
             </a:r>
             <a:endParaRPr kumimoji="1" lang="ja-JP" altLang="en-US" sz="3600" dirty="0"/>
           </a:p>
@@ -5503,729 +7568,7 @@
     </p:spTree>
     <p:extLst>
       <p:ext uri="{BB962C8B-B14F-4D97-AF65-F5344CB8AC3E}">
-        <p14:creationId xmlns:p14="http://schemas.microsoft.com/office/powerpoint/2010/main" xmlns="" val="210483112"/>
-      </p:ext>
-    </p:extLst>
-  </p:cSld>
-  <p:clrMapOvr>
-    <a:masterClrMapping/>
-  </p:clrMapOvr>
-</p:sld>
-</file>
-
-<file path=ppt/slides/slide8.xml><?xml version="1.0" encoding="utf-8"?>
-<p:sld xmlns:a="http://schemas.openxmlformats.org/drawingml/2006/main" xmlns:r="http://schemas.openxmlformats.org/officeDocument/2006/relationships" xmlns:p="http://schemas.openxmlformats.org/presentationml/2006/main">
-  <p:cSld>
-    <p:spTree>
-      <p:nvGrpSpPr>
-        <p:cNvPr id="1" name=""/>
-        <p:cNvGrpSpPr/>
-        <p:nvPr/>
-      </p:nvGrpSpPr>
-      <p:grpSpPr>
-        <a:xfrm>
-          <a:off x="0" y="0"/>
-          <a:ext cx="0" cy="0"/>
-          <a:chOff x="0" y="0"/>
-          <a:chExt cx="0" cy="0"/>
-        </a:xfrm>
-      </p:grpSpPr>
-      <p:sp>
-        <p:nvSpPr>
-          <p:cNvPr id="2" name="タイトル 1"/>
-          <p:cNvSpPr>
-            <a:spLocks noGrp="1"/>
-          </p:cNvSpPr>
-          <p:nvPr>
-            <p:ph type="title"/>
-          </p:nvPr>
-        </p:nvSpPr>
-        <p:spPr>
-          <a:xfrm>
-            <a:off x="457200" y="-171400"/>
-            <a:ext cx="8229600" cy="1143000"/>
-          </a:xfrm>
-        </p:spPr>
-        <p:txBody>
-          <a:bodyPr/>
-          <a:lstStyle/>
-          <a:p>
-            <a:r>
-              <a:rPr kumimoji="1" lang="en-US" altLang="ja-JP" dirty="0" smtClean="0"/>
-              <a:t>Principle what </a:t>
-            </a:r>
-            <a:r>
-              <a:rPr kumimoji="1" lang="en-US" altLang="ja-JP" dirty="0" err="1" smtClean="0"/>
-              <a:t>PyPy</a:t>
-            </a:r>
-            <a:r>
-              <a:rPr kumimoji="1" lang="en-US" altLang="ja-JP" dirty="0" smtClean="0"/>
-              <a:t> do</a:t>
-            </a:r>
-            <a:endParaRPr kumimoji="1" lang="ja-JP" altLang="en-US" dirty="0"/>
-          </a:p>
-        </p:txBody>
-      </p:sp>
-      <p:sp>
-        <p:nvSpPr>
-          <p:cNvPr id="3" name="コンテンツ プレースホルダー 2"/>
-          <p:cNvSpPr>
-            <a:spLocks noGrp="1"/>
-          </p:cNvSpPr>
-          <p:nvPr>
-            <p:ph idx="1"/>
-          </p:nvPr>
-        </p:nvSpPr>
-        <p:spPr>
-          <a:xfrm>
-            <a:off x="467544" y="764704"/>
-            <a:ext cx="8229600" cy="1080120"/>
-          </a:xfrm>
-        </p:spPr>
-        <p:style>
-          <a:lnRef idx="2">
-            <a:schemeClr val="accent2"/>
-          </a:lnRef>
-          <a:fillRef idx="1">
-            <a:schemeClr val="lt1"/>
-          </a:fillRef>
-          <a:effectRef idx="0">
-            <a:schemeClr val="accent2"/>
-          </a:effectRef>
-          <a:fontRef idx="minor">
-            <a:schemeClr val="dk1"/>
-          </a:fontRef>
-        </p:style>
-        <p:txBody>
-          <a:bodyPr/>
-          <a:lstStyle/>
-          <a:p>
-            <a:pPr algn="ctr">
-              <a:buNone/>
-            </a:pPr>
-            <a:r>
-              <a:rPr kumimoji="1" lang="en-US" altLang="ja-JP" b="1" dirty="0" smtClean="0"/>
-              <a:t>Toolkit to translate interpreter written in </a:t>
-            </a:r>
-            <a:r>
-              <a:rPr kumimoji="1" lang="en-US" altLang="ja-JP" b="1" dirty="0" err="1" smtClean="0"/>
-              <a:t>RPython</a:t>
-            </a:r>
-            <a:r>
-              <a:rPr kumimoji="1" lang="en-US" altLang="ja-JP" b="1" dirty="0" smtClean="0"/>
-              <a:t> to other </a:t>
-            </a:r>
-            <a:r>
-              <a:rPr kumimoji="1" lang="en-US" altLang="ja-JP" b="1" dirty="0" err="1" smtClean="0"/>
-              <a:t>backends</a:t>
-            </a:r>
-            <a:r>
-              <a:rPr kumimoji="1" lang="en-US" altLang="ja-JP" b="1" dirty="0" smtClean="0"/>
-              <a:t>(C/CLI/Java..)</a:t>
-            </a:r>
-            <a:endParaRPr kumimoji="1" lang="ja-JP" altLang="en-US" b="1" dirty="0"/>
-          </a:p>
-        </p:txBody>
-      </p:sp>
-      <p:sp>
-        <p:nvSpPr>
-          <p:cNvPr id="4" name="円/楕円 3"/>
-          <p:cNvSpPr/>
-          <p:nvPr/>
-        </p:nvSpPr>
-        <p:spPr>
-          <a:xfrm>
-            <a:off x="858648" y="3429000"/>
-            <a:ext cx="576064" cy="576064"/>
-          </a:xfrm>
-          <a:prstGeom prst="ellipse">
-            <a:avLst/>
-          </a:prstGeom>
-        </p:spPr>
-        <p:style>
-          <a:lnRef idx="2">
-            <a:schemeClr val="dk1"/>
-          </a:lnRef>
-          <a:fillRef idx="1">
-            <a:schemeClr val="lt1"/>
-          </a:fillRef>
-          <a:effectRef idx="0">
-            <a:schemeClr val="dk1"/>
-          </a:effectRef>
-          <a:fontRef idx="minor">
-            <a:schemeClr val="dk1"/>
-          </a:fontRef>
-        </p:style>
-        <p:txBody>
-          <a:bodyPr rtlCol="0" anchor="ctr"/>
-          <a:lstStyle/>
-          <a:p>
-            <a:pPr algn="ctr"/>
-            <a:endParaRPr kumimoji="1" lang="ja-JP" altLang="en-US"/>
-          </a:p>
-        </p:txBody>
-      </p:sp>
-      <p:sp>
-        <p:nvSpPr>
-          <p:cNvPr id="6" name="フローチャート: 手作業 5"/>
-          <p:cNvSpPr/>
-          <p:nvPr/>
-        </p:nvSpPr>
-        <p:spPr>
-          <a:xfrm flipV="1">
-            <a:off x="827584" y="4005064"/>
-            <a:ext cx="648072" cy="648072"/>
-          </a:xfrm>
-          <a:prstGeom prst="flowChartManualOperation">
-            <a:avLst/>
-          </a:prstGeom>
-        </p:spPr>
-        <p:style>
-          <a:lnRef idx="2">
-            <a:schemeClr val="dk1"/>
-          </a:lnRef>
-          <a:fillRef idx="1">
-            <a:schemeClr val="lt1"/>
-          </a:fillRef>
-          <a:effectRef idx="0">
-            <a:schemeClr val="dk1"/>
-          </a:effectRef>
-          <a:fontRef idx="minor">
-            <a:schemeClr val="dk1"/>
-          </a:fontRef>
-        </p:style>
-        <p:txBody>
-          <a:bodyPr rtlCol="0" anchor="ctr"/>
-          <a:lstStyle/>
-          <a:p>
-            <a:pPr algn="ctr"/>
-            <a:endParaRPr kumimoji="1" lang="ja-JP" altLang="en-US"/>
-          </a:p>
-        </p:txBody>
-      </p:sp>
-      <p:sp>
-        <p:nvSpPr>
-          <p:cNvPr id="7" name="テキスト ボックス 6"/>
-          <p:cNvSpPr txBox="1"/>
-          <p:nvPr/>
-        </p:nvSpPr>
-        <p:spPr>
-          <a:xfrm>
-            <a:off x="323528" y="4653136"/>
-            <a:ext cx="1848326" cy="461665"/>
-          </a:xfrm>
-          <a:prstGeom prst="rect">
-            <a:avLst/>
-          </a:prstGeom>
-          <a:noFill/>
-        </p:spPr>
-        <p:txBody>
-          <a:bodyPr wrap="none" rtlCol="0">
-            <a:spAutoFit/>
-          </a:bodyPr>
-          <a:lstStyle/>
-          <a:p>
-            <a:r>
-              <a:rPr kumimoji="1" lang="en-US" altLang="ja-JP" sz="2400" b="1" dirty="0" smtClean="0"/>
-              <a:t>Implementer</a:t>
-            </a:r>
-            <a:endParaRPr kumimoji="1" lang="ja-JP" altLang="en-US" sz="2400" b="1" dirty="0"/>
-          </a:p>
-        </p:txBody>
-      </p:sp>
-      <p:sp>
-        <p:nvSpPr>
-          <p:cNvPr id="8" name="直角三角形 7"/>
-          <p:cNvSpPr/>
-          <p:nvPr/>
-        </p:nvSpPr>
-        <p:spPr>
-          <a:xfrm rot="13500000">
-            <a:off x="1680695" y="3781674"/>
-            <a:ext cx="654689" cy="647451"/>
-          </a:xfrm>
-          <a:prstGeom prst="rtTriangle">
-            <a:avLst/>
-          </a:prstGeom>
-        </p:spPr>
-        <p:style>
-          <a:lnRef idx="1">
-            <a:schemeClr val="accent1"/>
-          </a:lnRef>
-          <a:fillRef idx="3">
-            <a:schemeClr val="accent1"/>
-          </a:fillRef>
-          <a:effectRef idx="2">
-            <a:schemeClr val="accent1"/>
-          </a:effectRef>
-          <a:fontRef idx="minor">
-            <a:schemeClr val="lt1"/>
-          </a:fontRef>
-        </p:style>
-        <p:txBody>
-          <a:bodyPr rtlCol="0" anchor="ctr"/>
-          <a:lstStyle/>
-          <a:p>
-            <a:pPr algn="ctr"/>
-            <a:endParaRPr kumimoji="1" lang="ja-JP" altLang="en-US"/>
-          </a:p>
-        </p:txBody>
-      </p:sp>
-      <p:pic>
-        <p:nvPicPr>
-          <p:cNvPr id="5122" name="Picture 2" descr="http://adammiels.com/images/codeIcon.jpg"/>
-          <p:cNvPicPr>
-            <a:picLocks noChangeAspect="1" noChangeArrowheads="1"/>
-          </p:cNvPicPr>
-          <p:nvPr/>
-        </p:nvPicPr>
-        <p:blipFill>
-          <a:blip r:embed="rId2" cstate="print"/>
-          <a:srcRect/>
-          <a:stretch>
-            <a:fillRect/>
-          </a:stretch>
-        </p:blipFill>
-        <p:spPr bwMode="auto">
-          <a:xfrm>
-            <a:off x="2699792" y="3429000"/>
-            <a:ext cx="1386249" cy="1296144"/>
-          </a:xfrm>
-          <a:prstGeom prst="rect">
-            <a:avLst/>
-          </a:prstGeom>
-          <a:noFill/>
-        </p:spPr>
-      </p:pic>
-      <p:sp>
-        <p:nvSpPr>
-          <p:cNvPr id="10" name="正方形/長方形 9"/>
-          <p:cNvSpPr/>
-          <p:nvPr/>
-        </p:nvSpPr>
-        <p:spPr>
-          <a:xfrm>
-            <a:off x="2100199" y="4725144"/>
-            <a:ext cx="2634825" cy="830997"/>
-          </a:xfrm>
-          <a:prstGeom prst="rect">
-            <a:avLst/>
-          </a:prstGeom>
-        </p:spPr>
-        <p:txBody>
-          <a:bodyPr wrap="none">
-            <a:spAutoFit/>
-          </a:bodyPr>
-          <a:lstStyle/>
-          <a:p>
-            <a:pPr algn="ctr"/>
-            <a:r>
-              <a:rPr lang="en-US" altLang="ja-JP" sz="2400" b="1" dirty="0" smtClean="0"/>
-              <a:t>Interpreter code</a:t>
-            </a:r>
-          </a:p>
-          <a:p>
-            <a:pPr algn="ctr"/>
-            <a:r>
-              <a:rPr lang="en-US" altLang="ja-JP" sz="2400" b="1" dirty="0" smtClean="0"/>
-              <a:t>Written in </a:t>
-            </a:r>
-            <a:r>
-              <a:rPr lang="en-US" altLang="ja-JP" sz="2400" b="1" dirty="0" err="1" smtClean="0">
-                <a:solidFill>
-                  <a:srgbClr val="FF0000"/>
-                </a:solidFill>
-              </a:rPr>
-              <a:t>RPython</a:t>
-            </a:r>
-            <a:endParaRPr lang="ja-JP" altLang="en-US" sz="2400" b="1" dirty="0">
-              <a:solidFill>
-                <a:srgbClr val="FF0000"/>
-              </a:solidFill>
-            </a:endParaRPr>
-          </a:p>
-        </p:txBody>
-      </p:sp>
-      <p:sp>
-        <p:nvSpPr>
-          <p:cNvPr id="11" name="直角三角形 10"/>
-          <p:cNvSpPr/>
-          <p:nvPr/>
-        </p:nvSpPr>
-        <p:spPr>
-          <a:xfrm rot="13500000">
-            <a:off x="4056959" y="3781675"/>
-            <a:ext cx="654689" cy="647451"/>
-          </a:xfrm>
-          <a:prstGeom prst="rtTriangle">
-            <a:avLst/>
-          </a:prstGeom>
-        </p:spPr>
-        <p:style>
-          <a:lnRef idx="1">
-            <a:schemeClr val="accent1"/>
-          </a:lnRef>
-          <a:fillRef idx="3">
-            <a:schemeClr val="accent1"/>
-          </a:fillRef>
-          <a:effectRef idx="2">
-            <a:schemeClr val="accent1"/>
-          </a:effectRef>
-          <a:fontRef idx="minor">
-            <a:schemeClr val="lt1"/>
-          </a:fontRef>
-        </p:style>
-        <p:txBody>
-          <a:bodyPr rtlCol="0" anchor="ctr"/>
-          <a:lstStyle/>
-          <a:p>
-            <a:pPr algn="ctr"/>
-            <a:endParaRPr kumimoji="1" lang="ja-JP" altLang="en-US"/>
-          </a:p>
-        </p:txBody>
-      </p:sp>
-      <p:pic>
-        <p:nvPicPr>
-          <p:cNvPr id="5124" name="Picture 4" descr="http://2.bp.blogspot.com/_4gR6Ggu8oHQ/TNmLArIQa0I/AAAAAAAAAKk/S86e8w4lF6g/s400/pypy.png"/>
-          <p:cNvPicPr>
-            <a:picLocks noChangeAspect="1" noChangeArrowheads="1"/>
-          </p:cNvPicPr>
-          <p:nvPr/>
-        </p:nvPicPr>
-        <p:blipFill>
-          <a:blip r:embed="rId3" cstate="print"/>
-          <a:srcRect/>
-          <a:stretch>
-            <a:fillRect/>
-          </a:stretch>
-        </p:blipFill>
-        <p:spPr bwMode="auto">
-          <a:xfrm>
-            <a:off x="5004048" y="3645024"/>
-            <a:ext cx="1318321" cy="1080120"/>
-          </a:xfrm>
-          <a:prstGeom prst="rect">
-            <a:avLst/>
-          </a:prstGeom>
-          <a:noFill/>
-        </p:spPr>
-      </p:pic>
-      <p:sp>
-        <p:nvSpPr>
-          <p:cNvPr id="13" name="正方形/長方形 12"/>
-          <p:cNvSpPr/>
-          <p:nvPr/>
-        </p:nvSpPr>
-        <p:spPr>
-          <a:xfrm>
-            <a:off x="5147065" y="4725144"/>
-            <a:ext cx="1014638" cy="584775"/>
-          </a:xfrm>
-          <a:prstGeom prst="rect">
-            <a:avLst/>
-          </a:prstGeom>
-        </p:spPr>
-        <p:txBody>
-          <a:bodyPr wrap="none">
-            <a:spAutoFit/>
-          </a:bodyPr>
-          <a:lstStyle/>
-          <a:p>
-            <a:pPr algn="ctr"/>
-            <a:r>
-              <a:rPr lang="en-US" altLang="ja-JP" sz="3200" b="1" dirty="0" err="1" smtClean="0"/>
-              <a:t>PyPy</a:t>
-            </a:r>
-            <a:endParaRPr lang="ja-JP" altLang="en-US" sz="3200" b="1" dirty="0"/>
-          </a:p>
-        </p:txBody>
-      </p:sp>
-      <p:sp>
-        <p:nvSpPr>
-          <p:cNvPr id="14" name="直角三角形 13"/>
-          <p:cNvSpPr/>
-          <p:nvPr/>
-        </p:nvSpPr>
-        <p:spPr>
-          <a:xfrm rot="11168429">
-            <a:off x="6260934" y="2598061"/>
-            <a:ext cx="654689" cy="647451"/>
-          </a:xfrm>
-          <a:prstGeom prst="rtTriangle">
-            <a:avLst/>
-          </a:prstGeom>
-        </p:spPr>
-        <p:style>
-          <a:lnRef idx="1">
-            <a:schemeClr val="accent1"/>
-          </a:lnRef>
-          <a:fillRef idx="3">
-            <a:schemeClr val="accent1"/>
-          </a:fillRef>
-          <a:effectRef idx="2">
-            <a:schemeClr val="accent1"/>
-          </a:effectRef>
-          <a:fontRef idx="minor">
-            <a:schemeClr val="lt1"/>
-          </a:fontRef>
-        </p:style>
-        <p:txBody>
-          <a:bodyPr rtlCol="0" anchor="ctr"/>
-          <a:lstStyle/>
-          <a:p>
-            <a:pPr algn="ctr"/>
-            <a:endParaRPr kumimoji="1" lang="ja-JP" altLang="en-US"/>
-          </a:p>
-        </p:txBody>
-      </p:sp>
-      <p:pic>
-        <p:nvPicPr>
-          <p:cNvPr id="5126" name="Picture 6" descr="http://icons.iconseeker.com/png/fullsize/glaze/source-c.png"/>
-          <p:cNvPicPr>
-            <a:picLocks noChangeAspect="1" noChangeArrowheads="1"/>
-          </p:cNvPicPr>
-          <p:nvPr/>
-        </p:nvPicPr>
-        <p:blipFill>
-          <a:blip r:embed="rId4" cstate="print"/>
-          <a:srcRect/>
-          <a:stretch>
-            <a:fillRect/>
-          </a:stretch>
-        </p:blipFill>
-        <p:spPr bwMode="auto">
-          <a:xfrm>
-            <a:off x="7308304" y="2060848"/>
-            <a:ext cx="1080119" cy="1080120"/>
-          </a:xfrm>
-          <a:prstGeom prst="rect">
-            <a:avLst/>
-          </a:prstGeom>
-          <a:noFill/>
-        </p:spPr>
-      </p:pic>
-      <p:pic>
-        <p:nvPicPr>
-          <p:cNvPr id="5128" name="Picture 8" descr="http://3.bp.blogspot.com/-KAtzVwSan7s/TaqHBo8usEI/AAAAAAAAErQ/f-Cow-sXgJ8/s200/sun-java6.png"/>
-          <p:cNvPicPr>
-            <a:picLocks noChangeAspect="1" noChangeArrowheads="1"/>
-          </p:cNvPicPr>
-          <p:nvPr/>
-        </p:nvPicPr>
-        <p:blipFill>
-          <a:blip r:embed="rId5" cstate="print"/>
-          <a:srcRect/>
-          <a:stretch>
-            <a:fillRect/>
-          </a:stretch>
-        </p:blipFill>
-        <p:spPr bwMode="auto">
-          <a:xfrm>
-            <a:off x="7452320" y="3789040"/>
-            <a:ext cx="864096" cy="864096"/>
-          </a:xfrm>
-          <a:prstGeom prst="rect">
-            <a:avLst/>
-          </a:prstGeom>
-          <a:noFill/>
-        </p:spPr>
-      </p:pic>
-      <p:pic>
-        <p:nvPicPr>
-          <p:cNvPr id="5130" name="Picture 10" descr="http://weblogs.sqlteam.com/images/weblogs_sqlteam_com/derekc/Windows_PowerShell_icon.png"/>
-          <p:cNvPicPr>
-            <a:picLocks noChangeAspect="1" noChangeArrowheads="1"/>
-          </p:cNvPicPr>
-          <p:nvPr/>
-        </p:nvPicPr>
-        <p:blipFill>
-          <a:blip r:embed="rId6" cstate="print"/>
-          <a:srcRect/>
-          <a:stretch>
-            <a:fillRect/>
-          </a:stretch>
-        </p:blipFill>
-        <p:spPr bwMode="auto">
-          <a:xfrm>
-            <a:off x="6876256" y="4923656"/>
-            <a:ext cx="1646312" cy="1646312"/>
-          </a:xfrm>
-          <a:prstGeom prst="rect">
-            <a:avLst/>
-          </a:prstGeom>
-          <a:noFill/>
-        </p:spPr>
-      </p:pic>
-      <p:sp>
-        <p:nvSpPr>
-          <p:cNvPr id="20" name="直角三角形 19"/>
-          <p:cNvSpPr/>
-          <p:nvPr/>
-        </p:nvSpPr>
-        <p:spPr>
-          <a:xfrm rot="13500000">
-            <a:off x="6577240" y="3925691"/>
-            <a:ext cx="654689" cy="647451"/>
-          </a:xfrm>
-          <a:prstGeom prst="rtTriangle">
-            <a:avLst/>
-          </a:prstGeom>
-        </p:spPr>
-        <p:style>
-          <a:lnRef idx="1">
-            <a:schemeClr val="accent1"/>
-          </a:lnRef>
-          <a:fillRef idx="3">
-            <a:schemeClr val="accent1"/>
-          </a:fillRef>
-          <a:effectRef idx="2">
-            <a:schemeClr val="accent1"/>
-          </a:effectRef>
-          <a:fontRef idx="minor">
-            <a:schemeClr val="lt1"/>
-          </a:fontRef>
-        </p:style>
-        <p:txBody>
-          <a:bodyPr rtlCol="0" anchor="ctr"/>
-          <a:lstStyle/>
-          <a:p>
-            <a:pPr algn="ctr"/>
-            <a:endParaRPr kumimoji="1" lang="ja-JP" altLang="en-US"/>
-          </a:p>
-        </p:txBody>
-      </p:sp>
-      <p:sp>
-        <p:nvSpPr>
-          <p:cNvPr id="21" name="直角三角形 20"/>
-          <p:cNvSpPr/>
-          <p:nvPr/>
-        </p:nvSpPr>
-        <p:spPr>
-          <a:xfrm rot="15300000">
-            <a:off x="6082233" y="5233444"/>
-            <a:ext cx="654689" cy="647451"/>
-          </a:xfrm>
-          <a:prstGeom prst="rtTriangle">
-            <a:avLst/>
-          </a:prstGeom>
-        </p:spPr>
-        <p:style>
-          <a:lnRef idx="1">
-            <a:schemeClr val="accent1"/>
-          </a:lnRef>
-          <a:fillRef idx="3">
-            <a:schemeClr val="accent1"/>
-          </a:fillRef>
-          <a:effectRef idx="2">
-            <a:schemeClr val="accent1"/>
-          </a:effectRef>
-          <a:fontRef idx="minor">
-            <a:schemeClr val="lt1"/>
-          </a:fontRef>
-        </p:style>
-        <p:txBody>
-          <a:bodyPr rtlCol="0" anchor="ctr"/>
-          <a:lstStyle/>
-          <a:p>
-            <a:pPr algn="ctr"/>
-            <a:endParaRPr kumimoji="1" lang="ja-JP" altLang="en-US"/>
-          </a:p>
-        </p:txBody>
-      </p:sp>
-      <p:sp>
-        <p:nvSpPr>
-          <p:cNvPr id="22" name="正方形/長方形 21"/>
-          <p:cNvSpPr/>
-          <p:nvPr/>
-        </p:nvSpPr>
-        <p:spPr>
-          <a:xfrm>
-            <a:off x="6982352" y="2996952"/>
-            <a:ext cx="1810560" cy="584775"/>
-          </a:xfrm>
-          <a:prstGeom prst="rect">
-            <a:avLst/>
-          </a:prstGeom>
-        </p:spPr>
-        <p:txBody>
-          <a:bodyPr wrap="none">
-            <a:spAutoFit/>
-          </a:bodyPr>
-          <a:lstStyle/>
-          <a:p>
-            <a:pPr algn="ctr"/>
-            <a:r>
-              <a:rPr lang="en-US" altLang="ja-JP" sz="3200" b="1" dirty="0" smtClean="0"/>
-              <a:t>C (native)</a:t>
-            </a:r>
-            <a:endParaRPr lang="ja-JP" altLang="en-US" sz="3200" b="1" dirty="0"/>
-          </a:p>
-        </p:txBody>
-      </p:sp>
-      <p:sp>
-        <p:nvSpPr>
-          <p:cNvPr id="23" name="正方形/長方形 22"/>
-          <p:cNvSpPr/>
-          <p:nvPr/>
-        </p:nvSpPr>
-        <p:spPr>
-          <a:xfrm>
-            <a:off x="7380312" y="4509120"/>
-            <a:ext cx="906980" cy="584775"/>
-          </a:xfrm>
-          <a:prstGeom prst="rect">
-            <a:avLst/>
-          </a:prstGeom>
-        </p:spPr>
-        <p:txBody>
-          <a:bodyPr wrap="none">
-            <a:spAutoFit/>
-          </a:bodyPr>
-          <a:lstStyle/>
-          <a:p>
-            <a:pPr algn="ctr"/>
-            <a:r>
-              <a:rPr lang="en-US" altLang="ja-JP" sz="3200" b="1" dirty="0" smtClean="0"/>
-              <a:t>Java</a:t>
-            </a:r>
-            <a:endParaRPr lang="ja-JP" altLang="en-US" sz="3200" b="1" dirty="0"/>
-          </a:p>
-        </p:txBody>
-      </p:sp>
-      <p:sp>
-        <p:nvSpPr>
-          <p:cNvPr id="24" name="正方形/長方形 23"/>
-          <p:cNvSpPr/>
-          <p:nvPr/>
-        </p:nvSpPr>
-        <p:spPr>
-          <a:xfrm>
-            <a:off x="7347385" y="6156593"/>
-            <a:ext cx="684803" cy="584775"/>
-          </a:xfrm>
-          <a:prstGeom prst="rect">
-            <a:avLst/>
-          </a:prstGeom>
-        </p:spPr>
-        <p:txBody>
-          <a:bodyPr wrap="none">
-            <a:spAutoFit/>
-          </a:bodyPr>
-          <a:lstStyle/>
-          <a:p>
-            <a:pPr algn="ctr"/>
-            <a:r>
-              <a:rPr lang="en-US" altLang="ja-JP" sz="3200" b="1" dirty="0" smtClean="0"/>
-              <a:t>CLI</a:t>
-            </a:r>
-            <a:endParaRPr lang="ja-JP" altLang="en-US" sz="3200" b="1" dirty="0"/>
-          </a:p>
-        </p:txBody>
-      </p:sp>
-    </p:spTree>
-    <p:extLst>
-      <p:ext uri="{BB962C8B-B14F-4D97-AF65-F5344CB8AC3E}">
-        <p14:creationId xmlns:p14="http://schemas.microsoft.com/office/powerpoint/2010/main" xmlns="" val="2694297918"/>
+        <p14:creationId xmlns:p14="http://schemas.microsoft.com/office/powerpoint/2010/main" val="210483112"/>
       </p:ext>
     </p:extLst>
   </p:cSld>
@@ -6262,22 +7605,27 @@
             <p:ph type="title"/>
           </p:nvPr>
         </p:nvSpPr>
-        <p:spPr/>
+        <p:spPr>
+          <a:xfrm>
+            <a:off x="457200" y="-171400"/>
+            <a:ext cx="8229600" cy="1143000"/>
+          </a:xfrm>
+        </p:spPr>
         <p:txBody>
           <a:bodyPr/>
           <a:lstStyle/>
           <a:p>
             <a:r>
               <a:rPr kumimoji="1" lang="en-US" altLang="ja-JP" dirty="0" smtClean="0"/>
-              <a:t>What is </a:t>
+              <a:t>Principle what </a:t>
             </a:r>
             <a:r>
               <a:rPr kumimoji="1" lang="en-US" altLang="ja-JP" dirty="0" err="1" smtClean="0"/>
-              <a:t>RPython</a:t>
+              <a:t>PyPy</a:t>
             </a:r>
             <a:r>
               <a:rPr kumimoji="1" lang="en-US" altLang="ja-JP" dirty="0" smtClean="0"/>
-              <a:t>?</a:t>
+              <a:t> do</a:t>
             </a:r>
             <a:endParaRPr kumimoji="1" lang="ja-JP" altLang="en-US" dirty="0"/>
           </a:p>
@@ -6285,7 +7633,7 @@
       </p:sp>
       <p:sp>
         <p:nvSpPr>
-          <p:cNvPr id="3" name="コンテンツ プレースホルダ 2"/>
+          <p:cNvPr id="3" name="コンテンツ プレースホルダー 2"/>
           <p:cNvSpPr>
             <a:spLocks noGrp="1"/>
           </p:cNvSpPr>
@@ -6295,208 +7643,187 @@
         </p:nvSpPr>
         <p:spPr>
           <a:xfrm>
-            <a:off x="395536" y="1268760"/>
-            <a:ext cx="8229600" cy="604664"/>
-          </a:xfrm>
-        </p:spPr>
-        <p:txBody>
-          <a:bodyPr/>
-          <a:lstStyle/>
-          <a:p>
-            <a:r>
-              <a:rPr kumimoji="1" lang="en-US" altLang="ja-JP" dirty="0" smtClean="0"/>
-              <a:t>It is abbreviate for </a:t>
-            </a:r>
-            <a:r>
-              <a:rPr kumimoji="1" lang="en-US" altLang="ja-JP" b="1" dirty="0" smtClean="0">
-                <a:solidFill>
-                  <a:srgbClr val="FF0000"/>
-                </a:solidFill>
-              </a:rPr>
-              <a:t>R</a:t>
-            </a:r>
-            <a:r>
-              <a:rPr kumimoji="1" lang="en-US" altLang="ja-JP" dirty="0" smtClean="0"/>
-              <a:t>estricted subset </a:t>
-            </a:r>
-            <a:r>
-              <a:rPr lang="en-US" altLang="ja-JP" dirty="0" smtClean="0"/>
-              <a:t>of </a:t>
-            </a:r>
-            <a:r>
-              <a:rPr kumimoji="1" lang="en-US" altLang="ja-JP" b="1" dirty="0" smtClean="0">
-                <a:solidFill>
-                  <a:srgbClr val="FF0000"/>
-                </a:solidFill>
-              </a:rPr>
-              <a:t>Python</a:t>
-            </a:r>
-            <a:endParaRPr kumimoji="1" lang="ja-JP" altLang="en-US" b="1" dirty="0">
-              <a:solidFill>
-                <a:srgbClr val="FF0000"/>
-              </a:solidFill>
-            </a:endParaRPr>
-          </a:p>
-        </p:txBody>
-      </p:sp>
-      <p:sp>
-        <p:nvSpPr>
-          <p:cNvPr id="4" name="テキスト ボックス 3"/>
-          <p:cNvSpPr txBox="1"/>
-          <p:nvPr/>
-        </p:nvSpPr>
-        <p:spPr>
-          <a:xfrm>
-            <a:off x="2497757" y="1700808"/>
-            <a:ext cx="6646243" cy="523220"/>
-          </a:xfrm>
-          <a:prstGeom prst="rect">
-            <a:avLst/>
-          </a:prstGeom>
-          <a:noFill/>
-        </p:spPr>
-        <p:txBody>
-          <a:bodyPr wrap="none" rtlCol="0">
-            <a:spAutoFit/>
-          </a:bodyPr>
-          <a:lstStyle/>
-          <a:p>
-            <a:r>
-              <a:rPr kumimoji="1" lang="en-US" altLang="ja-JP" sz="2800" dirty="0" smtClean="0">
-                <a:solidFill>
-                  <a:srgbClr val="FF0000"/>
-                </a:solidFill>
-              </a:rPr>
-              <a:t>( Original Python : too dynamic to translate )</a:t>
-            </a:r>
-            <a:endParaRPr kumimoji="1" lang="ja-JP" altLang="en-US" sz="2800" dirty="0">
-              <a:solidFill>
-                <a:srgbClr val="FF0000"/>
-              </a:solidFill>
-            </a:endParaRPr>
-          </a:p>
-        </p:txBody>
-      </p:sp>
-      <p:sp>
-        <p:nvSpPr>
-          <p:cNvPr id="6" name="テキスト ボックス 5"/>
-          <p:cNvSpPr txBox="1"/>
-          <p:nvPr/>
-        </p:nvSpPr>
-        <p:spPr>
-          <a:xfrm>
-            <a:off x="395536" y="2492896"/>
-            <a:ext cx="8407943" cy="1815882"/>
-          </a:xfrm>
-          <a:prstGeom prst="rect">
-            <a:avLst/>
-          </a:prstGeom>
+            <a:off x="467544" y="764704"/>
+            <a:ext cx="8229600" cy="1080120"/>
+          </a:xfrm>
         </p:spPr>
         <p:style>
           <a:lnRef idx="2">
-            <a:schemeClr val="accent1"/>
+            <a:schemeClr val="accent2"/>
           </a:lnRef>
           <a:fillRef idx="1">
             <a:schemeClr val="lt1"/>
           </a:fillRef>
           <a:effectRef idx="0">
-            <a:schemeClr val="accent1"/>
+            <a:schemeClr val="accent2"/>
           </a:effectRef>
           <a:fontRef idx="minor">
             <a:schemeClr val="dk1"/>
           </a:fontRef>
         </p:style>
         <p:txBody>
+          <a:bodyPr>
+            <a:noAutofit/>
+          </a:bodyPr>
+          <a:lstStyle/>
+          <a:p>
+            <a:pPr algn="ctr">
+              <a:buNone/>
+            </a:pPr>
+            <a:r>
+              <a:rPr kumimoji="1" lang="en-US" altLang="ja-JP" sz="3600" b="1" dirty="0" smtClean="0"/>
+              <a:t>Toolkit to translate interpreter written in </a:t>
+            </a:r>
+            <a:r>
+              <a:rPr kumimoji="1" lang="en-US" altLang="ja-JP" sz="3600" b="1" dirty="0" err="1" smtClean="0"/>
+              <a:t>RPython</a:t>
+            </a:r>
+            <a:r>
+              <a:rPr kumimoji="1" lang="en-US" altLang="ja-JP" sz="3600" b="1" dirty="0" smtClean="0"/>
+              <a:t> to other </a:t>
+            </a:r>
+            <a:r>
+              <a:rPr kumimoji="1" lang="en-US" altLang="ja-JP" sz="3600" b="1" dirty="0" err="1" smtClean="0"/>
+              <a:t>backends</a:t>
+            </a:r>
+            <a:r>
+              <a:rPr kumimoji="1" lang="en-US" altLang="ja-JP" sz="3600" b="1" dirty="0" smtClean="0"/>
+              <a:t>(C/CLI/Java..)</a:t>
+            </a:r>
+            <a:endParaRPr kumimoji="1" lang="ja-JP" altLang="en-US" sz="3600" b="1" dirty="0"/>
+          </a:p>
+        </p:txBody>
+      </p:sp>
+      <p:sp>
+        <p:nvSpPr>
+          <p:cNvPr id="4" name="円/楕円 3"/>
+          <p:cNvSpPr/>
+          <p:nvPr/>
+        </p:nvSpPr>
+        <p:spPr>
+          <a:xfrm>
+            <a:off x="858648" y="3429000"/>
+            <a:ext cx="576064" cy="576064"/>
+          </a:xfrm>
+          <a:prstGeom prst="ellipse">
+            <a:avLst/>
+          </a:prstGeom>
+        </p:spPr>
+        <p:style>
+          <a:lnRef idx="2">
+            <a:schemeClr val="dk1"/>
+          </a:lnRef>
+          <a:fillRef idx="1">
+            <a:schemeClr val="lt1"/>
+          </a:fillRef>
+          <a:effectRef idx="0">
+            <a:schemeClr val="dk1"/>
+          </a:effectRef>
+          <a:fontRef idx="minor">
+            <a:schemeClr val="dk1"/>
+          </a:fontRef>
+        </p:style>
+        <p:txBody>
+          <a:bodyPr rtlCol="0" anchor="ctr"/>
+          <a:lstStyle/>
+          <a:p>
+            <a:pPr algn="ctr"/>
+            <a:endParaRPr kumimoji="1" lang="ja-JP" altLang="en-US"/>
+          </a:p>
+        </p:txBody>
+      </p:sp>
+      <p:sp>
+        <p:nvSpPr>
+          <p:cNvPr id="6" name="フローチャート: 手作業 5"/>
+          <p:cNvSpPr/>
+          <p:nvPr/>
+        </p:nvSpPr>
+        <p:spPr>
+          <a:xfrm flipV="1">
+            <a:off x="827584" y="4005064"/>
+            <a:ext cx="648072" cy="648072"/>
+          </a:xfrm>
+          <a:prstGeom prst="flowChartManualOperation">
+            <a:avLst/>
+          </a:prstGeom>
+        </p:spPr>
+        <p:style>
+          <a:lnRef idx="2">
+            <a:schemeClr val="dk1"/>
+          </a:lnRef>
+          <a:fillRef idx="1">
+            <a:schemeClr val="lt1"/>
+          </a:fillRef>
+          <a:effectRef idx="0">
+            <a:schemeClr val="dk1"/>
+          </a:effectRef>
+          <a:fontRef idx="minor">
+            <a:schemeClr val="dk1"/>
+          </a:fontRef>
+        </p:style>
+        <p:txBody>
+          <a:bodyPr rtlCol="0" anchor="ctr"/>
+          <a:lstStyle/>
+          <a:p>
+            <a:pPr algn="ctr"/>
+            <a:endParaRPr kumimoji="1" lang="ja-JP" altLang="en-US"/>
+          </a:p>
+        </p:txBody>
+      </p:sp>
+      <p:sp>
+        <p:nvSpPr>
+          <p:cNvPr id="7" name="テキスト ボックス 6"/>
+          <p:cNvSpPr txBox="1"/>
+          <p:nvPr/>
+        </p:nvSpPr>
+        <p:spPr>
+          <a:xfrm>
+            <a:off x="323528" y="4653136"/>
+            <a:ext cx="1848326" cy="461665"/>
+          </a:xfrm>
+          <a:prstGeom prst="rect">
+            <a:avLst/>
+          </a:prstGeom>
+          <a:noFill/>
+        </p:spPr>
+        <p:txBody>
           <a:bodyPr wrap="none" rtlCol="0">
             <a:spAutoFit/>
           </a:bodyPr>
           <a:lstStyle/>
           <a:p>
-            <a:pPr>
-              <a:buFont typeface="Arial" pitchFamily="34" charset="0"/>
-              <a:buChar char="•"/>
-            </a:pPr>
-            <a:r>
-              <a:rPr lang="en-US" altLang="ja-JP" sz="2800" dirty="0" smtClean="0"/>
-              <a:t> </a:t>
-            </a:r>
-            <a:r>
-              <a:rPr lang="en-US" altLang="ja-JP" sz="2800" dirty="0" smtClean="0"/>
-              <a:t>Only single inheritance is allowed</a:t>
-            </a:r>
-          </a:p>
-          <a:p>
-            <a:pPr>
-              <a:buFont typeface="Arial" pitchFamily="34" charset="0"/>
-              <a:buChar char="•"/>
-            </a:pPr>
-            <a:r>
-              <a:rPr kumimoji="1" lang="en-US" altLang="ja-JP" sz="2800" dirty="0" smtClean="0"/>
-              <a:t> </a:t>
-            </a:r>
-            <a:r>
-              <a:rPr kumimoji="1" lang="en-US" altLang="ja-JP" sz="2800" dirty="0" smtClean="0"/>
-              <a:t>“</a:t>
-            </a:r>
-            <a:r>
-              <a:rPr lang="en-US" altLang="ja-JP" sz="2800" dirty="0" smtClean="0"/>
-              <a:t>For loop” only supports built-in type</a:t>
-            </a:r>
-          </a:p>
-          <a:p>
-            <a:pPr>
-              <a:buFont typeface="Arial" pitchFamily="34" charset="0"/>
-              <a:buChar char="•"/>
-            </a:pPr>
-            <a:r>
-              <a:rPr kumimoji="1" lang="en-US" altLang="ja-JP" sz="2800" dirty="0" smtClean="0"/>
-              <a:t> </a:t>
-            </a:r>
-            <a:r>
-              <a:rPr lang="en-US" altLang="ja-JP" sz="2800" dirty="0" smtClean="0"/>
-              <a:t>Generator is supported, but exact scope is  very limited</a:t>
-            </a:r>
-          </a:p>
-          <a:p>
-            <a:pPr>
-              <a:buFont typeface="Arial" pitchFamily="34" charset="0"/>
-              <a:buChar char="•"/>
-            </a:pPr>
-            <a:r>
-              <a:rPr lang="en-US" altLang="ja-JP" sz="2800" dirty="0" smtClean="0"/>
-              <a:t> </a:t>
-            </a:r>
-            <a:r>
-              <a:rPr lang="en-US" altLang="ja-JP" sz="2800" dirty="0" smtClean="0"/>
-              <a:t>Dynamic dispatch to class is not supported</a:t>
-            </a:r>
-          </a:p>
-        </p:txBody>
-      </p:sp>
-      <p:sp>
-        <p:nvSpPr>
-          <p:cNvPr id="8" name="下矢印 7"/>
+            <a:r>
+              <a:rPr kumimoji="1" lang="en-US" altLang="ja-JP" sz="2400" b="1" dirty="0" smtClean="0"/>
+              <a:t>Implementer</a:t>
+            </a:r>
+            <a:endParaRPr kumimoji="1" lang="ja-JP" altLang="en-US" sz="2400" b="1" dirty="0"/>
+          </a:p>
+        </p:txBody>
+      </p:sp>
+      <p:sp>
+        <p:nvSpPr>
+          <p:cNvPr id="8" name="直角三角形 7"/>
           <p:cNvSpPr/>
           <p:nvPr/>
         </p:nvSpPr>
         <p:spPr>
-          <a:xfrm>
-            <a:off x="2303748" y="4509120"/>
-            <a:ext cx="4536504" cy="504056"/>
-          </a:xfrm>
-          <a:prstGeom prst="downArrow">
+          <a:xfrm rot="13500000">
+            <a:off x="1680695" y="3781674"/>
+            <a:ext cx="654689" cy="647451"/>
+          </a:xfrm>
+          <a:prstGeom prst="rtTriangle">
             <a:avLst/>
           </a:prstGeom>
         </p:spPr>
         <p:style>
           <a:lnRef idx="1">
-            <a:schemeClr val="dk1"/>
+            <a:schemeClr val="accent1"/>
           </a:lnRef>
           <a:fillRef idx="3">
-            <a:schemeClr val="dk1"/>
+            <a:schemeClr val="accent1"/>
           </a:fillRef>
           <a:effectRef idx="2">
-            <a:schemeClr val="dk1"/>
+            <a:schemeClr val="accent1"/>
           </a:effectRef>
           <a:fontRef idx="minor">
             <a:schemeClr val="lt1"/>
@@ -6511,43 +7838,463 @@
           </a:p>
         </p:txBody>
       </p:sp>
-      <p:sp>
-        <p:nvSpPr>
-          <p:cNvPr id="9" name="テキスト ボックス 8"/>
-          <p:cNvSpPr txBox="1"/>
+      <p:pic>
+        <p:nvPicPr>
+          <p:cNvPr id="5122" name="Picture 2" descr="http://adammiels.com/images/codeIcon.jpg"/>
+          <p:cNvPicPr>
+            <a:picLocks noChangeAspect="1" noChangeArrowheads="1"/>
+          </p:cNvPicPr>
           <p:nvPr/>
-        </p:nvSpPr>
-        <p:spPr>
-          <a:xfrm>
-            <a:off x="1187624" y="5589240"/>
-            <a:ext cx="3534878" cy="646331"/>
+        </p:nvPicPr>
+        <p:blipFill>
+          <a:blip r:embed="rId2" cstate="print"/>
+          <a:srcRect/>
+          <a:stretch>
+            <a:fillRect/>
+          </a:stretch>
+        </p:blipFill>
+        <p:spPr bwMode="auto">
+          <a:xfrm>
+            <a:off x="2699792" y="3429000"/>
+            <a:ext cx="1386249" cy="1296144"/>
           </a:xfrm>
           <a:prstGeom prst="rect">
             <a:avLst/>
           </a:prstGeom>
           <a:noFill/>
         </p:spPr>
-        <p:txBody>
-          <a:bodyPr wrap="none" rtlCol="0">
+      </p:pic>
+      <p:sp>
+        <p:nvSpPr>
+          <p:cNvPr id="10" name="正方形/長方形 9"/>
+          <p:cNvSpPr/>
+          <p:nvPr/>
+        </p:nvSpPr>
+        <p:spPr>
+          <a:xfrm>
+            <a:off x="2100199" y="4725144"/>
+            <a:ext cx="2634825" cy="830997"/>
+          </a:xfrm>
+          <a:prstGeom prst="rect">
+            <a:avLst/>
+          </a:prstGeom>
+        </p:spPr>
+        <p:txBody>
+          <a:bodyPr wrap="none">
             <a:spAutoFit/>
           </a:bodyPr>
           <a:lstStyle/>
           <a:p>
-            <a:r>
-              <a:rPr kumimoji="1" lang="en-US" altLang="ja-JP" dirty="0" smtClean="0"/>
-              <a:t>These are required to static analysis</a:t>
-            </a:r>
-          </a:p>
-          <a:p>
-            <a:r>
-              <a:rPr lang="en-US" altLang="ja-JP" dirty="0" smtClean="0"/>
-              <a:t>(it is for </a:t>
-            </a:r>
-            <a:endParaRPr kumimoji="1" lang="ja-JP" altLang="en-US" dirty="0"/>
+            <a:pPr algn="ctr"/>
+            <a:r>
+              <a:rPr lang="en-US" altLang="ja-JP" sz="2400" b="1" dirty="0" smtClean="0"/>
+              <a:t>Interpreter code</a:t>
+            </a:r>
+          </a:p>
+          <a:p>
+            <a:pPr algn="ctr"/>
+            <a:r>
+              <a:rPr lang="en-US" altLang="ja-JP" sz="2400" b="1" dirty="0" smtClean="0"/>
+              <a:t>Written in </a:t>
+            </a:r>
+            <a:r>
+              <a:rPr lang="en-US" altLang="ja-JP" sz="2400" b="1" dirty="0" err="1" smtClean="0">
+                <a:solidFill>
+                  <a:srgbClr val="FF0000"/>
+                </a:solidFill>
+              </a:rPr>
+              <a:t>RPython</a:t>
+            </a:r>
+            <a:endParaRPr lang="ja-JP" altLang="en-US" sz="2400" b="1" dirty="0">
+              <a:solidFill>
+                <a:srgbClr val="FF0000"/>
+              </a:solidFill>
+            </a:endParaRPr>
+          </a:p>
+        </p:txBody>
+      </p:sp>
+      <p:sp>
+        <p:nvSpPr>
+          <p:cNvPr id="11" name="直角三角形 10"/>
+          <p:cNvSpPr/>
+          <p:nvPr/>
+        </p:nvSpPr>
+        <p:spPr>
+          <a:xfrm rot="13500000">
+            <a:off x="4056959" y="3781675"/>
+            <a:ext cx="654689" cy="647451"/>
+          </a:xfrm>
+          <a:prstGeom prst="rtTriangle">
+            <a:avLst/>
+          </a:prstGeom>
+        </p:spPr>
+        <p:style>
+          <a:lnRef idx="1">
+            <a:schemeClr val="accent1"/>
+          </a:lnRef>
+          <a:fillRef idx="3">
+            <a:schemeClr val="accent1"/>
+          </a:fillRef>
+          <a:effectRef idx="2">
+            <a:schemeClr val="accent1"/>
+          </a:effectRef>
+          <a:fontRef idx="minor">
+            <a:schemeClr val="lt1"/>
+          </a:fontRef>
+        </p:style>
+        <p:txBody>
+          <a:bodyPr rtlCol="0" anchor="ctr"/>
+          <a:lstStyle/>
+          <a:p>
+            <a:pPr algn="ctr"/>
+            <a:endParaRPr kumimoji="1" lang="ja-JP" altLang="en-US"/>
+          </a:p>
+        </p:txBody>
+      </p:sp>
+      <p:pic>
+        <p:nvPicPr>
+          <p:cNvPr id="5124" name="Picture 4" descr="http://2.bp.blogspot.com/_4gR6Ggu8oHQ/TNmLArIQa0I/AAAAAAAAAKk/S86e8w4lF6g/s400/pypy.png"/>
+          <p:cNvPicPr>
+            <a:picLocks noChangeAspect="1" noChangeArrowheads="1"/>
+          </p:cNvPicPr>
+          <p:nvPr/>
+        </p:nvPicPr>
+        <p:blipFill>
+          <a:blip r:embed="rId3" cstate="print"/>
+          <a:srcRect/>
+          <a:stretch>
+            <a:fillRect/>
+          </a:stretch>
+        </p:blipFill>
+        <p:spPr bwMode="auto">
+          <a:xfrm>
+            <a:off x="5004048" y="3645024"/>
+            <a:ext cx="1318321" cy="1080120"/>
+          </a:xfrm>
+          <a:prstGeom prst="rect">
+            <a:avLst/>
+          </a:prstGeom>
+          <a:noFill/>
+        </p:spPr>
+      </p:pic>
+      <p:sp>
+        <p:nvSpPr>
+          <p:cNvPr id="13" name="正方形/長方形 12"/>
+          <p:cNvSpPr/>
+          <p:nvPr/>
+        </p:nvSpPr>
+        <p:spPr>
+          <a:xfrm>
+            <a:off x="5147065" y="4725144"/>
+            <a:ext cx="1014638" cy="584775"/>
+          </a:xfrm>
+          <a:prstGeom prst="rect">
+            <a:avLst/>
+          </a:prstGeom>
+        </p:spPr>
+        <p:txBody>
+          <a:bodyPr wrap="none">
+            <a:spAutoFit/>
+          </a:bodyPr>
+          <a:lstStyle/>
+          <a:p>
+            <a:pPr algn="ctr"/>
+            <a:r>
+              <a:rPr lang="en-US" altLang="ja-JP" sz="3200" b="1" dirty="0" err="1" smtClean="0"/>
+              <a:t>PyPy</a:t>
+            </a:r>
+            <a:endParaRPr lang="ja-JP" altLang="en-US" sz="3200" b="1" dirty="0"/>
+          </a:p>
+        </p:txBody>
+      </p:sp>
+      <p:sp>
+        <p:nvSpPr>
+          <p:cNvPr id="14" name="直角三角形 13"/>
+          <p:cNvSpPr/>
+          <p:nvPr/>
+        </p:nvSpPr>
+        <p:spPr>
+          <a:xfrm rot="11168429">
+            <a:off x="6260934" y="2598061"/>
+            <a:ext cx="654689" cy="647451"/>
+          </a:xfrm>
+          <a:prstGeom prst="rtTriangle">
+            <a:avLst/>
+          </a:prstGeom>
+        </p:spPr>
+        <p:style>
+          <a:lnRef idx="1">
+            <a:schemeClr val="accent1"/>
+          </a:lnRef>
+          <a:fillRef idx="3">
+            <a:schemeClr val="accent1"/>
+          </a:fillRef>
+          <a:effectRef idx="2">
+            <a:schemeClr val="accent1"/>
+          </a:effectRef>
+          <a:fontRef idx="minor">
+            <a:schemeClr val="lt1"/>
+          </a:fontRef>
+        </p:style>
+        <p:txBody>
+          <a:bodyPr rtlCol="0" anchor="ctr"/>
+          <a:lstStyle/>
+          <a:p>
+            <a:pPr algn="ctr"/>
+            <a:endParaRPr kumimoji="1" lang="ja-JP" altLang="en-US"/>
+          </a:p>
+        </p:txBody>
+      </p:sp>
+      <p:pic>
+        <p:nvPicPr>
+          <p:cNvPr id="5126" name="Picture 6" descr="http://icons.iconseeker.com/png/fullsize/glaze/source-c.png"/>
+          <p:cNvPicPr>
+            <a:picLocks noChangeAspect="1" noChangeArrowheads="1"/>
+          </p:cNvPicPr>
+          <p:nvPr/>
+        </p:nvPicPr>
+        <p:blipFill>
+          <a:blip r:embed="rId4" cstate="print"/>
+          <a:srcRect/>
+          <a:stretch>
+            <a:fillRect/>
+          </a:stretch>
+        </p:blipFill>
+        <p:spPr bwMode="auto">
+          <a:xfrm>
+            <a:off x="7308304" y="2060848"/>
+            <a:ext cx="1080119" cy="1080120"/>
+          </a:xfrm>
+          <a:prstGeom prst="rect">
+            <a:avLst/>
+          </a:prstGeom>
+          <a:noFill/>
+        </p:spPr>
+      </p:pic>
+      <p:pic>
+        <p:nvPicPr>
+          <p:cNvPr id="5128" name="Picture 8" descr="http://3.bp.blogspot.com/-KAtzVwSan7s/TaqHBo8usEI/AAAAAAAAErQ/f-Cow-sXgJ8/s200/sun-java6.png"/>
+          <p:cNvPicPr>
+            <a:picLocks noChangeAspect="1" noChangeArrowheads="1"/>
+          </p:cNvPicPr>
+          <p:nvPr/>
+        </p:nvPicPr>
+        <p:blipFill>
+          <a:blip r:embed="rId5" cstate="print"/>
+          <a:srcRect/>
+          <a:stretch>
+            <a:fillRect/>
+          </a:stretch>
+        </p:blipFill>
+        <p:spPr bwMode="auto">
+          <a:xfrm>
+            <a:off x="7452320" y="3789040"/>
+            <a:ext cx="864096" cy="864096"/>
+          </a:xfrm>
+          <a:prstGeom prst="rect">
+            <a:avLst/>
+          </a:prstGeom>
+          <a:noFill/>
+        </p:spPr>
+      </p:pic>
+      <p:pic>
+        <p:nvPicPr>
+          <p:cNvPr id="5130" name="Picture 10" descr="http://weblogs.sqlteam.com/images/weblogs_sqlteam_com/derekc/Windows_PowerShell_icon.png"/>
+          <p:cNvPicPr>
+            <a:picLocks noChangeAspect="1" noChangeArrowheads="1"/>
+          </p:cNvPicPr>
+          <p:nvPr/>
+        </p:nvPicPr>
+        <p:blipFill>
+          <a:blip r:embed="rId6" cstate="print"/>
+          <a:srcRect/>
+          <a:stretch>
+            <a:fillRect/>
+          </a:stretch>
+        </p:blipFill>
+        <p:spPr bwMode="auto">
+          <a:xfrm>
+            <a:off x="6876256" y="4923656"/>
+            <a:ext cx="1646312" cy="1646312"/>
+          </a:xfrm>
+          <a:prstGeom prst="rect">
+            <a:avLst/>
+          </a:prstGeom>
+          <a:noFill/>
+        </p:spPr>
+      </p:pic>
+      <p:sp>
+        <p:nvSpPr>
+          <p:cNvPr id="20" name="直角三角形 19"/>
+          <p:cNvSpPr/>
+          <p:nvPr/>
+        </p:nvSpPr>
+        <p:spPr>
+          <a:xfrm rot="13500000">
+            <a:off x="6577240" y="3925691"/>
+            <a:ext cx="654689" cy="647451"/>
+          </a:xfrm>
+          <a:prstGeom prst="rtTriangle">
+            <a:avLst/>
+          </a:prstGeom>
+        </p:spPr>
+        <p:style>
+          <a:lnRef idx="1">
+            <a:schemeClr val="accent1"/>
+          </a:lnRef>
+          <a:fillRef idx="3">
+            <a:schemeClr val="accent1"/>
+          </a:fillRef>
+          <a:effectRef idx="2">
+            <a:schemeClr val="accent1"/>
+          </a:effectRef>
+          <a:fontRef idx="minor">
+            <a:schemeClr val="lt1"/>
+          </a:fontRef>
+        </p:style>
+        <p:txBody>
+          <a:bodyPr rtlCol="0" anchor="ctr"/>
+          <a:lstStyle/>
+          <a:p>
+            <a:pPr algn="ctr"/>
+            <a:endParaRPr kumimoji="1" lang="ja-JP" altLang="en-US"/>
+          </a:p>
+        </p:txBody>
+      </p:sp>
+      <p:sp>
+        <p:nvSpPr>
+          <p:cNvPr id="21" name="直角三角形 20"/>
+          <p:cNvSpPr/>
+          <p:nvPr/>
+        </p:nvSpPr>
+        <p:spPr>
+          <a:xfrm rot="15300000">
+            <a:off x="6082233" y="5233444"/>
+            <a:ext cx="654689" cy="647451"/>
+          </a:xfrm>
+          <a:prstGeom prst="rtTriangle">
+            <a:avLst/>
+          </a:prstGeom>
+        </p:spPr>
+        <p:style>
+          <a:lnRef idx="1">
+            <a:schemeClr val="accent1"/>
+          </a:lnRef>
+          <a:fillRef idx="3">
+            <a:schemeClr val="accent1"/>
+          </a:fillRef>
+          <a:effectRef idx="2">
+            <a:schemeClr val="accent1"/>
+          </a:effectRef>
+          <a:fontRef idx="minor">
+            <a:schemeClr val="lt1"/>
+          </a:fontRef>
+        </p:style>
+        <p:txBody>
+          <a:bodyPr rtlCol="0" anchor="ctr"/>
+          <a:lstStyle/>
+          <a:p>
+            <a:pPr algn="ctr"/>
+            <a:endParaRPr kumimoji="1" lang="ja-JP" altLang="en-US"/>
+          </a:p>
+        </p:txBody>
+      </p:sp>
+      <p:sp>
+        <p:nvSpPr>
+          <p:cNvPr id="22" name="正方形/長方形 21"/>
+          <p:cNvSpPr/>
+          <p:nvPr/>
+        </p:nvSpPr>
+        <p:spPr>
+          <a:xfrm>
+            <a:off x="6982352" y="2996952"/>
+            <a:ext cx="1810560" cy="584775"/>
+          </a:xfrm>
+          <a:prstGeom prst="rect">
+            <a:avLst/>
+          </a:prstGeom>
+        </p:spPr>
+        <p:txBody>
+          <a:bodyPr wrap="none">
+            <a:spAutoFit/>
+          </a:bodyPr>
+          <a:lstStyle/>
+          <a:p>
+            <a:pPr algn="ctr"/>
+            <a:r>
+              <a:rPr lang="en-US" altLang="ja-JP" sz="3200" b="1" dirty="0" smtClean="0"/>
+              <a:t>C (native)</a:t>
+            </a:r>
+            <a:endParaRPr lang="ja-JP" altLang="en-US" sz="3200" b="1" dirty="0"/>
+          </a:p>
+        </p:txBody>
+      </p:sp>
+      <p:sp>
+        <p:nvSpPr>
+          <p:cNvPr id="23" name="正方形/長方形 22"/>
+          <p:cNvSpPr/>
+          <p:nvPr/>
+        </p:nvSpPr>
+        <p:spPr>
+          <a:xfrm>
+            <a:off x="7380312" y="4509120"/>
+            <a:ext cx="906980" cy="584775"/>
+          </a:xfrm>
+          <a:prstGeom prst="rect">
+            <a:avLst/>
+          </a:prstGeom>
+        </p:spPr>
+        <p:txBody>
+          <a:bodyPr wrap="none">
+            <a:spAutoFit/>
+          </a:bodyPr>
+          <a:lstStyle/>
+          <a:p>
+            <a:pPr algn="ctr"/>
+            <a:r>
+              <a:rPr lang="en-US" altLang="ja-JP" sz="3200" b="1" dirty="0" smtClean="0"/>
+              <a:t>Java</a:t>
+            </a:r>
+            <a:endParaRPr lang="ja-JP" altLang="en-US" sz="3200" b="1" dirty="0"/>
+          </a:p>
+        </p:txBody>
+      </p:sp>
+      <p:sp>
+        <p:nvSpPr>
+          <p:cNvPr id="24" name="正方形/長方形 23"/>
+          <p:cNvSpPr/>
+          <p:nvPr/>
+        </p:nvSpPr>
+        <p:spPr>
+          <a:xfrm>
+            <a:off x="7347385" y="6156593"/>
+            <a:ext cx="684803" cy="584775"/>
+          </a:xfrm>
+          <a:prstGeom prst="rect">
+            <a:avLst/>
+          </a:prstGeom>
+        </p:spPr>
+        <p:txBody>
+          <a:bodyPr wrap="none">
+            <a:spAutoFit/>
+          </a:bodyPr>
+          <a:lstStyle/>
+          <a:p>
+            <a:pPr algn="ctr"/>
+            <a:r>
+              <a:rPr lang="en-US" altLang="ja-JP" sz="3200" b="1" dirty="0" smtClean="0"/>
+              <a:t>CLI</a:t>
+            </a:r>
+            <a:endParaRPr lang="ja-JP" altLang="en-US" sz="3200" b="1" dirty="0"/>
           </a:p>
         </p:txBody>
       </p:sp>
     </p:spTree>
+    <p:extLst>
+      <p:ext uri="{BB962C8B-B14F-4D97-AF65-F5344CB8AC3E}">
+        <p14:creationId xmlns:p14="http://schemas.microsoft.com/office/powerpoint/2010/main" val="2694297918"/>
+      </p:ext>
+    </p:extLst>
   </p:cSld>
   <p:clrMapOvr>
     <a:masterClrMapping/>

</xml_diff>

<commit_message>
Writing way of doing partial compilation
</commit_message>
<xml_diff>
--- a/master/Fundamental Technologies Used in PyPy JIT Compiler.pptx
+++ b/master/Fundamental Technologies Used in PyPy JIT Compiler.pptx
@@ -322,7 +322,7 @@
             <a:fld id="{1A7682F5-8C93-4132-B79A-93E5F4AEEA23}" type="datetimeFigureOut">
               <a:rPr kumimoji="1" lang="ja-JP" altLang="en-US" smtClean="0"/>
               <a:pPr/>
-              <a:t>2012/9/13</a:t>
+              <a:t>12/09/15</a:t>
             </a:fld>
             <a:endParaRPr kumimoji="1" lang="ja-JP" altLang="en-US"/>
           </a:p>
@@ -365,7 +365,7 @@
             <a:fld id="{E1CBB85E-0FC7-4529-81C2-ADA4CDAB7C87}" type="slidenum">
               <a:rPr kumimoji="1" lang="ja-JP" altLang="en-US" smtClean="0"/>
               <a:pPr/>
-              <a:t>&lt;#&gt;</a:t>
+              <a:t>‹#›</a:t>
             </a:fld>
             <a:endParaRPr kumimoji="1" lang="ja-JP" altLang="en-US"/>
           </a:p>
@@ -521,7 +521,7 @@
             <a:fld id="{1A7682F5-8C93-4132-B79A-93E5F4AEEA23}" type="datetimeFigureOut">
               <a:rPr kumimoji="1" lang="ja-JP" altLang="en-US" smtClean="0"/>
               <a:pPr/>
-              <a:t>2012/9/13</a:t>
+              <a:t>12/09/15</a:t>
             </a:fld>
             <a:endParaRPr kumimoji="1" lang="ja-JP" altLang="en-US"/>
           </a:p>
@@ -564,7 +564,7 @@
             <a:fld id="{E1CBB85E-0FC7-4529-81C2-ADA4CDAB7C87}" type="slidenum">
               <a:rPr kumimoji="1" lang="ja-JP" altLang="en-US" smtClean="0"/>
               <a:pPr/>
-              <a:t>&lt;#&gt;</a:t>
+              <a:t>‹#›</a:t>
             </a:fld>
             <a:endParaRPr kumimoji="1" lang="ja-JP" altLang="en-US"/>
           </a:p>
@@ -730,7 +730,7 @@
             <a:fld id="{1A7682F5-8C93-4132-B79A-93E5F4AEEA23}" type="datetimeFigureOut">
               <a:rPr kumimoji="1" lang="ja-JP" altLang="en-US" smtClean="0"/>
               <a:pPr/>
-              <a:t>2012/9/13</a:t>
+              <a:t>12/09/15</a:t>
             </a:fld>
             <a:endParaRPr kumimoji="1" lang="ja-JP" altLang="en-US"/>
           </a:p>
@@ -773,7 +773,7 @@
             <a:fld id="{E1CBB85E-0FC7-4529-81C2-ADA4CDAB7C87}" type="slidenum">
               <a:rPr kumimoji="1" lang="ja-JP" altLang="en-US" smtClean="0"/>
               <a:pPr/>
-              <a:t>&lt;#&gt;</a:t>
+              <a:t>‹#›</a:t>
             </a:fld>
             <a:endParaRPr kumimoji="1" lang="ja-JP" altLang="en-US"/>
           </a:p>
@@ -929,7 +929,7 @@
             <a:fld id="{1A7682F5-8C93-4132-B79A-93E5F4AEEA23}" type="datetimeFigureOut">
               <a:rPr kumimoji="1" lang="ja-JP" altLang="en-US" smtClean="0"/>
               <a:pPr/>
-              <a:t>2012/9/13</a:t>
+              <a:t>12/09/15</a:t>
             </a:fld>
             <a:endParaRPr kumimoji="1" lang="ja-JP" altLang="en-US"/>
           </a:p>
@@ -972,7 +972,7 @@
             <a:fld id="{E1CBB85E-0FC7-4529-81C2-ADA4CDAB7C87}" type="slidenum">
               <a:rPr kumimoji="1" lang="ja-JP" altLang="en-US" smtClean="0"/>
               <a:pPr/>
-              <a:t>&lt;#&gt;</a:t>
+              <a:t>‹#›</a:t>
             </a:fld>
             <a:endParaRPr kumimoji="1" lang="ja-JP" altLang="en-US"/>
           </a:p>
@@ -1172,7 +1172,7 @@
             <a:fld id="{1A7682F5-8C93-4132-B79A-93E5F4AEEA23}" type="datetimeFigureOut">
               <a:rPr kumimoji="1" lang="ja-JP" altLang="en-US" smtClean="0"/>
               <a:pPr/>
-              <a:t>2012/9/13</a:t>
+              <a:t>12/09/15</a:t>
             </a:fld>
             <a:endParaRPr kumimoji="1" lang="ja-JP" altLang="en-US"/>
           </a:p>
@@ -1215,7 +1215,7 @@
             <a:fld id="{E1CBB85E-0FC7-4529-81C2-ADA4CDAB7C87}" type="slidenum">
               <a:rPr kumimoji="1" lang="ja-JP" altLang="en-US" smtClean="0"/>
               <a:pPr/>
-              <a:t>&lt;#&gt;</a:t>
+              <a:t>‹#›</a:t>
             </a:fld>
             <a:endParaRPr kumimoji="1" lang="ja-JP" altLang="en-US"/>
           </a:p>
@@ -1521,7 +1521,7 @@
             <a:fld id="{1A7682F5-8C93-4132-B79A-93E5F4AEEA23}" type="datetimeFigureOut">
               <a:rPr kumimoji="1" lang="ja-JP" altLang="en-US" smtClean="0"/>
               <a:pPr/>
-              <a:t>2012/9/13</a:t>
+              <a:t>12/09/15</a:t>
             </a:fld>
             <a:endParaRPr kumimoji="1" lang="ja-JP" altLang="en-US"/>
           </a:p>
@@ -1564,7 +1564,7 @@
             <a:fld id="{E1CBB85E-0FC7-4529-81C2-ADA4CDAB7C87}" type="slidenum">
               <a:rPr kumimoji="1" lang="ja-JP" altLang="en-US" smtClean="0"/>
               <a:pPr/>
-              <a:t>&lt;#&gt;</a:t>
+              <a:t>‹#›</a:t>
             </a:fld>
             <a:endParaRPr kumimoji="1" lang="ja-JP" altLang="en-US"/>
           </a:p>
@@ -2004,7 +2004,7 @@
             <a:fld id="{1A7682F5-8C93-4132-B79A-93E5F4AEEA23}" type="datetimeFigureOut">
               <a:rPr kumimoji="1" lang="ja-JP" altLang="en-US" smtClean="0"/>
               <a:pPr/>
-              <a:t>2012/9/13</a:t>
+              <a:t>12/09/15</a:t>
             </a:fld>
             <a:endParaRPr kumimoji="1" lang="ja-JP" altLang="en-US"/>
           </a:p>
@@ -2047,7 +2047,7 @@
             <a:fld id="{E1CBB85E-0FC7-4529-81C2-ADA4CDAB7C87}" type="slidenum">
               <a:rPr kumimoji="1" lang="ja-JP" altLang="en-US" smtClean="0"/>
               <a:pPr/>
-              <a:t>&lt;#&gt;</a:t>
+              <a:t>‹#›</a:t>
             </a:fld>
             <a:endParaRPr kumimoji="1" lang="ja-JP" altLang="en-US"/>
           </a:p>
@@ -2119,7 +2119,7 @@
             <a:fld id="{1A7682F5-8C93-4132-B79A-93E5F4AEEA23}" type="datetimeFigureOut">
               <a:rPr kumimoji="1" lang="ja-JP" altLang="en-US" smtClean="0"/>
               <a:pPr/>
-              <a:t>2012/9/13</a:t>
+              <a:t>12/09/15</a:t>
             </a:fld>
             <a:endParaRPr kumimoji="1" lang="ja-JP" altLang="en-US"/>
           </a:p>
@@ -2162,7 +2162,7 @@
             <a:fld id="{E1CBB85E-0FC7-4529-81C2-ADA4CDAB7C87}" type="slidenum">
               <a:rPr kumimoji="1" lang="ja-JP" altLang="en-US" smtClean="0"/>
               <a:pPr/>
-              <a:t>&lt;#&gt;</a:t>
+              <a:t>‹#›</a:t>
             </a:fld>
             <a:endParaRPr kumimoji="1" lang="ja-JP" altLang="en-US"/>
           </a:p>
@@ -2211,7 +2211,7 @@
             <a:fld id="{1A7682F5-8C93-4132-B79A-93E5F4AEEA23}" type="datetimeFigureOut">
               <a:rPr kumimoji="1" lang="ja-JP" altLang="en-US" smtClean="0"/>
               <a:pPr/>
-              <a:t>2012/9/13</a:t>
+              <a:t>12/09/15</a:t>
             </a:fld>
             <a:endParaRPr kumimoji="1" lang="ja-JP" altLang="en-US"/>
           </a:p>
@@ -2254,7 +2254,7 @@
             <a:fld id="{E1CBB85E-0FC7-4529-81C2-ADA4CDAB7C87}" type="slidenum">
               <a:rPr kumimoji="1" lang="ja-JP" altLang="en-US" smtClean="0"/>
               <a:pPr/>
-              <a:t>&lt;#&gt;</a:t>
+              <a:t>‹#›</a:t>
             </a:fld>
             <a:endParaRPr kumimoji="1" lang="ja-JP" altLang="en-US"/>
           </a:p>
@@ -2517,7 +2517,7 @@
             <a:fld id="{1A7682F5-8C93-4132-B79A-93E5F4AEEA23}" type="datetimeFigureOut">
               <a:rPr kumimoji="1" lang="ja-JP" altLang="en-US" smtClean="0"/>
               <a:pPr/>
-              <a:t>2012/9/13</a:t>
+              <a:t>12/09/15</a:t>
             </a:fld>
             <a:endParaRPr kumimoji="1" lang="ja-JP" altLang="en-US"/>
           </a:p>
@@ -2560,7 +2560,7 @@
             <a:fld id="{E1CBB85E-0FC7-4529-81C2-ADA4CDAB7C87}" type="slidenum">
               <a:rPr kumimoji="1" lang="ja-JP" altLang="en-US" smtClean="0"/>
               <a:pPr/>
-              <a:t>&lt;#&gt;</a:t>
+              <a:t>‹#›</a:t>
             </a:fld>
             <a:endParaRPr kumimoji="1" lang="ja-JP" altLang="en-US"/>
           </a:p>
@@ -2767,7 +2767,7 @@
             <a:fld id="{1A7682F5-8C93-4132-B79A-93E5F4AEEA23}" type="datetimeFigureOut">
               <a:rPr kumimoji="1" lang="ja-JP" altLang="en-US" smtClean="0"/>
               <a:pPr/>
-              <a:t>2012/9/13</a:t>
+              <a:t>12/09/15</a:t>
             </a:fld>
             <a:endParaRPr kumimoji="1" lang="ja-JP" altLang="en-US"/>
           </a:p>
@@ -2810,7 +2810,7 @@
             <a:fld id="{E1CBB85E-0FC7-4529-81C2-ADA4CDAB7C87}" type="slidenum">
               <a:rPr kumimoji="1" lang="ja-JP" altLang="en-US" smtClean="0"/>
               <a:pPr/>
-              <a:t>&lt;#&gt;</a:t>
+              <a:t>‹#›</a:t>
             </a:fld>
             <a:endParaRPr kumimoji="1" lang="ja-JP" altLang="en-US"/>
           </a:p>
@@ -3009,7 +3009,7 @@
             <a:fld id="{1A7682F5-8C93-4132-B79A-93E5F4AEEA23}" type="datetimeFigureOut">
               <a:rPr kumimoji="1" lang="ja-JP" altLang="en-US" smtClean="0"/>
               <a:pPr/>
-              <a:t>2012/9/13</a:t>
+              <a:t>12/09/15</a:t>
             </a:fld>
             <a:endParaRPr kumimoji="1" lang="ja-JP" altLang="en-US"/>
           </a:p>
@@ -3088,7 +3088,7 @@
             <a:fld id="{E1CBB85E-0FC7-4529-81C2-ADA4CDAB7C87}" type="slidenum">
               <a:rPr kumimoji="1" lang="ja-JP" altLang="en-US" smtClean="0"/>
               <a:pPr/>
-              <a:t>&lt;#&gt;</a:t>
+              <a:t>‹#›</a:t>
             </a:fld>
             <a:endParaRPr kumimoji="1" lang="ja-JP" altLang="en-US"/>
           </a:p>
@@ -3462,7 +3462,7 @@
   <p:timing>
     <p:tnLst>
       <p:par>
-        <p:cTn id="1" dur="indefinite" restart="never" nodeType="tmRoot"/>
+        <p:cTn xmlns:p14="http://schemas.microsoft.com/office/powerpoint/2010/main" id="1" dur="indefinite" restart="never" nodeType="tmRoot"/>
       </p:par>
     </p:tnLst>
   </p:timing>
@@ -6246,7 +6246,7 @@
   <p:timing>
     <p:tnLst>
       <p:par>
-        <p:cTn id="1" dur="indefinite" restart="never" nodeType="tmRoot">
+        <p:cTn xmlns:p14="http://schemas.microsoft.com/office/powerpoint/2010/main" id="1" dur="indefinite" restart="never" nodeType="tmRoot">
           <p:childTnLst>
             <p:seq concurrent="1" nextAc="seek">
               <p:cTn id="2" dur="indefinite" nodeType="mainSeq">
@@ -7180,7 +7180,7 @@
     </p:spTree>
     <p:extLst>
       <p:ext uri="{BB962C8B-B14F-4D97-AF65-F5344CB8AC3E}">
-        <p14:creationId xmlns:p14="http://schemas.microsoft.com/office/powerpoint/2010/main" xmlns="" val="312784058"/>
+        <p14:creationId xmlns:p14="http://schemas.microsoft.com/office/powerpoint/2010/main" val="312784058"/>
       </p:ext>
     </p:extLst>
   </p:cSld>
@@ -7452,7 +7452,7 @@
   <p:timing>
     <p:tnLst>
       <p:par>
-        <p:cTn id="1" dur="indefinite" restart="never" nodeType="tmRoot"/>
+        <p:cTn xmlns:p14="http://schemas.microsoft.com/office/powerpoint/2010/main" id="1" dur="indefinite" restart="never" nodeType="tmRoot"/>
       </p:par>
     </p:tnLst>
   </p:timing>
@@ -7587,7 +7587,7 @@
         <p:spPr>
           <a:xfrm>
             <a:off x="0" y="4509120"/>
-            <a:ext cx="9144000" cy="923330"/>
+            <a:ext cx="9144000" cy="1754327"/>
           </a:xfrm>
           <a:prstGeom prst="rect">
             <a:avLst/>
@@ -7615,7 +7615,15 @@
                   <a:srgbClr val="FF0000"/>
                 </a:solidFill>
               </a:rPr>
-              <a:t>some parts only!</a:t>
+              <a:t>frequently executed parts </a:t>
+            </a:r>
+            <a:r>
+              <a:rPr kumimoji="1" lang="en-US" altLang="ja-JP" sz="5400" dirty="0" smtClean="0">
+                <a:solidFill>
+                  <a:srgbClr val="FF0000"/>
+                </a:solidFill>
+              </a:rPr>
+              <a:t>only!</a:t>
             </a:r>
             <a:endParaRPr kumimoji="1" lang="ja-JP" altLang="en-US" sz="5400" dirty="0">
               <a:solidFill>
@@ -7628,13 +7636,20 @@
     </p:spTree>
     <p:extLst>
       <p:ext uri="{BB962C8B-B14F-4D97-AF65-F5344CB8AC3E}">
-        <p14:creationId xmlns:p14="http://schemas.microsoft.com/office/powerpoint/2010/main" xmlns="" val="1798000745"/>
+        <p14:creationId xmlns:p14="http://schemas.microsoft.com/office/powerpoint/2010/main" val="1798000745"/>
       </p:ext>
     </p:extLst>
   </p:cSld>
   <p:clrMapOvr>
     <a:masterClrMapping/>
   </p:clrMapOvr>
+  <p:timing>
+    <p:tnLst>
+      <p:par>
+        <p:cTn xmlns:p14="http://schemas.microsoft.com/office/powerpoint/2010/main" id="1" dur="indefinite" restart="never" nodeType="tmRoot"/>
+      </p:par>
+    </p:tnLst>
+  </p:timing>
 </p:sld>
 </file>
 
@@ -7665,31 +7680,280 @@
             <p:ph type="title"/>
           </p:nvPr>
         </p:nvSpPr>
-        <p:spPr/>
+        <p:spPr>
+          <a:xfrm>
+            <a:off x="457200" y="-99392"/>
+            <a:ext cx="8229600" cy="1143000"/>
+          </a:xfrm>
+        </p:spPr>
         <p:txBody>
           <a:bodyPr/>
           <a:lstStyle/>
           <a:p>
+            <a:r>
+              <a:rPr lang="en-US" altLang="ja-JP" dirty="0" smtClean="0"/>
+              <a:t>Way of doing partial compilation</a:t>
+            </a:r>
+            <a:endParaRPr kumimoji="1" lang="ja-JP" altLang="en-US" dirty="0"/>
+          </a:p>
+        </p:txBody>
+      </p:sp>
+      <p:sp>
+        <p:nvSpPr>
+          <p:cNvPr id="4" name="正方形/長方形 3"/>
+          <p:cNvSpPr/>
+          <p:nvPr/>
+        </p:nvSpPr>
+        <p:spPr>
+          <a:xfrm>
+            <a:off x="179512" y="1124744"/>
+            <a:ext cx="4248472" cy="5328592"/>
+          </a:xfrm>
+          <a:prstGeom prst="rect">
+            <a:avLst/>
+          </a:prstGeom>
+          <a:solidFill>
+            <a:schemeClr val="accent5">
+              <a:lumMod val="20000"/>
+              <a:lumOff val="80000"/>
+            </a:schemeClr>
+          </a:solidFill>
+        </p:spPr>
+        <p:style>
+          <a:lnRef idx="1">
+            <a:schemeClr val="accent1"/>
+          </a:lnRef>
+          <a:fillRef idx="3">
+            <a:schemeClr val="accent1"/>
+          </a:fillRef>
+          <a:effectRef idx="2">
+            <a:schemeClr val="accent1"/>
+          </a:effectRef>
+          <a:fontRef idx="minor">
+            <a:schemeClr val="lt1"/>
+          </a:fontRef>
+        </p:style>
+        <p:txBody>
+          <a:bodyPr rtlCol="0" anchor="ctr"/>
+          <a:lstStyle/>
+          <a:p>
+            <a:pPr algn="ctr"/>
             <a:endParaRPr kumimoji="1" lang="ja-JP" altLang="en-US"/>
           </a:p>
         </p:txBody>
       </p:sp>
       <p:sp>
         <p:nvSpPr>
-          <p:cNvPr id="3" name="コンテンツ プレースホルダ 2"/>
-          <p:cNvSpPr>
-            <a:spLocks noGrp="1"/>
-          </p:cNvSpPr>
-          <p:nvPr>
-            <p:ph idx="1"/>
-          </p:nvPr>
-        </p:nvSpPr>
-        <p:spPr/>
-        <p:txBody>
-          <a:bodyPr/>
-          <a:lstStyle/>
-          <a:p>
+          <p:cNvPr id="5" name="テキスト ボックス 4"/>
+          <p:cNvSpPr txBox="1"/>
+          <p:nvPr/>
+        </p:nvSpPr>
+        <p:spPr>
+          <a:xfrm>
+            <a:off x="179512" y="1124744"/>
+            <a:ext cx="2756684" cy="584776"/>
+          </a:xfrm>
+          <a:prstGeom prst="rect">
+            <a:avLst/>
+          </a:prstGeom>
+        </p:spPr>
+        <p:style>
+          <a:lnRef idx="1">
+            <a:schemeClr val="accent1"/>
+          </a:lnRef>
+          <a:fillRef idx="3">
+            <a:schemeClr val="accent1"/>
+          </a:fillRef>
+          <a:effectRef idx="2">
+            <a:schemeClr val="accent1"/>
+          </a:effectRef>
+          <a:fontRef idx="minor">
+            <a:schemeClr val="lt1"/>
+          </a:fontRef>
+        </p:style>
+        <p:txBody>
+          <a:bodyPr wrap="none" rtlCol="0">
+            <a:spAutoFit/>
+          </a:bodyPr>
+          <a:lstStyle/>
+          <a:p>
+            <a:r>
+              <a:rPr lang="en-US" altLang="ja-JP" sz="3200" dirty="0" smtClean="0"/>
+              <a:t>Function-based</a:t>
+            </a:r>
+            <a:endParaRPr kumimoji="1" lang="ja-JP" altLang="en-US" sz="3200" dirty="0"/>
+          </a:p>
+        </p:txBody>
+      </p:sp>
+      <p:sp>
+        <p:nvSpPr>
+          <p:cNvPr id="6" name="正方形/長方形 5"/>
+          <p:cNvSpPr/>
+          <p:nvPr/>
+        </p:nvSpPr>
+        <p:spPr>
+          <a:xfrm>
+            <a:off x="4572000" y="1124744"/>
+            <a:ext cx="4248472" cy="5328592"/>
+          </a:xfrm>
+          <a:prstGeom prst="rect">
+            <a:avLst/>
+          </a:prstGeom>
+          <a:solidFill>
+            <a:schemeClr val="accent2">
+              <a:lumMod val="20000"/>
+              <a:lumOff val="80000"/>
+            </a:schemeClr>
+          </a:solidFill>
+        </p:spPr>
+        <p:style>
+          <a:lnRef idx="1">
+            <a:schemeClr val="accent1"/>
+          </a:lnRef>
+          <a:fillRef idx="3">
+            <a:schemeClr val="accent1"/>
+          </a:fillRef>
+          <a:effectRef idx="2">
+            <a:schemeClr val="accent1"/>
+          </a:effectRef>
+          <a:fontRef idx="minor">
+            <a:schemeClr val="lt1"/>
+          </a:fontRef>
+        </p:style>
+        <p:txBody>
+          <a:bodyPr rtlCol="0" anchor="ctr"/>
+          <a:lstStyle/>
+          <a:p>
+            <a:pPr algn="ctr"/>
             <a:endParaRPr kumimoji="1" lang="ja-JP" altLang="en-US"/>
+          </a:p>
+        </p:txBody>
+      </p:sp>
+      <p:sp>
+        <p:nvSpPr>
+          <p:cNvPr id="7" name="テキスト ボックス 6"/>
+          <p:cNvSpPr txBox="1"/>
+          <p:nvPr/>
+        </p:nvSpPr>
+        <p:spPr>
+          <a:xfrm>
+            <a:off x="4572000" y="1124744"/>
+            <a:ext cx="2220079" cy="584776"/>
+          </a:xfrm>
+          <a:prstGeom prst="rect">
+            <a:avLst/>
+          </a:prstGeom>
+        </p:spPr>
+        <p:style>
+          <a:lnRef idx="1">
+            <a:schemeClr val="accent4"/>
+          </a:lnRef>
+          <a:fillRef idx="3">
+            <a:schemeClr val="accent4"/>
+          </a:fillRef>
+          <a:effectRef idx="2">
+            <a:schemeClr val="accent4"/>
+          </a:effectRef>
+          <a:fontRef idx="minor">
+            <a:schemeClr val="lt1"/>
+          </a:fontRef>
+        </p:style>
+        <p:txBody>
+          <a:bodyPr wrap="none" rtlCol="0">
+            <a:spAutoFit/>
+          </a:bodyPr>
+          <a:lstStyle/>
+          <a:p>
+            <a:r>
+              <a:rPr lang="en-US" altLang="ja-JP" sz="3200" dirty="0" smtClean="0"/>
+              <a:t>Trace-based</a:t>
+            </a:r>
+            <a:endParaRPr kumimoji="1" lang="ja-JP" altLang="en-US" sz="3200" dirty="0"/>
+          </a:p>
+        </p:txBody>
+      </p:sp>
+      <p:sp>
+        <p:nvSpPr>
+          <p:cNvPr id="8" name="テキスト ボックス 7"/>
+          <p:cNvSpPr txBox="1"/>
+          <p:nvPr/>
+        </p:nvSpPr>
+        <p:spPr>
+          <a:xfrm>
+            <a:off x="395536" y="1700808"/>
+            <a:ext cx="3882393" cy="1077218"/>
+          </a:xfrm>
+          <a:prstGeom prst="rect">
+            <a:avLst/>
+          </a:prstGeom>
+          <a:noFill/>
+        </p:spPr>
+        <p:txBody>
+          <a:bodyPr wrap="none" rtlCol="0">
+            <a:spAutoFit/>
+          </a:bodyPr>
+          <a:lstStyle/>
+          <a:p>
+            <a:r>
+              <a:rPr lang="en-US" altLang="ja-JP" sz="3200" dirty="0" smtClean="0"/>
+              <a:t>Minimum compilation </a:t>
+            </a:r>
+          </a:p>
+          <a:p>
+            <a:r>
+              <a:rPr lang="en-US" altLang="ja-JP" sz="3200" dirty="0" smtClean="0"/>
+              <a:t>unit is function</a:t>
+            </a:r>
+            <a:endParaRPr kumimoji="1" lang="ja-JP" altLang="en-US" sz="3200" dirty="0"/>
+          </a:p>
+        </p:txBody>
+      </p:sp>
+      <p:sp>
+        <p:nvSpPr>
+          <p:cNvPr id="9" name="テキスト ボックス 8"/>
+          <p:cNvSpPr txBox="1"/>
+          <p:nvPr/>
+        </p:nvSpPr>
+        <p:spPr>
+          <a:xfrm>
+            <a:off x="539552" y="2924944"/>
+            <a:ext cx="3239025" cy="1200329"/>
+          </a:xfrm>
+          <a:prstGeom prst="rect">
+            <a:avLst/>
+          </a:prstGeom>
+          <a:noFill/>
+        </p:spPr>
+        <p:txBody>
+          <a:bodyPr wrap="none" rtlCol="0">
+            <a:spAutoFit/>
+          </a:bodyPr>
+          <a:lstStyle/>
+          <a:p>
+            <a:r>
+              <a:rPr kumimoji="1" lang="en-US" altLang="ja-JP" dirty="0" smtClean="0"/>
+              <a:t>Merit:</a:t>
+            </a:r>
+          </a:p>
+          <a:p>
+            <a:r>
+              <a:rPr lang="en-US" altLang="ja-JP" dirty="0" smtClean="0"/>
+              <a:t>Easy to detect, implement</a:t>
+            </a:r>
+            <a:endParaRPr lang="en-US" altLang="ja-JP" dirty="0"/>
+          </a:p>
+          <a:p>
+            <a:r>
+              <a:rPr kumimoji="1" lang="en-US" altLang="ja-JP" dirty="0" smtClean="0"/>
+              <a:t>Demerit:</a:t>
+            </a:r>
+          </a:p>
+          <a:p>
+            <a:r>
+              <a:rPr lang="en-US" altLang="ja-JP" dirty="0" smtClean="0"/>
+              <a:t>Difficult to minimize compilation </a:t>
+            </a:r>
+            <a:endParaRPr kumimoji="1" lang="en-US" altLang="ja-JP" dirty="0" smtClean="0"/>
           </a:p>
         </p:txBody>
       </p:sp>
@@ -7698,6 +7962,13 @@
   <p:clrMapOvr>
     <a:masterClrMapping/>
   </p:clrMapOvr>
+  <p:timing>
+    <p:tnLst>
+      <p:par>
+        <p:cTn xmlns:p14="http://schemas.microsoft.com/office/powerpoint/2010/main" id="1" dur="indefinite" restart="never" nodeType="tmRoot"/>
+      </p:par>
+    </p:tnLst>
+  </p:timing>
 </p:sld>
 </file>
 
@@ -8452,13 +8723,20 @@
     </p:spTree>
     <p:extLst>
       <p:ext uri="{BB962C8B-B14F-4D97-AF65-F5344CB8AC3E}">
-        <p14:creationId xmlns:p14="http://schemas.microsoft.com/office/powerpoint/2010/main" xmlns="" val="2190836747"/>
+        <p14:creationId xmlns:p14="http://schemas.microsoft.com/office/powerpoint/2010/main" val="2190836747"/>
       </p:ext>
     </p:extLst>
   </p:cSld>
   <p:clrMapOvr>
     <a:masterClrMapping/>
   </p:clrMapOvr>
+  <p:timing>
+    <p:tnLst>
+      <p:par>
+        <p:cTn xmlns:p14="http://schemas.microsoft.com/office/powerpoint/2010/main" id="1" dur="indefinite" restart="never" nodeType="tmRoot"/>
+      </p:par>
+    </p:tnLst>
+  </p:timing>
 </p:sld>
 </file>
 
@@ -8544,13 +8822,20 @@
     </p:spTree>
     <p:extLst>
       <p:ext uri="{BB962C8B-B14F-4D97-AF65-F5344CB8AC3E}">
-        <p14:creationId xmlns:p14="http://schemas.microsoft.com/office/powerpoint/2010/main" xmlns="" val="3105020310"/>
+        <p14:creationId xmlns:p14="http://schemas.microsoft.com/office/powerpoint/2010/main" val="3105020310"/>
       </p:ext>
     </p:extLst>
   </p:cSld>
   <p:clrMapOvr>
     <a:masterClrMapping/>
   </p:clrMapOvr>
+  <p:timing>
+    <p:tnLst>
+      <p:par>
+        <p:cTn xmlns:p14="http://schemas.microsoft.com/office/powerpoint/2010/main" id="1" dur="indefinite" restart="never" nodeType="tmRoot"/>
+      </p:par>
+    </p:tnLst>
+  </p:timing>
 </p:sld>
 </file>
 
@@ -10157,7 +10442,7 @@
   <p:timing>
     <p:tnLst>
       <p:par>
-        <p:cTn id="1" dur="indefinite" restart="never" nodeType="tmRoot"/>
+        <p:cTn xmlns:p14="http://schemas.microsoft.com/office/powerpoint/2010/main" id="1" dur="indefinite" restart="never" nodeType="tmRoot"/>
       </p:par>
     </p:tnLst>
   </p:timing>
@@ -11141,7 +11426,7 @@
           <a:bodyPr/>
           <a:lstStyle/>
           <a:p>
-            <a:endParaRPr kumimoji="1" lang="ja-JP" altLang="en-US"/>
+            <a:endParaRPr kumimoji="1" lang="ja-JP" altLang="en-US" dirty="0"/>
           </a:p>
         </p:txBody>
       </p:sp>
@@ -11560,7 +11845,7 @@
     </p:spTree>
     <p:extLst>
       <p:ext uri="{BB962C8B-B14F-4D97-AF65-F5344CB8AC3E}">
-        <p14:creationId xmlns:p14="http://schemas.microsoft.com/office/powerpoint/2010/main" xmlns="" val="1477573084"/>
+        <p14:creationId xmlns:p14="http://schemas.microsoft.com/office/powerpoint/2010/main" val="1477573084"/>
       </p:ext>
     </p:extLst>
   </p:cSld>
@@ -11570,7 +11855,7 @@
   <p:timing>
     <p:tnLst>
       <p:par>
-        <p:cTn id="1" dur="indefinite" restart="never" nodeType="tmRoot"/>
+        <p:cTn xmlns:p14="http://schemas.microsoft.com/office/powerpoint/2010/main" id="1" dur="indefinite" restart="never" nodeType="tmRoot"/>
       </p:par>
     </p:tnLst>
   </p:timing>
@@ -11635,7 +11920,7 @@
     </p:spTree>
     <p:extLst>
       <p:ext uri="{BB962C8B-B14F-4D97-AF65-F5344CB8AC3E}">
-        <p14:creationId xmlns:p14="http://schemas.microsoft.com/office/powerpoint/2010/main" xmlns="" val="2094830404"/>
+        <p14:creationId xmlns:p14="http://schemas.microsoft.com/office/powerpoint/2010/main" val="2094830404"/>
       </p:ext>
     </p:extLst>
   </p:cSld>
@@ -11703,7 +11988,7 @@
     </p:spTree>
     <p:extLst>
       <p:ext uri="{BB962C8B-B14F-4D97-AF65-F5344CB8AC3E}">
-        <p14:creationId xmlns:p14="http://schemas.microsoft.com/office/powerpoint/2010/main" xmlns="" val="519101280"/>
+        <p14:creationId xmlns:p14="http://schemas.microsoft.com/office/powerpoint/2010/main" val="519101280"/>
       </p:ext>
     </p:extLst>
   </p:cSld>
@@ -11816,7 +12101,7 @@
   <p:timing>
     <p:tnLst>
       <p:par>
-        <p:cTn id="1" dur="indefinite" restart="never" nodeType="tmRoot"/>
+        <p:cTn xmlns:p14="http://schemas.microsoft.com/office/powerpoint/2010/main" id="1" dur="indefinite" restart="never" nodeType="tmRoot"/>
       </p:par>
     </p:tnLst>
   </p:timing>
@@ -11968,7 +12253,7 @@
     </p:spTree>
     <p:extLst>
       <p:ext uri="{BB962C8B-B14F-4D97-AF65-F5344CB8AC3E}">
-        <p14:creationId xmlns:p14="http://schemas.microsoft.com/office/powerpoint/2010/main" xmlns="" val="2258680520"/>
+        <p14:creationId xmlns:p14="http://schemas.microsoft.com/office/powerpoint/2010/main" val="2258680520"/>
       </p:ext>
     </p:extLst>
   </p:cSld>
@@ -12116,7 +12401,7 @@
     </p:spTree>
     <p:extLst>
       <p:ext uri="{BB962C8B-B14F-4D97-AF65-F5344CB8AC3E}">
-        <p14:creationId xmlns:p14="http://schemas.microsoft.com/office/powerpoint/2010/main" xmlns="" val="1374909894"/>
+        <p14:creationId xmlns:p14="http://schemas.microsoft.com/office/powerpoint/2010/main" val="1374909894"/>
       </p:ext>
     </p:extLst>
   </p:cSld>
@@ -12721,7 +13006,7 @@
     </p:spTree>
     <p:extLst>
       <p:ext uri="{BB962C8B-B14F-4D97-AF65-F5344CB8AC3E}">
-        <p14:creationId xmlns:p14="http://schemas.microsoft.com/office/powerpoint/2010/main" xmlns="" val="210483112"/>
+        <p14:creationId xmlns:p14="http://schemas.microsoft.com/office/powerpoint/2010/main" val="210483112"/>
       </p:ext>
     </p:extLst>
   </p:cSld>
@@ -13445,7 +13730,7 @@
     </p:spTree>
     <p:extLst>
       <p:ext uri="{BB962C8B-B14F-4D97-AF65-F5344CB8AC3E}">
-        <p14:creationId xmlns:p14="http://schemas.microsoft.com/office/powerpoint/2010/main" xmlns="" val="2694297918"/>
+        <p14:creationId xmlns:p14="http://schemas.microsoft.com/office/powerpoint/2010/main" val="2694297918"/>
       </p:ext>
     </p:extLst>
   </p:cSld>

</xml_diff>

<commit_message>
Tentatively complete to making!
</commit_message>
<xml_diff>
--- a/master/Fundamental Technologies Used in PyPy JIT Compiler.pptx
+++ b/master/Fundamental Technologies Used in PyPy JIT Compiler.pptx
@@ -47,12 +47,26 @@
     <p:sldId id="299" r:id="rId41"/>
     <p:sldId id="300" r:id="rId42"/>
     <p:sldId id="306" r:id="rId43"/>
-    <p:sldId id="301" r:id="rId44"/>
-    <p:sldId id="302" r:id="rId45"/>
-    <p:sldId id="303" r:id="rId46"/>
-    <p:sldId id="265" r:id="rId47"/>
-    <p:sldId id="266" r:id="rId48"/>
-    <p:sldId id="267" r:id="rId49"/>
+    <p:sldId id="307" r:id="rId44"/>
+    <p:sldId id="301" r:id="rId45"/>
+    <p:sldId id="308" r:id="rId46"/>
+    <p:sldId id="310" r:id="rId47"/>
+    <p:sldId id="309" r:id="rId48"/>
+    <p:sldId id="311" r:id="rId49"/>
+    <p:sldId id="313" r:id="rId50"/>
+    <p:sldId id="312" r:id="rId51"/>
+    <p:sldId id="314" r:id="rId52"/>
+    <p:sldId id="315" r:id="rId53"/>
+    <p:sldId id="302" r:id="rId54"/>
+    <p:sldId id="316" r:id="rId55"/>
+    <p:sldId id="317" r:id="rId56"/>
+    <p:sldId id="318" r:id="rId57"/>
+    <p:sldId id="319" r:id="rId58"/>
+    <p:sldId id="320" r:id="rId59"/>
+    <p:sldId id="303" r:id="rId60"/>
+    <p:sldId id="265" r:id="rId61"/>
+    <p:sldId id="266" r:id="rId62"/>
+    <p:sldId id="267" r:id="rId63"/>
   </p:sldIdLst>
   <p:sldSz cx="9144000" cy="6858000" type="screen4x3"/>
   <p:notesSz cx="6858000" cy="9144000"/>
@@ -15353,53 +15367,132 @@
         </p:nvSpPr>
         <p:spPr/>
         <p:txBody>
-          <a:bodyPr/>
-          <a:lstStyle/>
-          <a:p>
-            <a:r>
-              <a:rPr kumimoji="1" lang="en-US" altLang="ja-JP" dirty="0" smtClean="0"/>
-              <a:t>Hint mechanism</a:t>
-            </a:r>
-            <a:endParaRPr kumimoji="1" lang="ja-JP" altLang="en-US" dirty="0"/>
-          </a:p>
-        </p:txBody>
-      </p:sp>
-      <p:sp>
-        <p:nvSpPr>
-          <p:cNvPr id="3" name="コンテンツ プレースホルダー 2"/>
-          <p:cNvSpPr>
-            <a:spLocks noGrp="1"/>
+          <a:bodyPr>
+            <a:normAutofit/>
+          </a:bodyPr>
+          <a:lstStyle/>
+          <a:p>
+            <a:r>
+              <a:rPr kumimoji="1" lang="en-US" altLang="ja-JP" sz="5400" dirty="0" smtClean="0"/>
+              <a:t>It isn't over yet!!</a:t>
+            </a:r>
+            <a:endParaRPr kumimoji="1" lang="ja-JP" altLang="en-US" sz="5400" dirty="0"/>
+          </a:p>
+        </p:txBody>
+      </p:sp>
+      <p:sp>
+        <p:nvSpPr>
+          <p:cNvPr id="4" name="タイトル 1"/>
+          <p:cNvSpPr txBox="1">
+            <a:spLocks/>
           </p:cNvSpPr>
-          <p:nvPr>
-            <p:ph idx="1"/>
-          </p:nvPr>
-        </p:nvSpPr>
-        <p:spPr/>
-        <p:txBody>
-          <a:bodyPr/>
-          <a:lstStyle/>
-          <a:p>
-            <a:endParaRPr kumimoji="1" lang="ja-JP" altLang="en-US"/>
+          <p:nvPr/>
+        </p:nvSpPr>
+        <p:spPr>
+          <a:xfrm>
+            <a:off x="539552" y="1916832"/>
+            <a:ext cx="8229600" cy="3816424"/>
+          </a:xfrm>
+          <a:prstGeom prst="rect">
+            <a:avLst/>
+          </a:prstGeom>
+        </p:spPr>
+        <p:txBody>
+          <a:bodyPr vert="horz" lIns="91440" tIns="45720" rIns="91440" bIns="45720" rtlCol="0" anchor="ctr">
+            <a:noAutofit/>
+          </a:bodyPr>
+          <a:lstStyle/>
+          <a:p>
+            <a:pPr marL="0" marR="0" lvl="0" indent="0" algn="ctr" defTabSz="914400" rtl="0" eaLnBrk="1" fontAlgn="auto" latinLnBrk="0" hangingPunct="1">
+              <a:lnSpc>
+                <a:spcPct val="100000"/>
+              </a:lnSpc>
+              <a:spcBef>
+                <a:spcPct val="0"/>
+              </a:spcBef>
+              <a:spcAft>
+                <a:spcPts val="0"/>
+              </a:spcAft>
+              <a:buClrTx/>
+              <a:buSzTx/>
+              <a:buFontTx/>
+              <a:buNone/>
+              <a:tabLst/>
+              <a:defRPr/>
+            </a:pPr>
+            <a:r>
+              <a:rPr kumimoji="1" lang="en-US" altLang="ja-JP" sz="5400" b="0" i="0" u="none" strike="noStrike" kern="1200" cap="none" spc="0" normalizeH="0" baseline="0" noProof="0" dirty="0" err="1" smtClean="0">
+                <a:ln>
+                  <a:noFill/>
+                </a:ln>
+                <a:solidFill>
+                  <a:srgbClr val="FF0000"/>
+                </a:solidFill>
+                <a:effectLst/>
+                <a:uLnTx/>
+                <a:uFillTx/>
+                <a:latin typeface="+mj-lt"/>
+                <a:ea typeface="+mj-ea"/>
+                <a:cs typeface="+mj-cs"/>
+              </a:rPr>
+              <a:t>PyPy</a:t>
+            </a:r>
+            <a:r>
+              <a:rPr kumimoji="1" lang="en-US" altLang="ja-JP" sz="5400" b="0" i="0" u="none" strike="noStrike" kern="1200" cap="none" spc="0" normalizeH="0" baseline="0" noProof="0" dirty="0" smtClean="0">
+                <a:ln>
+                  <a:noFill/>
+                </a:ln>
+                <a:solidFill>
+                  <a:srgbClr val="FF0000"/>
+                </a:solidFill>
+                <a:effectLst/>
+                <a:uLnTx/>
+                <a:uFillTx/>
+                <a:latin typeface="+mj-lt"/>
+                <a:ea typeface="+mj-ea"/>
+                <a:cs typeface="+mj-cs"/>
+              </a:rPr>
+              <a:t> introduces dramatic</a:t>
+            </a:r>
+            <a:r>
+              <a:rPr kumimoji="1" lang="en-US" altLang="ja-JP" sz="5400" b="0" i="0" u="none" strike="noStrike" kern="1200" cap="none" spc="0" normalizeH="0" noProof="0" dirty="0" smtClean="0">
+                <a:ln>
+                  <a:noFill/>
+                </a:ln>
+                <a:solidFill>
+                  <a:srgbClr val="FF0000"/>
+                </a:solidFill>
+                <a:effectLst/>
+                <a:uLnTx/>
+                <a:uFillTx/>
+                <a:latin typeface="+mj-lt"/>
+                <a:ea typeface="+mj-ea"/>
+                <a:cs typeface="+mj-cs"/>
+              </a:rPr>
+              <a:t> technology to speed up dramatically!</a:t>
+            </a:r>
+            <a:endParaRPr kumimoji="1" lang="ja-JP" altLang="en-US" sz="5400" b="0" i="0" u="none" strike="noStrike" kern="1200" cap="none" spc="0" normalizeH="0" baseline="0" noProof="0" dirty="0">
+              <a:ln>
+                <a:noFill/>
+              </a:ln>
+              <a:solidFill>
+                <a:srgbClr val="FF0000"/>
+              </a:solidFill>
+              <a:effectLst/>
+              <a:uLnTx/>
+              <a:uFillTx/>
+              <a:latin typeface="+mj-lt"/>
+              <a:ea typeface="+mj-ea"/>
+              <a:cs typeface="+mj-cs"/>
+            </a:endParaRPr>
           </a:p>
         </p:txBody>
       </p:sp>
     </p:spTree>
-    <p:extLst>
-      <p:ext uri="{BB962C8B-B14F-4D97-AF65-F5344CB8AC3E}">
-        <p14:creationId xmlns:p14="http://schemas.microsoft.com/office/powerpoint/2010/main" xmlns="" val="318861245"/>
-      </p:ext>
-    </p:extLst>
   </p:cSld>
   <p:clrMapOvr>
     <a:masterClrMapping/>
   </p:clrMapOvr>
-  <p:timing>
-    <p:tnLst>
-      <p:par>
-        <p:cTn id="1" dur="indefinite" restart="never" nodeType="tmRoot"/>
-      </p:par>
-    </p:tnLst>
-  </p:timing>
 </p:sld>
 </file>
 
@@ -15437,19 +15530,11 @@
           <a:p>
             <a:r>
               <a:rPr kumimoji="1" lang="en-US" altLang="ja-JP" dirty="0" smtClean="0"/>
-              <a:t>How benefi</a:t>
-            </a:r>
-            <a:r>
-              <a:rPr lang="en-US" altLang="ja-JP" dirty="0" smtClean="0"/>
-              <a:t>t </a:t>
-            </a:r>
-            <a:r>
-              <a:rPr kumimoji="1" lang="en-US" altLang="ja-JP" dirty="0" err="1" smtClean="0"/>
-              <a:t>PyPy</a:t>
+              <a:t>Hinting </a:t>
             </a:r>
             <a:r>
               <a:rPr kumimoji="1" lang="en-US" altLang="ja-JP" dirty="0" smtClean="0"/>
-              <a:t> will bring?</a:t>
+              <a:t>mechanism</a:t>
             </a:r>
             <a:endParaRPr kumimoji="1" lang="ja-JP" altLang="en-US" dirty="0"/>
           </a:p>
@@ -15465,19 +15550,404 @@
             <p:ph idx="1"/>
           </p:nvPr>
         </p:nvSpPr>
-        <p:spPr/>
+        <p:spPr>
+          <a:xfrm>
+            <a:off x="467544" y="1412776"/>
+            <a:ext cx="8229600" cy="604664"/>
+          </a:xfrm>
+        </p:spPr>
         <p:txBody>
           <a:bodyPr/>
           <a:lstStyle/>
           <a:p>
-            <a:endParaRPr kumimoji="1" lang="ja-JP" altLang="en-US"/>
+            <a:r>
+              <a:rPr lang="en-US" altLang="ja-JP" dirty="0" smtClean="0"/>
+              <a:t>Originated by </a:t>
+            </a:r>
+            <a:r>
+              <a:rPr lang="en-US" altLang="ja-JP" dirty="0" err="1" smtClean="0"/>
+              <a:t>PyPy</a:t>
+            </a:r>
+            <a:r>
+              <a:rPr lang="en-US" altLang="ja-JP" dirty="0" smtClean="0"/>
+              <a:t> project (!)</a:t>
+            </a:r>
+            <a:endParaRPr kumimoji="1" lang="ja-JP" altLang="en-US" dirty="0"/>
+          </a:p>
+        </p:txBody>
+      </p:sp>
+      <p:sp>
+        <p:nvSpPr>
+          <p:cNvPr id="4" name="正方形/長方形 3"/>
+          <p:cNvSpPr/>
+          <p:nvPr/>
+        </p:nvSpPr>
+        <p:spPr>
+          <a:xfrm>
+            <a:off x="1163587" y="2204864"/>
+            <a:ext cx="2622107" cy="720080"/>
+          </a:xfrm>
+          <a:prstGeom prst="rect">
+            <a:avLst/>
+          </a:prstGeom>
+        </p:spPr>
+        <p:style>
+          <a:lnRef idx="1">
+            <a:schemeClr val="accent1"/>
+          </a:lnRef>
+          <a:fillRef idx="3">
+            <a:schemeClr val="accent1"/>
+          </a:fillRef>
+          <a:effectRef idx="2">
+            <a:schemeClr val="accent1"/>
+          </a:effectRef>
+          <a:fontRef idx="minor">
+            <a:schemeClr val="lt1"/>
+          </a:fontRef>
+        </p:style>
+        <p:txBody>
+          <a:bodyPr rtlCol="0" anchor="ctr"/>
+          <a:lstStyle/>
+          <a:p>
+            <a:pPr algn="ctr"/>
+            <a:r>
+              <a:rPr kumimoji="1" lang="en-US" altLang="ja-JP" sz="2400" dirty="0" smtClean="0"/>
+              <a:t>Target program </a:t>
+            </a:r>
+            <a:endParaRPr kumimoji="1" lang="ja-JP" altLang="en-US" sz="2400" dirty="0"/>
+          </a:p>
+        </p:txBody>
+      </p:sp>
+      <p:sp>
+        <p:nvSpPr>
+          <p:cNvPr id="5" name="正方形/長方形 4"/>
+          <p:cNvSpPr/>
+          <p:nvPr/>
+        </p:nvSpPr>
+        <p:spPr>
+          <a:xfrm>
+            <a:off x="692427" y="2996952"/>
+            <a:ext cx="3564426" cy="720080"/>
+          </a:xfrm>
+          <a:prstGeom prst="rect">
+            <a:avLst/>
+          </a:prstGeom>
+        </p:spPr>
+        <p:style>
+          <a:lnRef idx="1">
+            <a:schemeClr val="accent3"/>
+          </a:lnRef>
+          <a:fillRef idx="3">
+            <a:schemeClr val="accent3"/>
+          </a:fillRef>
+          <a:effectRef idx="2">
+            <a:schemeClr val="accent3"/>
+          </a:effectRef>
+          <a:fontRef idx="minor">
+            <a:schemeClr val="lt1"/>
+          </a:fontRef>
+        </p:style>
+        <p:txBody>
+          <a:bodyPr rtlCol="0" anchor="ctr"/>
+          <a:lstStyle/>
+          <a:p>
+            <a:pPr algn="ctr"/>
+            <a:r>
+              <a:rPr kumimoji="1" lang="en-US" altLang="ja-JP" sz="2800" dirty="0" smtClean="0"/>
+              <a:t>Interpreter </a:t>
+            </a:r>
+            <a:r>
+              <a:rPr kumimoji="1" lang="en-US" altLang="ja-JP" sz="2800" dirty="0" smtClean="0"/>
+              <a:t>in </a:t>
+            </a:r>
+            <a:r>
+              <a:rPr kumimoji="1" lang="en-US" altLang="ja-JP" sz="2800" dirty="0" err="1" smtClean="0"/>
+              <a:t>RPython</a:t>
+            </a:r>
+            <a:endParaRPr kumimoji="1" lang="ja-JP" altLang="en-US" sz="2800" dirty="0"/>
+          </a:p>
+        </p:txBody>
+      </p:sp>
+      <p:sp>
+        <p:nvSpPr>
+          <p:cNvPr id="6" name="正方形/長方形 5"/>
+          <p:cNvSpPr/>
+          <p:nvPr/>
+        </p:nvSpPr>
+        <p:spPr>
+          <a:xfrm>
+            <a:off x="395536" y="3789040"/>
+            <a:ext cx="4158208" cy="720080"/>
+          </a:xfrm>
+          <a:prstGeom prst="rect">
+            <a:avLst/>
+          </a:prstGeom>
+        </p:spPr>
+        <p:style>
+          <a:lnRef idx="1">
+            <a:schemeClr val="accent4"/>
+          </a:lnRef>
+          <a:fillRef idx="3">
+            <a:schemeClr val="accent4"/>
+          </a:fillRef>
+          <a:effectRef idx="2">
+            <a:schemeClr val="accent4"/>
+          </a:effectRef>
+          <a:fontRef idx="minor">
+            <a:schemeClr val="lt1"/>
+          </a:fontRef>
+        </p:style>
+        <p:txBody>
+          <a:bodyPr rtlCol="0" anchor="ctr"/>
+          <a:lstStyle/>
+          <a:p>
+            <a:pPr algn="ctr"/>
+            <a:r>
+              <a:rPr kumimoji="1" lang="en-US" altLang="ja-JP" sz="2800" dirty="0" err="1" smtClean="0"/>
+              <a:t>PyPy's</a:t>
+            </a:r>
+            <a:r>
+              <a:rPr kumimoji="1" lang="en-US" altLang="ja-JP" sz="2800" dirty="0" smtClean="0"/>
+              <a:t> JIT compiler</a:t>
+            </a:r>
+            <a:endParaRPr kumimoji="1" lang="ja-JP" altLang="en-US" sz="2800" dirty="0"/>
+          </a:p>
+        </p:txBody>
+      </p:sp>
+      <p:cxnSp>
+        <p:nvCxnSpPr>
+          <p:cNvPr id="8" name="直線コネクタ 7"/>
+          <p:cNvCxnSpPr>
+            <a:stCxn id="5" idx="3"/>
+          </p:cNvCxnSpPr>
+          <p:nvPr/>
+        </p:nvCxnSpPr>
+        <p:spPr>
+          <a:xfrm>
+            <a:off x="4256853" y="3356992"/>
+            <a:ext cx="891211" cy="0"/>
+          </a:xfrm>
+          <a:prstGeom prst="line">
+            <a:avLst/>
+          </a:prstGeom>
+        </p:spPr>
+        <p:style>
+          <a:lnRef idx="3">
+            <a:schemeClr val="accent4"/>
+          </a:lnRef>
+          <a:fillRef idx="0">
+            <a:schemeClr val="accent4"/>
+          </a:fillRef>
+          <a:effectRef idx="2">
+            <a:schemeClr val="accent4"/>
+          </a:effectRef>
+          <a:fontRef idx="minor">
+            <a:schemeClr val="tx1"/>
+          </a:fontRef>
+        </p:style>
+      </p:cxnSp>
+      <p:cxnSp>
+        <p:nvCxnSpPr>
+          <p:cNvPr id="10" name="直線コネクタ 9"/>
+          <p:cNvCxnSpPr/>
+          <p:nvPr/>
+        </p:nvCxnSpPr>
+        <p:spPr>
+          <a:xfrm>
+            <a:off x="5148064" y="3356992"/>
+            <a:ext cx="0" cy="792088"/>
+          </a:xfrm>
+          <a:prstGeom prst="line">
+            <a:avLst/>
+          </a:prstGeom>
+        </p:spPr>
+        <p:style>
+          <a:lnRef idx="3">
+            <a:schemeClr val="accent4"/>
+          </a:lnRef>
+          <a:fillRef idx="0">
+            <a:schemeClr val="accent4"/>
+          </a:fillRef>
+          <a:effectRef idx="2">
+            <a:schemeClr val="accent4"/>
+          </a:effectRef>
+          <a:fontRef idx="minor">
+            <a:schemeClr val="tx1"/>
+          </a:fontRef>
+        </p:style>
+      </p:cxnSp>
+      <p:cxnSp>
+        <p:nvCxnSpPr>
+          <p:cNvPr id="12" name="直線矢印コネクタ 11"/>
+          <p:cNvCxnSpPr>
+            <a:endCxn id="6" idx="3"/>
+          </p:cNvCxnSpPr>
+          <p:nvPr/>
+        </p:nvCxnSpPr>
+        <p:spPr>
+          <a:xfrm flipH="1">
+            <a:off x="4553744" y="4149080"/>
+            <a:ext cx="594320" cy="0"/>
+          </a:xfrm>
+          <a:prstGeom prst="straightConnector1">
+            <a:avLst/>
+          </a:prstGeom>
+          <a:ln>
+            <a:tailEnd type="arrow"/>
+          </a:ln>
+        </p:spPr>
+        <p:style>
+          <a:lnRef idx="3">
+            <a:schemeClr val="accent4"/>
+          </a:lnRef>
+          <a:fillRef idx="0">
+            <a:schemeClr val="accent4"/>
+          </a:fillRef>
+          <a:effectRef idx="2">
+            <a:schemeClr val="accent4"/>
+          </a:effectRef>
+          <a:fontRef idx="minor">
+            <a:schemeClr val="tx1"/>
+          </a:fontRef>
+        </p:style>
+      </p:cxnSp>
+      <p:sp>
+        <p:nvSpPr>
+          <p:cNvPr id="13" name="テキスト ボックス 12"/>
+          <p:cNvSpPr txBox="1"/>
+          <p:nvPr/>
+        </p:nvSpPr>
+        <p:spPr>
+          <a:xfrm>
+            <a:off x="5508104" y="3212976"/>
+            <a:ext cx="2948308" cy="1200329"/>
+          </a:xfrm>
+          <a:prstGeom prst="rect">
+            <a:avLst/>
+          </a:prstGeom>
+          <a:noFill/>
+        </p:spPr>
+        <p:txBody>
+          <a:bodyPr wrap="none" rtlCol="0">
+            <a:spAutoFit/>
+          </a:bodyPr>
+          <a:lstStyle/>
+          <a:p>
+            <a:r>
+              <a:rPr kumimoji="1" lang="en-US" altLang="ja-JP" sz="3600" dirty="0" smtClean="0"/>
+              <a:t>Annotate hints</a:t>
+            </a:r>
+          </a:p>
+          <a:p>
+            <a:r>
+              <a:rPr lang="en-US" altLang="ja-JP" sz="3600" dirty="0" smtClean="0"/>
+              <a:t>to JIT compiler</a:t>
+            </a:r>
+            <a:endParaRPr kumimoji="1" lang="ja-JP" altLang="en-US" sz="3600" dirty="0"/>
+          </a:p>
+        </p:txBody>
+      </p:sp>
+      <p:sp>
+        <p:nvSpPr>
+          <p:cNvPr id="14" name="テキスト ボックス 13"/>
+          <p:cNvSpPr txBox="1"/>
+          <p:nvPr/>
+        </p:nvSpPr>
+        <p:spPr>
+          <a:xfrm>
+            <a:off x="755576" y="4797152"/>
+            <a:ext cx="7561044" cy="1815882"/>
+          </a:xfrm>
+          <a:prstGeom prst="rect">
+            <a:avLst/>
+          </a:prstGeom>
+          <a:noFill/>
+        </p:spPr>
+        <p:txBody>
+          <a:bodyPr wrap="none" rtlCol="0">
+            <a:spAutoFit/>
+          </a:bodyPr>
+          <a:lstStyle/>
+          <a:p>
+            <a:r>
+              <a:rPr lang="en-US" altLang="ja-JP" sz="2800" dirty="0" smtClean="0"/>
+              <a:t>*Characteristic of method like:</a:t>
+            </a:r>
+          </a:p>
+          <a:p>
+            <a:r>
+              <a:rPr lang="en-US" altLang="ja-JP" sz="2800" dirty="0" smtClean="0"/>
+              <a:t>  " This method won't change its member variables</a:t>
+            </a:r>
+          </a:p>
+          <a:p>
+            <a:r>
+              <a:rPr lang="en-US" altLang="ja-JP" sz="2800" dirty="0" smtClean="0"/>
+              <a:t>*Characteristic of variable like:</a:t>
+            </a:r>
+          </a:p>
+          <a:p>
+            <a:r>
+              <a:rPr lang="en-US" altLang="ja-JP" sz="2800" dirty="0" smtClean="0"/>
+              <a:t> </a:t>
+            </a:r>
+            <a:r>
+              <a:rPr lang="en-US" altLang="ja-JP" sz="2800" dirty="0" smtClean="0"/>
+              <a:t> " This variable is used for program counter"</a:t>
+            </a:r>
+          </a:p>
+        </p:txBody>
+      </p:sp>
+      <p:sp>
+        <p:nvSpPr>
+          <p:cNvPr id="15" name="四角形吹き出し 14"/>
+          <p:cNvSpPr/>
+          <p:nvPr/>
+        </p:nvSpPr>
+        <p:spPr>
+          <a:xfrm>
+            <a:off x="5652120" y="2132856"/>
+            <a:ext cx="2880320" cy="1008112"/>
+          </a:xfrm>
+          <a:prstGeom prst="wedgeRectCallout">
+            <a:avLst/>
+          </a:prstGeom>
+        </p:spPr>
+        <p:style>
+          <a:lnRef idx="2">
+            <a:schemeClr val="accent6"/>
+          </a:lnRef>
+          <a:fillRef idx="1">
+            <a:schemeClr val="lt1"/>
+          </a:fillRef>
+          <a:effectRef idx="0">
+            <a:schemeClr val="accent6"/>
+          </a:effectRef>
+          <a:fontRef idx="minor">
+            <a:schemeClr val="dk1"/>
+          </a:fontRef>
+        </p:style>
+        <p:txBody>
+          <a:bodyPr rtlCol="0" anchor="ctr"/>
+          <a:lstStyle/>
+          <a:p>
+            <a:pPr algn="ctr"/>
+            <a:r>
+              <a:rPr kumimoji="1" lang="en-US" altLang="ja-JP" sz="2800" dirty="0" smtClean="0"/>
+              <a:t>Programmer gives it in </a:t>
+            </a:r>
+            <a:r>
+              <a:rPr kumimoji="1" lang="en-US" altLang="ja-JP" sz="2800" dirty="0" err="1" smtClean="0"/>
+              <a:t>RPython</a:t>
+            </a:r>
+            <a:endParaRPr kumimoji="1" lang="ja-JP" altLang="en-US" sz="2800" dirty="0"/>
           </a:p>
         </p:txBody>
       </p:sp>
     </p:spTree>
     <p:extLst>
       <p:ext uri="{BB962C8B-B14F-4D97-AF65-F5344CB8AC3E}">
-        <p14:creationId xmlns:p14="http://schemas.microsoft.com/office/powerpoint/2010/main" xmlns="" val="1224126970"/>
+        <p14:creationId xmlns:p14="http://schemas.microsoft.com/office/powerpoint/2010/main" xmlns="" val="318861245"/>
       </p:ext>
     </p:extLst>
   </p:cSld>
@@ -15527,8 +15997,15 @@
           <a:lstStyle/>
           <a:p>
             <a:r>
+              <a:rPr kumimoji="1" lang="en-US" altLang="ja-JP" dirty="0" smtClean="0"/>
+              <a:t>Hint. 1</a:t>
+            </a:r>
+            <a:br>
+              <a:rPr kumimoji="1" lang="en-US" altLang="ja-JP" dirty="0" smtClean="0"/>
+            </a:br>
+            <a:r>
               <a:rPr lang="en-US" altLang="ja-JP" dirty="0" smtClean="0"/>
-              <a:t>Suggestion</a:t>
+              <a:t>Green variable and Red variable</a:t>
             </a:r>
             <a:endParaRPr kumimoji="1" lang="ja-JP" altLang="en-US" dirty="0"/>
           </a:p>
@@ -15536,40 +16013,352 @@
       </p:sp>
       <p:sp>
         <p:nvSpPr>
-          <p:cNvPr id="3" name="コンテンツ プレースホルダー 2"/>
-          <p:cNvSpPr>
-            <a:spLocks noGrp="1"/>
-          </p:cNvSpPr>
-          <p:nvPr>
-            <p:ph idx="1"/>
-          </p:nvPr>
-        </p:nvSpPr>
-        <p:spPr/>
-        <p:txBody>
-          <a:bodyPr/>
-          <a:lstStyle/>
-          <a:p>
-            <a:endParaRPr kumimoji="1" lang="ja-JP" altLang="en-US"/>
+          <p:cNvPr id="4" name="正方形/長方形 3"/>
+          <p:cNvSpPr/>
+          <p:nvPr/>
+        </p:nvSpPr>
+        <p:spPr>
+          <a:xfrm>
+            <a:off x="683568" y="1844824"/>
+            <a:ext cx="2736304" cy="648072"/>
+          </a:xfrm>
+          <a:prstGeom prst="rect">
+            <a:avLst/>
+          </a:prstGeom>
+        </p:spPr>
+        <p:style>
+          <a:lnRef idx="1">
+            <a:schemeClr val="accent3"/>
+          </a:lnRef>
+          <a:fillRef idx="2">
+            <a:schemeClr val="accent3"/>
+          </a:fillRef>
+          <a:effectRef idx="1">
+            <a:schemeClr val="accent3"/>
+          </a:effectRef>
+          <a:fontRef idx="minor">
+            <a:schemeClr val="dk1"/>
+          </a:fontRef>
+        </p:style>
+        <p:txBody>
+          <a:bodyPr rtlCol="0" anchor="ctr"/>
+          <a:lstStyle/>
+          <a:p>
+            <a:pPr algn="ctr"/>
+            <a:r>
+              <a:rPr kumimoji="1" lang="en-US" altLang="ja-JP" sz="3200" dirty="0" smtClean="0"/>
+              <a:t>Green variable</a:t>
+            </a:r>
+            <a:endParaRPr kumimoji="1" lang="ja-JP" altLang="en-US" sz="3200" dirty="0"/>
+          </a:p>
+        </p:txBody>
+      </p:sp>
+      <p:sp>
+        <p:nvSpPr>
+          <p:cNvPr id="5" name="テキスト ボックス 4"/>
+          <p:cNvSpPr txBox="1"/>
+          <p:nvPr/>
+        </p:nvSpPr>
+        <p:spPr>
+          <a:xfrm>
+            <a:off x="395536" y="2564904"/>
+            <a:ext cx="3446393" cy="1569660"/>
+          </a:xfrm>
+          <a:prstGeom prst="rect">
+            <a:avLst/>
+          </a:prstGeom>
+          <a:noFill/>
+        </p:spPr>
+        <p:txBody>
+          <a:bodyPr wrap="none" rtlCol="0">
+            <a:spAutoFit/>
+          </a:bodyPr>
+          <a:lstStyle/>
+          <a:p>
+            <a:r>
+              <a:rPr kumimoji="1" lang="en-US" altLang="ja-JP" sz="3200" dirty="0" smtClean="0">
+                <a:solidFill>
+                  <a:srgbClr val="00B050"/>
+                </a:solidFill>
+              </a:rPr>
+              <a:t>- Program counter</a:t>
+            </a:r>
+          </a:p>
+          <a:p>
+            <a:r>
+              <a:rPr lang="en-US" altLang="ja-JP" sz="3200" dirty="0" smtClean="0">
+                <a:solidFill>
+                  <a:srgbClr val="00B050"/>
+                </a:solidFill>
+              </a:rPr>
+              <a:t>- Variables </a:t>
+            </a:r>
+            <a:r>
+              <a:rPr lang="en-US" altLang="ja-JP" sz="3200" u="sng" dirty="0" smtClean="0">
+                <a:solidFill>
+                  <a:srgbClr val="00B050"/>
+                </a:solidFill>
+              </a:rPr>
+              <a:t>which is </a:t>
+            </a:r>
+          </a:p>
+          <a:p>
+            <a:r>
+              <a:rPr lang="en-US" altLang="ja-JP" sz="3200" dirty="0" smtClean="0">
+                <a:solidFill>
+                  <a:srgbClr val="00B050"/>
+                </a:solidFill>
+              </a:rPr>
+              <a:t> </a:t>
+            </a:r>
+            <a:r>
+              <a:rPr lang="en-US" altLang="ja-JP" sz="3200" dirty="0" smtClean="0">
+                <a:solidFill>
+                  <a:srgbClr val="00B050"/>
+                </a:solidFill>
+              </a:rPr>
+              <a:t>  </a:t>
+            </a:r>
+            <a:r>
+              <a:rPr lang="en-US" altLang="ja-JP" sz="3200" u="sng" dirty="0" smtClean="0">
+                <a:solidFill>
+                  <a:srgbClr val="00B050"/>
+                </a:solidFill>
+              </a:rPr>
+              <a:t>related to it</a:t>
+            </a:r>
+            <a:endParaRPr kumimoji="1" lang="ja-JP" altLang="en-US" sz="3200" u="sng" dirty="0">
+              <a:solidFill>
+                <a:srgbClr val="00B050"/>
+              </a:solidFill>
+            </a:endParaRPr>
+          </a:p>
+        </p:txBody>
+      </p:sp>
+      <p:sp>
+        <p:nvSpPr>
+          <p:cNvPr id="6" name="正方形/長方形 5"/>
+          <p:cNvSpPr/>
+          <p:nvPr/>
+        </p:nvSpPr>
+        <p:spPr>
+          <a:xfrm>
+            <a:off x="5433384" y="1844824"/>
+            <a:ext cx="2736304" cy="648072"/>
+          </a:xfrm>
+          <a:prstGeom prst="rect">
+            <a:avLst/>
+          </a:prstGeom>
+        </p:spPr>
+        <p:style>
+          <a:lnRef idx="1">
+            <a:schemeClr val="accent2"/>
+          </a:lnRef>
+          <a:fillRef idx="2">
+            <a:schemeClr val="accent2"/>
+          </a:fillRef>
+          <a:effectRef idx="1">
+            <a:schemeClr val="accent2"/>
+          </a:effectRef>
+          <a:fontRef idx="minor">
+            <a:schemeClr val="dk1"/>
+          </a:fontRef>
+        </p:style>
+        <p:txBody>
+          <a:bodyPr rtlCol="0" anchor="ctr"/>
+          <a:lstStyle/>
+          <a:p>
+            <a:pPr algn="ctr"/>
+            <a:r>
+              <a:rPr lang="en-US" altLang="ja-JP" sz="3200" dirty="0" smtClean="0"/>
+              <a:t>Red</a:t>
+            </a:r>
+            <a:r>
+              <a:rPr kumimoji="1" lang="en-US" altLang="ja-JP" sz="3200" dirty="0" smtClean="0"/>
+              <a:t> variable</a:t>
+            </a:r>
+            <a:endParaRPr kumimoji="1" lang="ja-JP" altLang="en-US" sz="3200" dirty="0"/>
+          </a:p>
+        </p:txBody>
+      </p:sp>
+      <p:sp>
+        <p:nvSpPr>
+          <p:cNvPr id="7" name="テキスト ボックス 6"/>
+          <p:cNvSpPr txBox="1"/>
+          <p:nvPr/>
+        </p:nvSpPr>
+        <p:spPr>
+          <a:xfrm>
+            <a:off x="5361376" y="2564904"/>
+            <a:ext cx="2955040" cy="584775"/>
+          </a:xfrm>
+          <a:prstGeom prst="rect">
+            <a:avLst/>
+          </a:prstGeom>
+          <a:noFill/>
+        </p:spPr>
+        <p:txBody>
+          <a:bodyPr wrap="none" rtlCol="0">
+            <a:spAutoFit/>
+          </a:bodyPr>
+          <a:lstStyle/>
+          <a:p>
+            <a:r>
+              <a:rPr kumimoji="1" lang="en-US" altLang="ja-JP" sz="3200" dirty="0" smtClean="0">
+                <a:solidFill>
+                  <a:srgbClr val="FF0000"/>
+                </a:solidFill>
+              </a:rPr>
+              <a:t>- Other variables</a:t>
+            </a:r>
+            <a:endParaRPr kumimoji="1" lang="ja-JP" altLang="en-US" sz="3200" dirty="0">
+              <a:solidFill>
+                <a:srgbClr val="FF0000"/>
+              </a:solidFill>
+            </a:endParaRPr>
+          </a:p>
+        </p:txBody>
+      </p:sp>
+      <p:cxnSp>
+        <p:nvCxnSpPr>
+          <p:cNvPr id="9" name="直線矢印コネクタ 8"/>
+          <p:cNvCxnSpPr/>
+          <p:nvPr/>
+        </p:nvCxnSpPr>
+        <p:spPr>
+          <a:xfrm flipH="1" flipV="1">
+            <a:off x="3275856" y="3645024"/>
+            <a:ext cx="1440160" cy="576064"/>
+          </a:xfrm>
+          <a:prstGeom prst="straightConnector1">
+            <a:avLst/>
+          </a:prstGeom>
+          <a:ln>
+            <a:tailEnd type="arrow"/>
+          </a:ln>
+        </p:spPr>
+        <p:style>
+          <a:lnRef idx="2">
+            <a:schemeClr val="accent3"/>
+          </a:lnRef>
+          <a:fillRef idx="0">
+            <a:schemeClr val="accent3"/>
+          </a:fillRef>
+          <a:effectRef idx="1">
+            <a:schemeClr val="accent3"/>
+          </a:effectRef>
+          <a:fontRef idx="minor">
+            <a:schemeClr val="tx1"/>
+          </a:fontRef>
+        </p:style>
+      </p:cxnSp>
+      <p:sp>
+        <p:nvSpPr>
+          <p:cNvPr id="10" name="テキスト ボックス 9"/>
+          <p:cNvSpPr txBox="1"/>
+          <p:nvPr/>
+        </p:nvSpPr>
+        <p:spPr>
+          <a:xfrm>
+            <a:off x="4716016" y="3717032"/>
+            <a:ext cx="3728136" cy="1077218"/>
+          </a:xfrm>
+          <a:prstGeom prst="rect">
+            <a:avLst/>
+          </a:prstGeom>
+          <a:noFill/>
+        </p:spPr>
+        <p:txBody>
+          <a:bodyPr wrap="none" rtlCol="0">
+            <a:spAutoFit/>
+          </a:bodyPr>
+          <a:lstStyle/>
+          <a:p>
+            <a:r>
+              <a:rPr kumimoji="1" lang="en-US" altLang="ja-JP" sz="3200" dirty="0" smtClean="0"/>
+              <a:t>Such as list </a:t>
+            </a:r>
+          </a:p>
+          <a:p>
+            <a:r>
+              <a:rPr kumimoji="1" lang="en-US" altLang="ja-JP" sz="3200" dirty="0" smtClean="0"/>
+              <a:t>containing </a:t>
+            </a:r>
+            <a:r>
+              <a:rPr kumimoji="1" lang="en-US" altLang="ja-JP" sz="3200" dirty="0" err="1" smtClean="0"/>
+              <a:t>bytecodes</a:t>
+            </a:r>
+            <a:endParaRPr kumimoji="1" lang="ja-JP" altLang="en-US" sz="3200" dirty="0"/>
+          </a:p>
+        </p:txBody>
+      </p:sp>
+      <p:sp>
+        <p:nvSpPr>
+          <p:cNvPr id="11" name="テキスト ボックス 10"/>
+          <p:cNvSpPr txBox="1"/>
+          <p:nvPr/>
+        </p:nvSpPr>
+        <p:spPr>
+          <a:xfrm>
+            <a:off x="1187624" y="4869160"/>
+            <a:ext cx="6575454" cy="1754326"/>
+          </a:xfrm>
+          <a:prstGeom prst="rect">
+            <a:avLst/>
+          </a:prstGeom>
+          <a:noFill/>
+        </p:spPr>
+        <p:txBody>
+          <a:bodyPr wrap="none" rtlCol="0">
+            <a:spAutoFit/>
+          </a:bodyPr>
+          <a:lstStyle/>
+          <a:p>
+            <a:r>
+              <a:rPr kumimoji="1" lang="en-US" altLang="ja-JP" sz="3600" dirty="0" err="1" smtClean="0"/>
+              <a:t>PyPy</a:t>
+            </a:r>
+            <a:r>
+              <a:rPr kumimoji="1" lang="en-US" altLang="ja-JP" sz="3600" dirty="0" smtClean="0"/>
+              <a:t> 's JIT compiler can know that</a:t>
+            </a:r>
+          </a:p>
+          <a:p>
+            <a:r>
+              <a:rPr lang="en-US" altLang="ja-JP" sz="3600" dirty="0" smtClean="0"/>
+              <a:t>"</a:t>
+            </a:r>
+            <a:r>
+              <a:rPr lang="en-US" altLang="ja-JP" sz="3600" dirty="0" smtClean="0">
+                <a:solidFill>
+                  <a:srgbClr val="FF0000"/>
+                </a:solidFill>
+              </a:rPr>
+              <a:t>Currently VM is running loop</a:t>
+            </a:r>
+            <a:r>
+              <a:rPr lang="en-US" altLang="ja-JP" sz="3600" dirty="0" smtClean="0"/>
+              <a:t>"</a:t>
+            </a:r>
+          </a:p>
+          <a:p>
+            <a:r>
+              <a:rPr lang="en-US" altLang="ja-JP" sz="3600" dirty="0" smtClean="0"/>
+              <a:t> </a:t>
+            </a:r>
+            <a:r>
+              <a:rPr kumimoji="1" lang="en-US" altLang="ja-JP" sz="3600" dirty="0" smtClean="0"/>
+              <a:t>by looking to green variable</a:t>
+            </a:r>
+            <a:endParaRPr kumimoji="1" lang="ja-JP" altLang="en-US" sz="3600" dirty="0"/>
           </a:p>
         </p:txBody>
       </p:sp>
     </p:spTree>
-    <p:extLst>
-      <p:ext uri="{BB962C8B-B14F-4D97-AF65-F5344CB8AC3E}">
-        <p14:creationId xmlns:p14="http://schemas.microsoft.com/office/powerpoint/2010/main" xmlns="" val="2951407745"/>
-      </p:ext>
-    </p:extLst>
   </p:cSld>
   <p:clrMapOvr>
     <a:masterClrMapping/>
   </p:clrMapOvr>
-  <p:timing>
-    <p:tnLst>
-      <p:par>
-        <p:cTn id="1" dur="indefinite" restart="never" nodeType="tmRoot"/>
-      </p:par>
-    </p:tnLst>
-  </p:timing>
 </p:sld>
 </file>
 
@@ -15607,393 +16396,56 @@
           <a:p>
             <a:r>
               <a:rPr kumimoji="1" lang="en-US" altLang="ja-JP" dirty="0" smtClean="0"/>
-              <a:t>Templates</a:t>
+              <a:t>Hint. 1</a:t>
+            </a:r>
+            <a:br>
+              <a:rPr kumimoji="1" lang="en-US" altLang="ja-JP" dirty="0" smtClean="0"/>
+            </a:br>
+            <a:r>
+              <a:rPr lang="en-US" altLang="ja-JP" dirty="0" smtClean="0"/>
+              <a:t>Green variable and Red variable</a:t>
             </a:r>
             <a:endParaRPr kumimoji="1" lang="ja-JP" altLang="en-US" dirty="0"/>
           </a:p>
         </p:txBody>
       </p:sp>
-      <p:sp>
-        <p:nvSpPr>
-          <p:cNvPr id="5" name="正方形/長方形 4"/>
-          <p:cNvSpPr/>
-          <p:nvPr/>
-        </p:nvSpPr>
-        <p:spPr>
-          <a:xfrm>
-            <a:off x="323528" y="1412776"/>
-            <a:ext cx="4032448" cy="1728192"/>
+      <p:pic>
+        <p:nvPicPr>
+          <p:cNvPr id="1026" name="Picture 2"/>
+          <p:cNvPicPr>
+            <a:picLocks noChangeAspect="1" noChangeArrowheads="1"/>
+          </p:cNvPicPr>
+          <p:nvPr/>
+        </p:nvPicPr>
+        <p:blipFill>
+          <a:blip r:embed="rId2" cstate="print"/>
+          <a:srcRect/>
+          <a:stretch>
+            <a:fillRect/>
+          </a:stretch>
+        </p:blipFill>
+        <p:spPr bwMode="auto">
+          <a:xfrm>
+            <a:off x="339693" y="2564904"/>
+            <a:ext cx="8464614" cy="1728192"/>
           </a:xfrm>
           <a:prstGeom prst="rect">
             <a:avLst/>
           </a:prstGeom>
-          <a:solidFill>
-            <a:schemeClr val="accent5">
-              <a:lumMod val="20000"/>
-              <a:lumOff val="80000"/>
-            </a:schemeClr>
-          </a:solidFill>
-        </p:spPr>
-        <p:style>
-          <a:lnRef idx="1">
-            <a:schemeClr val="accent1"/>
-          </a:lnRef>
-          <a:fillRef idx="3">
-            <a:schemeClr val="accent1"/>
-          </a:fillRef>
-          <a:effectRef idx="2">
-            <a:schemeClr val="accent1"/>
-          </a:effectRef>
-          <a:fontRef idx="minor">
-            <a:schemeClr val="lt1"/>
-          </a:fontRef>
-        </p:style>
-        <p:txBody>
-          <a:bodyPr rtlCol="0" anchor="ctr"/>
-          <a:lstStyle/>
-          <a:p>
-            <a:pPr algn="ctr"/>
-            <a:endParaRPr kumimoji="1" lang="ja-JP" altLang="en-US"/>
-          </a:p>
-        </p:txBody>
-      </p:sp>
-      <p:sp>
-        <p:nvSpPr>
-          <p:cNvPr id="4" name="テキスト ボックス 3"/>
-          <p:cNvSpPr txBox="1"/>
-          <p:nvPr/>
-        </p:nvSpPr>
-        <p:spPr>
-          <a:xfrm>
-            <a:off x="323528" y="1412776"/>
-            <a:ext cx="1951225" cy="707886"/>
-          </a:xfrm>
-          <a:prstGeom prst="rect">
-            <a:avLst/>
-          </a:prstGeom>
-        </p:spPr>
-        <p:style>
-          <a:lnRef idx="1">
-            <a:schemeClr val="accent1"/>
-          </a:lnRef>
-          <a:fillRef idx="3">
-            <a:schemeClr val="accent1"/>
-          </a:fillRef>
-          <a:effectRef idx="2">
-            <a:schemeClr val="accent1"/>
-          </a:effectRef>
-          <a:fontRef idx="minor">
-            <a:schemeClr val="lt1"/>
-          </a:fontRef>
-        </p:style>
-        <p:txBody>
-          <a:bodyPr wrap="none" rtlCol="0">
-            <a:spAutoFit/>
-          </a:bodyPr>
-          <a:lstStyle/>
-          <a:p>
-            <a:r>
-              <a:rPr kumimoji="1" lang="en-US" altLang="ja-JP" sz="4000" dirty="0" smtClean="0"/>
-              <a:t>Problem</a:t>
-            </a:r>
-            <a:endParaRPr kumimoji="1" lang="ja-JP" altLang="en-US" sz="4000" dirty="0"/>
-          </a:p>
-        </p:txBody>
-      </p:sp>
-      <p:sp>
-        <p:nvSpPr>
-          <p:cNvPr id="6" name="正方形/長方形 5"/>
-          <p:cNvSpPr/>
-          <p:nvPr/>
-        </p:nvSpPr>
-        <p:spPr>
-          <a:xfrm>
-            <a:off x="4644008" y="1412776"/>
-            <a:ext cx="4032448" cy="1728192"/>
-          </a:xfrm>
-          <a:prstGeom prst="rect">
-            <a:avLst/>
-          </a:prstGeom>
-          <a:solidFill>
-            <a:schemeClr val="accent3">
-              <a:lumMod val="20000"/>
-              <a:lumOff val="80000"/>
-            </a:schemeClr>
-          </a:solidFill>
-        </p:spPr>
-        <p:style>
-          <a:lnRef idx="1">
-            <a:schemeClr val="accent1"/>
-          </a:lnRef>
-          <a:fillRef idx="3">
-            <a:schemeClr val="accent1"/>
-          </a:fillRef>
-          <a:effectRef idx="2">
-            <a:schemeClr val="accent1"/>
-          </a:effectRef>
-          <a:fontRef idx="minor">
-            <a:schemeClr val="lt1"/>
-          </a:fontRef>
-        </p:style>
-        <p:txBody>
-          <a:bodyPr rtlCol="0" anchor="ctr"/>
-          <a:lstStyle/>
-          <a:p>
-            <a:pPr algn="ctr"/>
-            <a:endParaRPr kumimoji="1" lang="ja-JP" altLang="en-US"/>
-          </a:p>
-        </p:txBody>
-      </p:sp>
-      <p:sp>
-        <p:nvSpPr>
-          <p:cNvPr id="7" name="テキスト ボックス 6"/>
-          <p:cNvSpPr txBox="1"/>
-          <p:nvPr/>
-        </p:nvSpPr>
-        <p:spPr>
-          <a:xfrm>
-            <a:off x="4644008" y="1412776"/>
-            <a:ext cx="1951225" cy="707886"/>
-          </a:xfrm>
-          <a:prstGeom prst="rect">
-            <a:avLst/>
-          </a:prstGeom>
-        </p:spPr>
-        <p:style>
-          <a:lnRef idx="1">
-            <a:schemeClr val="accent3"/>
-          </a:lnRef>
-          <a:fillRef idx="3">
-            <a:schemeClr val="accent3"/>
-          </a:fillRef>
-          <a:effectRef idx="2">
-            <a:schemeClr val="accent3"/>
-          </a:effectRef>
-          <a:fontRef idx="minor">
-            <a:schemeClr val="lt1"/>
-          </a:fontRef>
-        </p:style>
-        <p:txBody>
-          <a:bodyPr wrap="none" rtlCol="0">
-            <a:spAutoFit/>
-          </a:bodyPr>
-          <a:lstStyle/>
-          <a:p>
-            <a:r>
-              <a:rPr kumimoji="1" lang="en-US" altLang="ja-JP" sz="4000" dirty="0" smtClean="0"/>
-              <a:t>Problem</a:t>
-            </a:r>
-            <a:endParaRPr kumimoji="1" lang="ja-JP" altLang="en-US" sz="4000" dirty="0"/>
-          </a:p>
-        </p:txBody>
-      </p:sp>
-      <p:sp>
-        <p:nvSpPr>
-          <p:cNvPr id="8" name="下矢印 7"/>
-          <p:cNvSpPr/>
-          <p:nvPr/>
-        </p:nvSpPr>
-        <p:spPr>
-          <a:xfrm>
-            <a:off x="251520" y="3717032"/>
-            <a:ext cx="4536504" cy="504056"/>
-          </a:xfrm>
-          <a:prstGeom prst="downArrow">
-            <a:avLst/>
-          </a:prstGeom>
-        </p:spPr>
-        <p:style>
-          <a:lnRef idx="1">
-            <a:schemeClr val="dk1"/>
-          </a:lnRef>
-          <a:fillRef idx="3">
-            <a:schemeClr val="dk1"/>
-          </a:fillRef>
-          <a:effectRef idx="2">
-            <a:schemeClr val="dk1"/>
-          </a:effectRef>
-          <a:fontRef idx="minor">
-            <a:schemeClr val="lt1"/>
-          </a:fontRef>
-        </p:style>
-        <p:txBody>
-          <a:bodyPr rtlCol="0" anchor="ctr"/>
-          <a:lstStyle/>
-          <a:p>
-            <a:pPr algn="ctr"/>
-            <a:endParaRPr kumimoji="1" lang="ja-JP" altLang="en-US"/>
-          </a:p>
-        </p:txBody>
-      </p:sp>
-      <p:sp>
-        <p:nvSpPr>
-          <p:cNvPr id="9" name="直角三角形 8"/>
-          <p:cNvSpPr/>
-          <p:nvPr/>
-        </p:nvSpPr>
-        <p:spPr>
-          <a:xfrm rot="13500000">
-            <a:off x="133031" y="4717780"/>
-            <a:ext cx="654689" cy="647451"/>
-          </a:xfrm>
-          <a:prstGeom prst="rtTriangle">
-            <a:avLst/>
-          </a:prstGeom>
-        </p:spPr>
-        <p:style>
-          <a:lnRef idx="1">
-            <a:schemeClr val="accent1"/>
-          </a:lnRef>
-          <a:fillRef idx="3">
-            <a:schemeClr val="accent1"/>
-          </a:fillRef>
-          <a:effectRef idx="2">
-            <a:schemeClr val="accent1"/>
-          </a:effectRef>
-          <a:fontRef idx="minor">
-            <a:schemeClr val="lt1"/>
-          </a:fontRef>
-        </p:style>
-        <p:txBody>
-          <a:bodyPr rtlCol="0" anchor="ctr"/>
-          <a:lstStyle/>
-          <a:p>
-            <a:pPr algn="ctr"/>
-            <a:endParaRPr kumimoji="1" lang="ja-JP" altLang="en-US"/>
-          </a:p>
-        </p:txBody>
-      </p:sp>
-      <p:sp>
-        <p:nvSpPr>
-          <p:cNvPr id="10" name="直角三角形 9"/>
-          <p:cNvSpPr/>
-          <p:nvPr/>
-        </p:nvSpPr>
-        <p:spPr>
-          <a:xfrm rot="13500000">
-            <a:off x="744591" y="4717779"/>
-            <a:ext cx="654689" cy="647451"/>
-          </a:xfrm>
-          <a:prstGeom prst="rtTriangle">
-            <a:avLst/>
-          </a:prstGeom>
-        </p:spPr>
-        <p:style>
-          <a:lnRef idx="1">
-            <a:schemeClr val="accent2"/>
-          </a:lnRef>
-          <a:fillRef idx="3">
-            <a:schemeClr val="accent2"/>
-          </a:fillRef>
-          <a:effectRef idx="2">
-            <a:schemeClr val="accent2"/>
-          </a:effectRef>
-          <a:fontRef idx="minor">
-            <a:schemeClr val="lt1"/>
-          </a:fontRef>
-        </p:style>
-        <p:txBody>
-          <a:bodyPr rtlCol="0" anchor="ctr"/>
-          <a:lstStyle/>
-          <a:p>
-            <a:pPr algn="ctr"/>
-            <a:endParaRPr kumimoji="1" lang="ja-JP" altLang="en-US"/>
-          </a:p>
-        </p:txBody>
-      </p:sp>
-      <p:sp>
-        <p:nvSpPr>
-          <p:cNvPr id="11" name="直角三角形 10"/>
-          <p:cNvSpPr/>
-          <p:nvPr/>
-        </p:nvSpPr>
-        <p:spPr>
-          <a:xfrm rot="13500000">
-            <a:off x="1392665" y="4717779"/>
-            <a:ext cx="654689" cy="647451"/>
-          </a:xfrm>
-          <a:prstGeom prst="rtTriangle">
-            <a:avLst/>
-          </a:prstGeom>
-        </p:spPr>
-        <p:style>
-          <a:lnRef idx="1">
-            <a:schemeClr val="accent3"/>
-          </a:lnRef>
-          <a:fillRef idx="3">
-            <a:schemeClr val="accent3"/>
-          </a:fillRef>
-          <a:effectRef idx="2">
-            <a:schemeClr val="accent3"/>
-          </a:effectRef>
-          <a:fontRef idx="minor">
-            <a:schemeClr val="lt1"/>
-          </a:fontRef>
-        </p:style>
-        <p:txBody>
-          <a:bodyPr rtlCol="0" anchor="ctr"/>
-          <a:lstStyle/>
-          <a:p>
-            <a:pPr algn="ctr"/>
-            <a:endParaRPr kumimoji="1" lang="ja-JP" altLang="en-US"/>
-          </a:p>
-        </p:txBody>
-      </p:sp>
-      <p:sp>
-        <p:nvSpPr>
-          <p:cNvPr id="3" name="下矢印 2"/>
-          <p:cNvSpPr/>
-          <p:nvPr/>
-        </p:nvSpPr>
-        <p:spPr>
-          <a:xfrm>
-            <a:off x="3275856" y="3861048"/>
-            <a:ext cx="484632" cy="978408"/>
-          </a:xfrm>
-          <a:prstGeom prst="downArrow">
-            <a:avLst/>
-          </a:prstGeom>
-        </p:spPr>
-        <p:style>
-          <a:lnRef idx="1">
-            <a:schemeClr val="accent1"/>
-          </a:lnRef>
-          <a:fillRef idx="3">
-            <a:schemeClr val="accent1"/>
-          </a:fillRef>
-          <a:effectRef idx="2">
-            <a:schemeClr val="accent1"/>
-          </a:effectRef>
-          <a:fontRef idx="minor">
-            <a:schemeClr val="lt1"/>
-          </a:fontRef>
-        </p:style>
-        <p:txBody>
-          <a:bodyPr rtlCol="0" anchor="ctr"/>
-          <a:lstStyle/>
-          <a:p>
-            <a:pPr algn="ctr"/>
-            <a:endParaRPr kumimoji="1" lang="ja-JP" altLang="en-US"/>
-          </a:p>
-        </p:txBody>
-      </p:sp>
+          <a:noFill/>
+          <a:ln w="9525">
+            <a:noFill/>
+            <a:miter lim="800000"/>
+            <a:headEnd/>
+            <a:tailEnd/>
+          </a:ln>
+        </p:spPr>
+      </p:pic>
     </p:spTree>
-    <p:extLst>
-      <p:ext uri="{BB962C8B-B14F-4D97-AF65-F5344CB8AC3E}">
-        <p14:creationId xmlns:p14="http://schemas.microsoft.com/office/powerpoint/2010/main" xmlns="" val="1477573084"/>
-      </p:ext>
-    </p:extLst>
   </p:cSld>
   <p:clrMapOvr>
     <a:masterClrMapping/>
   </p:clrMapOvr>
-  <p:timing>
-    <p:tnLst>
-      <p:par>
-        <p:cTn id="1" dur="indefinite" restart="never" nodeType="tmRoot"/>
-      </p:par>
-    </p:tnLst>
-  </p:timing>
 </p:sld>
 </file>
 
@@ -16024,40 +16476,130 @@
             <p:ph type="title"/>
           </p:nvPr>
         </p:nvSpPr>
-        <p:spPr/>
+        <p:spPr>
+          <a:xfrm>
+            <a:off x="457200" y="-27384"/>
+            <a:ext cx="8229600" cy="1143000"/>
+          </a:xfrm>
+        </p:spPr>
         <p:txBody>
           <a:bodyPr/>
           <a:lstStyle/>
           <a:p>
-            <a:endParaRPr kumimoji="1" lang="ja-JP" altLang="en-US"/>
-          </a:p>
-        </p:txBody>
-      </p:sp>
-      <p:sp>
-        <p:nvSpPr>
-          <p:cNvPr id="3" name="コンテンツ プレースホルダー 2"/>
-          <p:cNvSpPr>
-            <a:spLocks noGrp="1"/>
-          </p:cNvSpPr>
-          <p:nvPr>
-            <p:ph idx="1"/>
-          </p:nvPr>
-        </p:nvSpPr>
-        <p:spPr/>
-        <p:txBody>
-          <a:bodyPr/>
-          <a:lstStyle/>
-          <a:p>
-            <a:endParaRPr kumimoji="1" lang="ja-JP" altLang="en-US"/>
+            <a:r>
+              <a:rPr kumimoji="1" lang="en-US" altLang="ja-JP" dirty="0" smtClean="0"/>
+              <a:t>Hint.2</a:t>
+            </a:r>
+            <a:br>
+              <a:rPr kumimoji="1" lang="en-US" altLang="ja-JP" dirty="0" smtClean="0"/>
+            </a:br>
+            <a:r>
+              <a:rPr lang="en-US" altLang="ja-JP" dirty="0" smtClean="0"/>
+              <a:t>Indicating JIT merge point</a:t>
+            </a:r>
+            <a:endParaRPr kumimoji="1" lang="ja-JP" altLang="en-US" dirty="0"/>
+          </a:p>
+        </p:txBody>
+      </p:sp>
+      <p:pic>
+        <p:nvPicPr>
+          <p:cNvPr id="2050" name="Picture 2"/>
+          <p:cNvPicPr>
+            <a:picLocks noChangeAspect="1" noChangeArrowheads="1"/>
+          </p:cNvPicPr>
+          <p:nvPr/>
+        </p:nvPicPr>
+        <p:blipFill>
+          <a:blip r:embed="rId2" cstate="print"/>
+          <a:srcRect/>
+          <a:stretch>
+            <a:fillRect/>
+          </a:stretch>
+        </p:blipFill>
+        <p:spPr bwMode="auto">
+          <a:xfrm>
+            <a:off x="755576" y="1542802"/>
+            <a:ext cx="7704856" cy="3736191"/>
+          </a:xfrm>
+          <a:prstGeom prst="rect">
+            <a:avLst/>
+          </a:prstGeom>
+          <a:noFill/>
+          <a:ln w="9525">
+            <a:noFill/>
+            <a:miter lim="800000"/>
+            <a:headEnd/>
+            <a:tailEnd/>
+          </a:ln>
+        </p:spPr>
+      </p:pic>
+      <p:cxnSp>
+        <p:nvCxnSpPr>
+          <p:cNvPr id="6" name="直線コネクタ 5"/>
+          <p:cNvCxnSpPr/>
+          <p:nvPr/>
+        </p:nvCxnSpPr>
+        <p:spPr>
+          <a:xfrm>
+            <a:off x="2411760" y="3573016"/>
+            <a:ext cx="5688632" cy="0"/>
+          </a:xfrm>
+          <a:prstGeom prst="line">
+            <a:avLst/>
+          </a:prstGeom>
+        </p:spPr>
+        <p:style>
+          <a:lnRef idx="3">
+            <a:schemeClr val="accent2"/>
+          </a:lnRef>
+          <a:fillRef idx="0">
+            <a:schemeClr val="accent2"/>
+          </a:fillRef>
+          <a:effectRef idx="2">
+            <a:schemeClr val="accent2"/>
+          </a:effectRef>
+          <a:fontRef idx="minor">
+            <a:schemeClr val="tx1"/>
+          </a:fontRef>
+        </p:style>
+      </p:cxnSp>
+      <p:sp>
+        <p:nvSpPr>
+          <p:cNvPr id="7" name="テキスト ボックス 6"/>
+          <p:cNvSpPr txBox="1"/>
+          <p:nvPr/>
+        </p:nvSpPr>
+        <p:spPr>
+          <a:xfrm>
+            <a:off x="0" y="5373216"/>
+            <a:ext cx="9231310" cy="954107"/>
+          </a:xfrm>
+          <a:prstGeom prst="rect">
+            <a:avLst/>
+          </a:prstGeom>
+          <a:noFill/>
+        </p:spPr>
+        <p:txBody>
+          <a:bodyPr wrap="none" rtlCol="0">
+            <a:spAutoFit/>
+          </a:bodyPr>
+          <a:lstStyle/>
+          <a:p>
+            <a:r>
+              <a:rPr kumimoji="1" lang="en-US" altLang="ja-JP" sz="2800" dirty="0" smtClean="0"/>
+              <a:t>It tells "this loop is the beginning of main loop" to JIT compiler</a:t>
+            </a:r>
+          </a:p>
+          <a:p>
+            <a:r>
+              <a:rPr lang="en-US" altLang="ja-JP" sz="2800" dirty="0" smtClean="0"/>
+              <a:t>=&gt; JIT compiler can easily detect efficient part to compile</a:t>
+            </a:r>
+            <a:endParaRPr kumimoji="1" lang="ja-JP" altLang="en-US" sz="2800" dirty="0"/>
           </a:p>
         </p:txBody>
       </p:sp>
     </p:spTree>
-    <p:extLst>
-      <p:ext uri="{BB962C8B-B14F-4D97-AF65-F5344CB8AC3E}">
-        <p14:creationId xmlns:p14="http://schemas.microsoft.com/office/powerpoint/2010/main" xmlns="" val="2094830404"/>
-      </p:ext>
-    </p:extLst>
   </p:cSld>
   <p:clrMapOvr>
     <a:masterClrMapping/>
@@ -16092,40 +16634,467 @@
             <p:ph type="title"/>
           </p:nvPr>
         </p:nvSpPr>
-        <p:spPr/>
+        <p:spPr>
+          <a:xfrm>
+            <a:off x="457200" y="53752"/>
+            <a:ext cx="8229600" cy="1143000"/>
+          </a:xfrm>
+        </p:spPr>
         <p:txBody>
           <a:bodyPr/>
           <a:lstStyle/>
           <a:p>
+            <a:r>
+              <a:rPr kumimoji="1" lang="en-US" altLang="ja-JP" dirty="0" smtClean="0"/>
+              <a:t>Hint 3.</a:t>
+            </a:r>
+            <a:br>
+              <a:rPr kumimoji="1" lang="en-US" altLang="ja-JP" dirty="0" smtClean="0"/>
+            </a:br>
+            <a:r>
+              <a:rPr lang="en-US" altLang="ja-JP" dirty="0" smtClean="0"/>
+              <a:t>Trace-</a:t>
+            </a:r>
+            <a:r>
+              <a:rPr lang="en-US" altLang="ja-JP" dirty="0" err="1" smtClean="0"/>
+              <a:t>elidable</a:t>
+            </a:r>
             <a:endParaRPr kumimoji="1" lang="ja-JP" altLang="en-US" dirty="0"/>
           </a:p>
         </p:txBody>
       </p:sp>
-      <p:sp>
-        <p:nvSpPr>
-          <p:cNvPr id="3" name="コンテンツ プレースホルダー 2"/>
+      <p:pic>
+        <p:nvPicPr>
+          <p:cNvPr id="3076" name="Picture 4"/>
+          <p:cNvPicPr>
+            <a:picLocks noChangeAspect="1" noChangeArrowheads="1"/>
+          </p:cNvPicPr>
+          <p:nvPr/>
+        </p:nvPicPr>
+        <p:blipFill>
+          <a:blip r:embed="rId2" cstate="print"/>
+          <a:srcRect/>
+          <a:stretch>
+            <a:fillRect/>
+          </a:stretch>
+        </p:blipFill>
+        <p:spPr bwMode="auto">
+          <a:xfrm>
+            <a:off x="35496" y="1484784"/>
+            <a:ext cx="5486400" cy="4000500"/>
+          </a:xfrm>
+          <a:prstGeom prst="rect">
+            <a:avLst/>
+          </a:prstGeom>
+          <a:noFill/>
+          <a:ln w="9525">
+            <a:noFill/>
+            <a:miter lim="800000"/>
+            <a:headEnd/>
+            <a:tailEnd/>
+          </a:ln>
+        </p:spPr>
+      </p:pic>
+      <p:cxnSp>
+        <p:nvCxnSpPr>
+          <p:cNvPr id="8" name="直線矢印コネクタ 7"/>
+          <p:cNvCxnSpPr/>
+          <p:nvPr/>
+        </p:nvCxnSpPr>
+        <p:spPr>
+          <a:xfrm flipH="1">
+            <a:off x="3275856" y="3501008"/>
+            <a:ext cx="2736304" cy="1584176"/>
+          </a:xfrm>
+          <a:prstGeom prst="straightConnector1">
+            <a:avLst/>
+          </a:prstGeom>
+          <a:ln>
+            <a:tailEnd type="arrow"/>
+          </a:ln>
+        </p:spPr>
+        <p:style>
+          <a:lnRef idx="3">
+            <a:schemeClr val="accent2"/>
+          </a:lnRef>
+          <a:fillRef idx="0">
+            <a:schemeClr val="accent2"/>
+          </a:fillRef>
+          <a:effectRef idx="2">
+            <a:schemeClr val="accent2"/>
+          </a:effectRef>
+          <a:fontRef idx="minor">
+            <a:schemeClr val="tx1"/>
+          </a:fontRef>
+        </p:style>
+      </p:cxnSp>
+      <p:sp>
+        <p:nvSpPr>
+          <p:cNvPr id="9" name="テキスト ボックス 8"/>
+          <p:cNvSpPr txBox="1"/>
+          <p:nvPr/>
+        </p:nvSpPr>
+        <p:spPr>
+          <a:xfrm>
+            <a:off x="5220072" y="2348880"/>
+            <a:ext cx="3490892" cy="1077218"/>
+          </a:xfrm>
+          <a:prstGeom prst="rect">
+            <a:avLst/>
+          </a:prstGeom>
+          <a:noFill/>
+        </p:spPr>
+        <p:txBody>
+          <a:bodyPr wrap="none" rtlCol="0">
+            <a:spAutoFit/>
+          </a:bodyPr>
+          <a:lstStyle/>
+          <a:p>
+            <a:r>
+              <a:rPr kumimoji="1" lang="en-US" altLang="ja-JP" sz="3200" dirty="0" smtClean="0">
+                <a:solidFill>
+                  <a:srgbClr val="FF0000"/>
+                </a:solidFill>
+              </a:rPr>
+              <a:t>It won't be changed</a:t>
+            </a:r>
+          </a:p>
+          <a:p>
+            <a:r>
+              <a:rPr lang="en-US" altLang="ja-JP" sz="3200" dirty="0" smtClean="0">
+                <a:solidFill>
+                  <a:srgbClr val="FF0000"/>
+                </a:solidFill>
+              </a:rPr>
+              <a:t>after initial set</a:t>
+            </a:r>
+            <a:endParaRPr kumimoji="1" lang="ja-JP" altLang="en-US" sz="3200" dirty="0">
+              <a:solidFill>
+                <a:srgbClr val="FF0000"/>
+              </a:solidFill>
+            </a:endParaRPr>
+          </a:p>
+        </p:txBody>
+      </p:sp>
+      <p:sp>
+        <p:nvSpPr>
+          <p:cNvPr id="10" name="正方形/長方形 9"/>
+          <p:cNvSpPr/>
+          <p:nvPr/>
+        </p:nvSpPr>
+        <p:spPr>
+          <a:xfrm>
+            <a:off x="107504" y="5445224"/>
+            <a:ext cx="4283968" cy="1296144"/>
+          </a:xfrm>
+          <a:prstGeom prst="rect">
+            <a:avLst/>
+          </a:prstGeom>
+        </p:spPr>
+        <p:style>
+          <a:lnRef idx="1">
+            <a:schemeClr val="accent3"/>
+          </a:lnRef>
+          <a:fillRef idx="2">
+            <a:schemeClr val="accent3"/>
+          </a:fillRef>
+          <a:effectRef idx="1">
+            <a:schemeClr val="accent3"/>
+          </a:effectRef>
+          <a:fontRef idx="minor">
+            <a:schemeClr val="dk1"/>
+          </a:fontRef>
+        </p:style>
+        <p:txBody>
+          <a:bodyPr rtlCol="0" anchor="ctr"/>
+          <a:lstStyle/>
+          <a:p>
+            <a:pPr algn="ctr"/>
+            <a:r>
+              <a:rPr lang="en-US" altLang="ja-JP" sz="3600" dirty="0" smtClean="0"/>
+              <a:t>It seems that x can be constant-folded!</a:t>
+            </a:r>
+            <a:endParaRPr kumimoji="1" lang="ja-JP" altLang="en-US" sz="3600" dirty="0"/>
+          </a:p>
+        </p:txBody>
+      </p:sp>
+      <p:sp>
+        <p:nvSpPr>
+          <p:cNvPr id="11" name="右矢印 10"/>
+          <p:cNvSpPr/>
+          <p:nvPr/>
+        </p:nvSpPr>
+        <p:spPr>
+          <a:xfrm>
+            <a:off x="4572000" y="5445224"/>
+            <a:ext cx="1368152" cy="1340768"/>
+          </a:xfrm>
+          <a:prstGeom prst="rightArrow">
+            <a:avLst/>
+          </a:prstGeom>
+        </p:spPr>
+        <p:style>
+          <a:lnRef idx="2">
+            <a:schemeClr val="accent1">
+              <a:shade val="50000"/>
+            </a:schemeClr>
+          </a:lnRef>
+          <a:fillRef idx="1">
+            <a:schemeClr val="accent1"/>
+          </a:fillRef>
+          <a:effectRef idx="0">
+            <a:schemeClr val="accent1"/>
+          </a:effectRef>
+          <a:fontRef idx="minor">
+            <a:schemeClr val="lt1"/>
+          </a:fontRef>
+        </p:style>
+        <p:txBody>
+          <a:bodyPr rtlCol="0" anchor="ctr"/>
+          <a:lstStyle/>
+          <a:p>
+            <a:pPr algn="ctr"/>
+            <a:r>
+              <a:rPr kumimoji="1" lang="en-US" altLang="ja-JP" sz="3200" dirty="0" smtClean="0"/>
+              <a:t>But!</a:t>
+            </a:r>
+            <a:endParaRPr kumimoji="1" lang="ja-JP" altLang="en-US" sz="3200" dirty="0"/>
+          </a:p>
+        </p:txBody>
+      </p:sp>
+      <p:sp>
+        <p:nvSpPr>
+          <p:cNvPr id="12" name="正方形/長方形 11"/>
+          <p:cNvSpPr/>
+          <p:nvPr/>
+        </p:nvSpPr>
+        <p:spPr>
+          <a:xfrm>
+            <a:off x="5940152" y="5489848"/>
+            <a:ext cx="3059832" cy="1296144"/>
+          </a:xfrm>
+          <a:prstGeom prst="rect">
+            <a:avLst/>
+          </a:prstGeom>
+        </p:spPr>
+        <p:style>
+          <a:lnRef idx="1">
+            <a:schemeClr val="accent3"/>
+          </a:lnRef>
+          <a:fillRef idx="2">
+            <a:schemeClr val="accent3"/>
+          </a:fillRef>
+          <a:effectRef idx="1">
+            <a:schemeClr val="accent3"/>
+          </a:effectRef>
+          <a:fontRef idx="minor">
+            <a:schemeClr val="dk1"/>
+          </a:fontRef>
+        </p:style>
+        <p:txBody>
+          <a:bodyPr rtlCol="0" anchor="ctr"/>
+          <a:lstStyle/>
+          <a:p>
+            <a:pPr algn="ctr"/>
+            <a:r>
+              <a:rPr lang="en-US" altLang="ja-JP" sz="3200" dirty="0" smtClean="0"/>
+              <a:t>Python doesn't have private...</a:t>
+            </a:r>
+            <a:endParaRPr kumimoji="1" lang="ja-JP" altLang="en-US" sz="3200" dirty="0"/>
+          </a:p>
+        </p:txBody>
+      </p:sp>
+    </p:spTree>
+  </p:cSld>
+  <p:clrMapOvr>
+    <a:masterClrMapping/>
+  </p:clrMapOvr>
+</p:sld>
+</file>
+
+<file path=ppt/slides/slide49.xml><?xml version="1.0" encoding="utf-8"?>
+<p:sld xmlns:a="http://schemas.openxmlformats.org/drawingml/2006/main" xmlns:r="http://schemas.openxmlformats.org/officeDocument/2006/relationships" xmlns:p="http://schemas.openxmlformats.org/presentationml/2006/main">
+  <p:cSld>
+    <p:spTree>
+      <p:nvGrpSpPr>
+        <p:cNvPr id="1" name=""/>
+        <p:cNvGrpSpPr/>
+        <p:nvPr/>
+      </p:nvGrpSpPr>
+      <p:grpSpPr>
+        <a:xfrm>
+          <a:off x="0" y="0"/>
+          <a:ext cx="0" cy="0"/>
+          <a:chOff x="0" y="0"/>
+          <a:chExt cx="0" cy="0"/>
+        </a:xfrm>
+      </p:grpSpPr>
+      <p:sp>
+        <p:nvSpPr>
+          <p:cNvPr id="2" name="タイトル 1"/>
           <p:cNvSpPr>
             <a:spLocks noGrp="1"/>
           </p:cNvSpPr>
           <p:nvPr>
-            <p:ph idx="1"/>
+            <p:ph type="title"/>
           </p:nvPr>
         </p:nvSpPr>
-        <p:spPr/>
+        <p:spPr>
+          <a:xfrm>
+            <a:off x="457200" y="53752"/>
+            <a:ext cx="8229600" cy="1143000"/>
+          </a:xfrm>
+        </p:spPr>
         <p:txBody>
           <a:bodyPr/>
           <a:lstStyle/>
           <a:p>
+            <a:r>
+              <a:rPr kumimoji="1" lang="en-US" altLang="ja-JP" dirty="0" smtClean="0"/>
+              <a:t>Hint 3.</a:t>
+            </a:r>
+            <a:br>
+              <a:rPr kumimoji="1" lang="en-US" altLang="ja-JP" dirty="0" smtClean="0"/>
+            </a:br>
+            <a:r>
+              <a:rPr lang="en-US" altLang="ja-JP" dirty="0" smtClean="0"/>
+              <a:t>Trace-</a:t>
+            </a:r>
+            <a:r>
+              <a:rPr lang="en-US" altLang="ja-JP" dirty="0" err="1" smtClean="0"/>
+              <a:t>elidable</a:t>
+            </a:r>
+            <a:endParaRPr kumimoji="1" lang="ja-JP" altLang="en-US" dirty="0"/>
+          </a:p>
+        </p:txBody>
+      </p:sp>
+      <p:pic>
+        <p:nvPicPr>
+          <p:cNvPr id="4098" name="Picture 2"/>
+          <p:cNvPicPr>
+            <a:picLocks noChangeAspect="1" noChangeArrowheads="1"/>
+          </p:cNvPicPr>
+          <p:nvPr/>
+        </p:nvPicPr>
+        <p:blipFill>
+          <a:blip r:embed="rId2" cstate="print"/>
+          <a:srcRect/>
+          <a:stretch>
+            <a:fillRect/>
+          </a:stretch>
+        </p:blipFill>
+        <p:spPr bwMode="auto">
+          <a:xfrm>
+            <a:off x="1247596" y="1696219"/>
+            <a:ext cx="6648808" cy="1876797"/>
+          </a:xfrm>
+          <a:prstGeom prst="rect">
+            <a:avLst/>
+          </a:prstGeom>
+          <a:noFill/>
+          <a:ln w="9525">
+            <a:noFill/>
+            <a:miter lim="800000"/>
+            <a:headEnd/>
+            <a:tailEnd/>
+          </a:ln>
+        </p:spPr>
+      </p:pic>
+      <p:sp>
+        <p:nvSpPr>
+          <p:cNvPr id="13" name="円/楕円 12"/>
+          <p:cNvSpPr/>
+          <p:nvPr/>
+        </p:nvSpPr>
+        <p:spPr>
+          <a:xfrm>
+            <a:off x="899592" y="1484784"/>
+            <a:ext cx="3312368" cy="936104"/>
+          </a:xfrm>
+          <a:prstGeom prst="ellipse">
+            <a:avLst/>
+          </a:prstGeom>
+          <a:noFill/>
+          <a:ln>
+            <a:solidFill>
+              <a:srgbClr val="FF0000"/>
+            </a:solidFill>
+          </a:ln>
+        </p:spPr>
+        <p:style>
+          <a:lnRef idx="2">
+            <a:schemeClr val="accent1">
+              <a:shade val="50000"/>
+            </a:schemeClr>
+          </a:lnRef>
+          <a:fillRef idx="1">
+            <a:schemeClr val="accent1"/>
+          </a:fillRef>
+          <a:effectRef idx="0">
+            <a:schemeClr val="accent1"/>
+          </a:effectRef>
+          <a:fontRef idx="minor">
+            <a:schemeClr val="lt1"/>
+          </a:fontRef>
+        </p:style>
+        <p:txBody>
+          <a:bodyPr rtlCol="0" anchor="ctr"/>
+          <a:lstStyle/>
+          <a:p>
+            <a:pPr algn="ctr"/>
             <a:endParaRPr kumimoji="1" lang="ja-JP" altLang="en-US"/>
           </a:p>
         </p:txBody>
       </p:sp>
+      <p:sp>
+        <p:nvSpPr>
+          <p:cNvPr id="14" name="テキスト ボックス 13"/>
+          <p:cNvSpPr txBox="1"/>
+          <p:nvPr/>
+        </p:nvSpPr>
+        <p:spPr>
+          <a:xfrm>
+            <a:off x="142240" y="4437112"/>
+            <a:ext cx="9001760" cy="1446550"/>
+          </a:xfrm>
+          <a:prstGeom prst="rect">
+            <a:avLst/>
+          </a:prstGeom>
+          <a:noFill/>
+        </p:spPr>
+        <p:txBody>
+          <a:bodyPr wrap="none" rtlCol="0">
+            <a:spAutoFit/>
+          </a:bodyPr>
+          <a:lstStyle/>
+          <a:p>
+            <a:r>
+              <a:rPr kumimoji="1" lang="en-US" altLang="ja-JP" sz="4400" dirty="0" smtClean="0">
+                <a:solidFill>
+                  <a:srgbClr val="FF0000"/>
+                </a:solidFill>
+              </a:rPr>
+              <a:t>A hint for</a:t>
+            </a:r>
+          </a:p>
+          <a:p>
+            <a:r>
+              <a:rPr lang="en-US" altLang="ja-JP" sz="4400" dirty="0" smtClean="0">
+                <a:solidFill>
+                  <a:srgbClr val="FF0000"/>
+                </a:solidFill>
+              </a:rPr>
+              <a:t>"This method can be constant-folded"</a:t>
+            </a:r>
+            <a:endParaRPr kumimoji="1" lang="ja-JP" altLang="en-US" sz="4400" dirty="0">
+              <a:solidFill>
+                <a:srgbClr val="FF0000"/>
+              </a:solidFill>
+            </a:endParaRPr>
+          </a:p>
+        </p:txBody>
+      </p:sp>
     </p:spTree>
-    <p:extLst>
-      <p:ext uri="{BB962C8B-B14F-4D97-AF65-F5344CB8AC3E}">
-        <p14:creationId xmlns:p14="http://schemas.microsoft.com/office/powerpoint/2010/main" xmlns="" val="519101280"/>
-      </p:ext>
-    </p:extLst>
   </p:cSld>
   <p:clrMapOvr>
     <a:masterClrMapping/>
@@ -16189,6 +17158,1134 @@
         </p:txBody>
       </p:sp>
     </p:spTree>
+  </p:cSld>
+  <p:clrMapOvr>
+    <a:masterClrMapping/>
+  </p:clrMapOvr>
+  <p:timing>
+    <p:tnLst>
+      <p:par>
+        <p:cTn id="1" dur="indefinite" restart="never" nodeType="tmRoot"/>
+      </p:par>
+    </p:tnLst>
+  </p:timing>
+</p:sld>
+</file>
+
+<file path=ppt/slides/slide50.xml><?xml version="1.0" encoding="utf-8"?>
+<p:sld xmlns:a="http://schemas.openxmlformats.org/drawingml/2006/main" xmlns:r="http://schemas.openxmlformats.org/officeDocument/2006/relationships" xmlns:p="http://schemas.openxmlformats.org/presentationml/2006/main">
+  <p:cSld>
+    <p:spTree>
+      <p:nvGrpSpPr>
+        <p:cNvPr id="1" name=""/>
+        <p:cNvGrpSpPr/>
+        <p:nvPr/>
+      </p:nvGrpSpPr>
+      <p:grpSpPr>
+        <a:xfrm>
+          <a:off x="0" y="0"/>
+          <a:ext cx="0" cy="0"/>
+          <a:chOff x="0" y="0"/>
+          <a:chExt cx="0" cy="0"/>
+        </a:xfrm>
+      </p:grpSpPr>
+      <p:sp>
+        <p:nvSpPr>
+          <p:cNvPr id="2" name="タイトル 1"/>
+          <p:cNvSpPr>
+            <a:spLocks noGrp="1"/>
+          </p:cNvSpPr>
+          <p:nvPr>
+            <p:ph type="title"/>
+          </p:nvPr>
+        </p:nvSpPr>
+        <p:spPr>
+          <a:xfrm>
+            <a:off x="457200" y="44624"/>
+            <a:ext cx="8229600" cy="1143000"/>
+          </a:xfrm>
+        </p:spPr>
+        <p:txBody>
+          <a:bodyPr/>
+          <a:lstStyle/>
+          <a:p>
+            <a:r>
+              <a:rPr kumimoji="1" lang="en-US" altLang="ja-JP" dirty="0" smtClean="0"/>
+              <a:t>Summary of "Hinting"</a:t>
+            </a:r>
+            <a:endParaRPr kumimoji="1" lang="ja-JP" altLang="en-US" dirty="0"/>
+          </a:p>
+        </p:txBody>
+      </p:sp>
+      <p:sp>
+        <p:nvSpPr>
+          <p:cNvPr id="3" name="コンテンツ プレースホルダ 2"/>
+          <p:cNvSpPr>
+            <a:spLocks noGrp="1"/>
+          </p:cNvSpPr>
+          <p:nvPr>
+            <p:ph idx="1"/>
+          </p:nvPr>
+        </p:nvSpPr>
+        <p:spPr>
+          <a:xfrm>
+            <a:off x="457200" y="1110754"/>
+            <a:ext cx="8229600" cy="4262462"/>
+          </a:xfrm>
+        </p:spPr>
+        <p:txBody>
+          <a:bodyPr>
+            <a:noAutofit/>
+          </a:bodyPr>
+          <a:lstStyle/>
+          <a:p>
+            <a:r>
+              <a:rPr kumimoji="1" lang="en-US" altLang="ja-JP" sz="3600" dirty="0" smtClean="0"/>
+              <a:t>Green variables and red variables</a:t>
+            </a:r>
+          </a:p>
+          <a:p>
+            <a:pPr lvl="1"/>
+            <a:r>
+              <a:rPr lang="en-US" altLang="ja-JP" sz="3200" dirty="0" smtClean="0"/>
+              <a:t>Which is program counter?</a:t>
+            </a:r>
+          </a:p>
+          <a:p>
+            <a:r>
+              <a:rPr kumimoji="1" lang="en-US" altLang="ja-JP" sz="3600" dirty="0" smtClean="0"/>
+              <a:t>JIT merge point</a:t>
+            </a:r>
+          </a:p>
+          <a:p>
+            <a:pPr lvl="1"/>
+            <a:r>
+              <a:rPr lang="en-US" altLang="ja-JP" sz="3200" dirty="0" smtClean="0"/>
+              <a:t>Where is main loop?</a:t>
+            </a:r>
+          </a:p>
+          <a:p>
+            <a:r>
+              <a:rPr kumimoji="1" lang="en-US" altLang="ja-JP" sz="3600" dirty="0" smtClean="0"/>
+              <a:t>Trace </a:t>
+            </a:r>
+            <a:r>
+              <a:rPr kumimoji="1" lang="en-US" altLang="ja-JP" sz="3600" dirty="0" err="1" smtClean="0"/>
+              <a:t>elidable</a:t>
+            </a:r>
+            <a:endParaRPr kumimoji="1" lang="en-US" altLang="ja-JP" sz="3600" dirty="0" smtClean="0"/>
+          </a:p>
+          <a:p>
+            <a:pPr lvl="1"/>
+            <a:r>
+              <a:rPr lang="en-US" altLang="ja-JP" sz="3200" dirty="0" smtClean="0"/>
+              <a:t>Inform JIT compiler that the method can be constant-folded</a:t>
+            </a:r>
+            <a:endParaRPr kumimoji="1" lang="ja-JP" altLang="en-US" sz="3200" dirty="0"/>
+          </a:p>
+        </p:txBody>
+      </p:sp>
+      <p:sp>
+        <p:nvSpPr>
+          <p:cNvPr id="4" name="右矢印 3"/>
+          <p:cNvSpPr/>
+          <p:nvPr/>
+        </p:nvSpPr>
+        <p:spPr>
+          <a:xfrm>
+            <a:off x="467544" y="5445224"/>
+            <a:ext cx="1008112" cy="1196752"/>
+          </a:xfrm>
+          <a:prstGeom prst="rightArrow">
+            <a:avLst/>
+          </a:prstGeom>
+        </p:spPr>
+        <p:style>
+          <a:lnRef idx="2">
+            <a:schemeClr val="accent1">
+              <a:shade val="50000"/>
+            </a:schemeClr>
+          </a:lnRef>
+          <a:fillRef idx="1">
+            <a:schemeClr val="accent1"/>
+          </a:fillRef>
+          <a:effectRef idx="0">
+            <a:schemeClr val="accent1"/>
+          </a:effectRef>
+          <a:fontRef idx="minor">
+            <a:schemeClr val="lt1"/>
+          </a:fontRef>
+        </p:style>
+        <p:txBody>
+          <a:bodyPr rtlCol="0" anchor="ctr"/>
+          <a:lstStyle/>
+          <a:p>
+            <a:pPr algn="ctr"/>
+            <a:endParaRPr kumimoji="1" lang="ja-JP" altLang="en-US"/>
+          </a:p>
+        </p:txBody>
+      </p:sp>
+      <p:sp>
+        <p:nvSpPr>
+          <p:cNvPr id="5" name="テキスト ボックス 4"/>
+          <p:cNvSpPr txBox="1"/>
+          <p:nvPr/>
+        </p:nvSpPr>
+        <p:spPr>
+          <a:xfrm>
+            <a:off x="1907704" y="5589240"/>
+            <a:ext cx="6909905" cy="1077218"/>
+          </a:xfrm>
+          <a:prstGeom prst="rect">
+            <a:avLst/>
+          </a:prstGeom>
+          <a:noFill/>
+        </p:spPr>
+        <p:txBody>
+          <a:bodyPr wrap="none" rtlCol="0">
+            <a:spAutoFit/>
+          </a:bodyPr>
+          <a:lstStyle/>
+          <a:p>
+            <a:r>
+              <a:rPr kumimoji="1" lang="en-US" altLang="ja-JP" sz="3200" dirty="0" smtClean="0"/>
+              <a:t>These hints are really easy to implement</a:t>
+            </a:r>
+          </a:p>
+          <a:p>
+            <a:r>
+              <a:rPr lang="en-US" altLang="ja-JP" sz="3200" dirty="0" smtClean="0"/>
+              <a:t>(almost 1 line!)</a:t>
+            </a:r>
+            <a:endParaRPr kumimoji="1" lang="ja-JP" altLang="en-US" sz="3200" dirty="0"/>
+          </a:p>
+        </p:txBody>
+      </p:sp>
+    </p:spTree>
+  </p:cSld>
+  <p:clrMapOvr>
+    <a:masterClrMapping/>
+  </p:clrMapOvr>
+</p:sld>
+</file>
+
+<file path=ppt/slides/slide51.xml><?xml version="1.0" encoding="utf-8"?>
+<p:sld xmlns:a="http://schemas.openxmlformats.org/drawingml/2006/main" xmlns:r="http://schemas.openxmlformats.org/officeDocument/2006/relationships" xmlns:p="http://schemas.openxmlformats.org/presentationml/2006/main">
+  <p:cSld>
+    <p:spTree>
+      <p:nvGrpSpPr>
+        <p:cNvPr id="1" name=""/>
+        <p:cNvGrpSpPr/>
+        <p:nvPr/>
+      </p:nvGrpSpPr>
+      <p:grpSpPr>
+        <a:xfrm>
+          <a:off x="0" y="0"/>
+          <a:ext cx="0" cy="0"/>
+          <a:chOff x="0" y="0"/>
+          <a:chExt cx="0" cy="0"/>
+        </a:xfrm>
+      </p:grpSpPr>
+      <p:sp>
+        <p:nvSpPr>
+          <p:cNvPr id="2" name="タイトル 1"/>
+          <p:cNvSpPr>
+            <a:spLocks noGrp="1"/>
+          </p:cNvSpPr>
+          <p:nvPr>
+            <p:ph type="title"/>
+          </p:nvPr>
+        </p:nvSpPr>
+        <p:spPr/>
+        <p:txBody>
+          <a:bodyPr/>
+          <a:lstStyle/>
+          <a:p>
+            <a:r>
+              <a:rPr kumimoji="1" lang="en-US" altLang="ja-JP" dirty="0" smtClean="0"/>
+              <a:t>Result of applying hints</a:t>
+            </a:r>
+            <a:endParaRPr kumimoji="1" lang="ja-JP" altLang="en-US" dirty="0"/>
+          </a:p>
+        </p:txBody>
+      </p:sp>
+      <p:pic>
+        <p:nvPicPr>
+          <p:cNvPr id="5122" name="Picture 2"/>
+          <p:cNvPicPr>
+            <a:picLocks noChangeAspect="1" noChangeArrowheads="1"/>
+          </p:cNvPicPr>
+          <p:nvPr/>
+        </p:nvPicPr>
+        <p:blipFill>
+          <a:blip r:embed="rId2" cstate="print"/>
+          <a:srcRect/>
+          <a:stretch>
+            <a:fillRect/>
+          </a:stretch>
+        </p:blipFill>
+        <p:spPr bwMode="auto">
+          <a:xfrm>
+            <a:off x="4763" y="1891630"/>
+            <a:ext cx="9134475" cy="4057650"/>
+          </a:xfrm>
+          <a:prstGeom prst="rect">
+            <a:avLst/>
+          </a:prstGeom>
+          <a:noFill/>
+          <a:ln w="9525">
+            <a:noFill/>
+            <a:miter lim="800000"/>
+            <a:headEnd/>
+            <a:tailEnd/>
+          </a:ln>
+        </p:spPr>
+      </p:pic>
+    </p:spTree>
+  </p:cSld>
+  <p:clrMapOvr>
+    <a:masterClrMapping/>
+  </p:clrMapOvr>
+</p:sld>
+</file>
+
+<file path=ppt/slides/slide52.xml><?xml version="1.0" encoding="utf-8"?>
+<p:sld xmlns:a="http://schemas.openxmlformats.org/drawingml/2006/main" xmlns:r="http://schemas.openxmlformats.org/officeDocument/2006/relationships" xmlns:p="http://schemas.openxmlformats.org/presentationml/2006/main">
+  <p:cSld>
+    <p:spTree>
+      <p:nvGrpSpPr>
+        <p:cNvPr id="1" name=""/>
+        <p:cNvGrpSpPr/>
+        <p:nvPr/>
+      </p:nvGrpSpPr>
+      <p:grpSpPr>
+        <a:xfrm>
+          <a:off x="0" y="0"/>
+          <a:ext cx="0" cy="0"/>
+          <a:chOff x="0" y="0"/>
+          <a:chExt cx="0" cy="0"/>
+        </a:xfrm>
+      </p:grpSpPr>
+      <p:sp>
+        <p:nvSpPr>
+          <p:cNvPr id="2" name="タイトル 1"/>
+          <p:cNvSpPr>
+            <a:spLocks noGrp="1"/>
+          </p:cNvSpPr>
+          <p:nvPr>
+            <p:ph type="title"/>
+          </p:nvPr>
+        </p:nvSpPr>
+        <p:spPr>
+          <a:xfrm>
+            <a:off x="467544" y="980728"/>
+            <a:ext cx="8229600" cy="5040560"/>
+          </a:xfrm>
+        </p:spPr>
+        <p:txBody>
+          <a:bodyPr>
+            <a:noAutofit/>
+          </a:bodyPr>
+          <a:lstStyle/>
+          <a:p>
+            <a:r>
+              <a:rPr kumimoji="1" lang="en-US" altLang="ja-JP" sz="8800" dirty="0" smtClean="0"/>
+              <a:t>In result, it is 5 - 20x faster than </a:t>
+            </a:r>
+            <a:r>
+              <a:rPr kumimoji="1" lang="en-US" altLang="ja-JP" sz="8800" dirty="0" err="1" smtClean="0"/>
+              <a:t>CPython</a:t>
+            </a:r>
+            <a:r>
+              <a:rPr kumimoji="1" lang="en-US" altLang="ja-JP" sz="8800" dirty="0" smtClean="0"/>
+              <a:t>!!</a:t>
+            </a:r>
+            <a:endParaRPr kumimoji="1" lang="ja-JP" altLang="en-US" sz="8800" dirty="0"/>
+          </a:p>
+        </p:txBody>
+      </p:sp>
+    </p:spTree>
+  </p:cSld>
+  <p:clrMapOvr>
+    <a:masterClrMapping/>
+  </p:clrMapOvr>
+</p:sld>
+</file>
+
+<file path=ppt/slides/slide53.xml><?xml version="1.0" encoding="utf-8"?>
+<p:sld xmlns:a="http://schemas.openxmlformats.org/drawingml/2006/main" xmlns:r="http://schemas.openxmlformats.org/officeDocument/2006/relationships" xmlns:p="http://schemas.openxmlformats.org/presentationml/2006/main">
+  <p:cSld>
+    <p:spTree>
+      <p:nvGrpSpPr>
+        <p:cNvPr id="1" name=""/>
+        <p:cNvGrpSpPr/>
+        <p:nvPr/>
+      </p:nvGrpSpPr>
+      <p:grpSpPr>
+        <a:xfrm>
+          <a:off x="0" y="0"/>
+          <a:ext cx="0" cy="0"/>
+          <a:chOff x="0" y="0"/>
+          <a:chExt cx="0" cy="0"/>
+        </a:xfrm>
+      </p:grpSpPr>
+      <p:sp>
+        <p:nvSpPr>
+          <p:cNvPr id="2" name="タイトル 1"/>
+          <p:cNvSpPr>
+            <a:spLocks noGrp="1"/>
+          </p:cNvSpPr>
+          <p:nvPr>
+            <p:ph type="title"/>
+          </p:nvPr>
+        </p:nvSpPr>
+        <p:spPr/>
+        <p:txBody>
+          <a:bodyPr/>
+          <a:lstStyle/>
+          <a:p>
+            <a:r>
+              <a:rPr kumimoji="1" lang="en-US" altLang="ja-JP" dirty="0" smtClean="0"/>
+              <a:t>How can you utilize </a:t>
+            </a:r>
+            <a:r>
+              <a:rPr kumimoji="1" lang="en-US" altLang="ja-JP" dirty="0" err="1" smtClean="0"/>
+              <a:t>PyPy</a:t>
+            </a:r>
+            <a:r>
+              <a:rPr kumimoji="1" lang="en-US" altLang="ja-JP" dirty="0" smtClean="0"/>
+              <a:t> ?</a:t>
+            </a:r>
+            <a:endParaRPr kumimoji="1" lang="ja-JP" altLang="en-US" dirty="0"/>
+          </a:p>
+        </p:txBody>
+      </p:sp>
+      <p:sp>
+        <p:nvSpPr>
+          <p:cNvPr id="3" name="コンテンツ プレースホルダー 2"/>
+          <p:cNvSpPr>
+            <a:spLocks noGrp="1"/>
+          </p:cNvSpPr>
+          <p:nvPr>
+            <p:ph idx="1"/>
+          </p:nvPr>
+        </p:nvSpPr>
+        <p:spPr>
+          <a:xfrm>
+            <a:off x="457200" y="1600201"/>
+            <a:ext cx="8229600" cy="1252736"/>
+          </a:xfrm>
+        </p:spPr>
+        <p:txBody>
+          <a:bodyPr/>
+          <a:lstStyle/>
+          <a:p>
+            <a:r>
+              <a:rPr kumimoji="1" lang="en-US" altLang="ja-JP" dirty="0" smtClean="0"/>
+              <a:t>If you use programming language which requires VM to execute in your project..</a:t>
+            </a:r>
+            <a:endParaRPr kumimoji="1" lang="ja-JP" altLang="en-US" dirty="0"/>
+          </a:p>
+        </p:txBody>
+      </p:sp>
+      <p:sp>
+        <p:nvSpPr>
+          <p:cNvPr id="4" name="下矢印 3"/>
+          <p:cNvSpPr/>
+          <p:nvPr/>
+        </p:nvSpPr>
+        <p:spPr>
+          <a:xfrm>
+            <a:off x="2807804" y="3284984"/>
+            <a:ext cx="3528392" cy="720080"/>
+          </a:xfrm>
+          <a:prstGeom prst="downArrow">
+            <a:avLst/>
+          </a:prstGeom>
+        </p:spPr>
+        <p:style>
+          <a:lnRef idx="2">
+            <a:schemeClr val="accent1">
+              <a:shade val="50000"/>
+            </a:schemeClr>
+          </a:lnRef>
+          <a:fillRef idx="1">
+            <a:schemeClr val="accent1"/>
+          </a:fillRef>
+          <a:effectRef idx="0">
+            <a:schemeClr val="accent1"/>
+          </a:effectRef>
+          <a:fontRef idx="minor">
+            <a:schemeClr val="lt1"/>
+          </a:fontRef>
+        </p:style>
+        <p:txBody>
+          <a:bodyPr rtlCol="0" anchor="ctr"/>
+          <a:lstStyle/>
+          <a:p>
+            <a:pPr algn="ctr"/>
+            <a:endParaRPr kumimoji="1" lang="ja-JP" altLang="en-US"/>
+          </a:p>
+        </p:txBody>
+      </p:sp>
+      <p:sp>
+        <p:nvSpPr>
+          <p:cNvPr id="5" name="テキスト ボックス 4"/>
+          <p:cNvSpPr txBox="1"/>
+          <p:nvPr/>
+        </p:nvSpPr>
+        <p:spPr>
+          <a:xfrm>
+            <a:off x="827584" y="4653136"/>
+            <a:ext cx="7488832" cy="1323439"/>
+          </a:xfrm>
+          <a:prstGeom prst="rect">
+            <a:avLst/>
+          </a:prstGeom>
+          <a:noFill/>
+        </p:spPr>
+        <p:txBody>
+          <a:bodyPr wrap="square" rtlCol="0">
+            <a:spAutoFit/>
+          </a:bodyPr>
+          <a:lstStyle/>
+          <a:p>
+            <a:pPr algn="ctr"/>
+            <a:r>
+              <a:rPr kumimoji="1" lang="en-US" altLang="ja-JP" sz="4000" dirty="0" smtClean="0"/>
+              <a:t>Introduce VM made by </a:t>
+            </a:r>
+            <a:r>
+              <a:rPr kumimoji="1" lang="en-US" altLang="ja-JP" sz="4000" dirty="0" err="1" smtClean="0"/>
+              <a:t>PyPy</a:t>
+            </a:r>
+            <a:r>
+              <a:rPr kumimoji="1" lang="en-US" altLang="ja-JP" sz="4000" dirty="0" smtClean="0"/>
+              <a:t> to make it much efficient!!</a:t>
+            </a:r>
+            <a:endParaRPr kumimoji="1" lang="ja-JP" altLang="en-US" sz="4000" dirty="0"/>
+          </a:p>
+        </p:txBody>
+      </p:sp>
+    </p:spTree>
+    <p:extLst>
+      <p:ext uri="{BB962C8B-B14F-4D97-AF65-F5344CB8AC3E}">
+        <p14:creationId xmlns:p14="http://schemas.microsoft.com/office/powerpoint/2010/main" xmlns="" val="1224126970"/>
+      </p:ext>
+    </p:extLst>
+  </p:cSld>
+  <p:clrMapOvr>
+    <a:masterClrMapping/>
+  </p:clrMapOvr>
+  <p:timing>
+    <p:tnLst>
+      <p:par>
+        <p:cTn id="1" dur="indefinite" restart="never" nodeType="tmRoot"/>
+      </p:par>
+    </p:tnLst>
+  </p:timing>
+</p:sld>
+</file>
+
+<file path=ppt/slides/slide54.xml><?xml version="1.0" encoding="utf-8"?>
+<p:sld xmlns:a="http://schemas.openxmlformats.org/drawingml/2006/main" xmlns:r="http://schemas.openxmlformats.org/officeDocument/2006/relationships" xmlns:p="http://schemas.openxmlformats.org/presentationml/2006/main">
+  <p:cSld>
+    <p:spTree>
+      <p:nvGrpSpPr>
+        <p:cNvPr id="1" name=""/>
+        <p:cNvGrpSpPr/>
+        <p:nvPr/>
+      </p:nvGrpSpPr>
+      <p:grpSpPr>
+        <a:xfrm>
+          <a:off x="0" y="0"/>
+          <a:ext cx="0" cy="0"/>
+          <a:chOff x="0" y="0"/>
+          <a:chExt cx="0" cy="0"/>
+        </a:xfrm>
+      </p:grpSpPr>
+      <p:sp>
+        <p:nvSpPr>
+          <p:cNvPr id="2" name="タイトル 1"/>
+          <p:cNvSpPr>
+            <a:spLocks noGrp="1"/>
+          </p:cNvSpPr>
+          <p:nvPr>
+            <p:ph type="title"/>
+          </p:nvPr>
+        </p:nvSpPr>
+        <p:spPr/>
+        <p:txBody>
+          <a:bodyPr/>
+          <a:lstStyle/>
+          <a:p>
+            <a:r>
+              <a:rPr kumimoji="1" lang="en-US" altLang="ja-JP" dirty="0" smtClean="0"/>
+              <a:t>For web programmer...</a:t>
+            </a:r>
+            <a:endParaRPr kumimoji="1" lang="ja-JP" altLang="en-US" dirty="0"/>
+          </a:p>
+        </p:txBody>
+      </p:sp>
+      <p:pic>
+        <p:nvPicPr>
+          <p:cNvPr id="6146" name="Picture 2"/>
+          <p:cNvPicPr>
+            <a:picLocks noChangeAspect="1" noChangeArrowheads="1"/>
+          </p:cNvPicPr>
+          <p:nvPr/>
+        </p:nvPicPr>
+        <p:blipFill>
+          <a:blip r:embed="rId2" cstate="print"/>
+          <a:srcRect/>
+          <a:stretch>
+            <a:fillRect/>
+          </a:stretch>
+        </p:blipFill>
+        <p:spPr bwMode="auto">
+          <a:xfrm>
+            <a:off x="163185" y="2492896"/>
+            <a:ext cx="8873311" cy="1944216"/>
+          </a:xfrm>
+          <a:prstGeom prst="rect">
+            <a:avLst/>
+          </a:prstGeom>
+          <a:noFill/>
+          <a:ln w="9525">
+            <a:noFill/>
+            <a:miter lim="800000"/>
+            <a:headEnd/>
+            <a:tailEnd/>
+          </a:ln>
+        </p:spPr>
+      </p:pic>
+      <p:sp>
+        <p:nvSpPr>
+          <p:cNvPr id="5" name="テキスト ボックス 4"/>
+          <p:cNvSpPr txBox="1"/>
+          <p:nvPr/>
+        </p:nvSpPr>
+        <p:spPr>
+          <a:xfrm>
+            <a:off x="181418" y="5373216"/>
+            <a:ext cx="8962582" cy="584775"/>
+          </a:xfrm>
+          <a:prstGeom prst="rect">
+            <a:avLst/>
+          </a:prstGeom>
+          <a:noFill/>
+        </p:spPr>
+        <p:txBody>
+          <a:bodyPr wrap="none" rtlCol="0">
+            <a:spAutoFit/>
+          </a:bodyPr>
+          <a:lstStyle/>
+          <a:p>
+            <a:r>
+              <a:rPr kumimoji="1" lang="en-US" altLang="ja-JP" sz="3200" dirty="0" smtClean="0"/>
+              <a:t>Recently, </a:t>
+            </a:r>
+            <a:r>
+              <a:rPr kumimoji="1" lang="en-US" altLang="ja-JP" sz="3200" dirty="0" err="1" smtClean="0"/>
+              <a:t>PyPy</a:t>
+            </a:r>
+            <a:r>
+              <a:rPr kumimoji="1" lang="en-US" altLang="ja-JP" sz="3200" dirty="0" smtClean="0"/>
+              <a:t> version of PHP is under development!</a:t>
+            </a:r>
+            <a:endParaRPr kumimoji="1" lang="ja-JP" altLang="en-US" sz="3200" dirty="0"/>
+          </a:p>
+        </p:txBody>
+      </p:sp>
+    </p:spTree>
+  </p:cSld>
+  <p:clrMapOvr>
+    <a:masterClrMapping/>
+  </p:clrMapOvr>
+</p:sld>
+</file>
+
+<file path=ppt/slides/slide55.xml><?xml version="1.0" encoding="utf-8"?>
+<p:sld xmlns:a="http://schemas.openxmlformats.org/drawingml/2006/main" xmlns:r="http://schemas.openxmlformats.org/officeDocument/2006/relationships" xmlns:p="http://schemas.openxmlformats.org/presentationml/2006/main">
+  <p:cSld>
+    <p:spTree>
+      <p:nvGrpSpPr>
+        <p:cNvPr id="1" name=""/>
+        <p:cNvGrpSpPr/>
+        <p:nvPr/>
+      </p:nvGrpSpPr>
+      <p:grpSpPr>
+        <a:xfrm>
+          <a:off x="0" y="0"/>
+          <a:ext cx="0" cy="0"/>
+          <a:chOff x="0" y="0"/>
+          <a:chExt cx="0" cy="0"/>
+        </a:xfrm>
+      </p:grpSpPr>
+      <p:pic>
+        <p:nvPicPr>
+          <p:cNvPr id="7170" name="Picture 2"/>
+          <p:cNvPicPr>
+            <a:picLocks noChangeAspect="1" noChangeArrowheads="1"/>
+          </p:cNvPicPr>
+          <p:nvPr/>
+        </p:nvPicPr>
+        <p:blipFill>
+          <a:blip r:embed="rId2" cstate="print"/>
+          <a:srcRect/>
+          <a:stretch>
+            <a:fillRect/>
+          </a:stretch>
+        </p:blipFill>
+        <p:spPr bwMode="auto">
+          <a:xfrm>
+            <a:off x="64964" y="1916832"/>
+            <a:ext cx="9043540" cy="3528392"/>
+          </a:xfrm>
+          <a:prstGeom prst="rect">
+            <a:avLst/>
+          </a:prstGeom>
+          <a:noFill/>
+          <a:ln w="9525">
+            <a:noFill/>
+            <a:miter lim="800000"/>
+            <a:headEnd/>
+            <a:tailEnd/>
+          </a:ln>
+        </p:spPr>
+      </p:pic>
+      <p:sp>
+        <p:nvSpPr>
+          <p:cNvPr id="5" name="テキスト ボックス 4"/>
+          <p:cNvSpPr txBox="1"/>
+          <p:nvPr/>
+        </p:nvSpPr>
+        <p:spPr>
+          <a:xfrm>
+            <a:off x="608415" y="476672"/>
+            <a:ext cx="7927170" cy="1200329"/>
+          </a:xfrm>
+          <a:prstGeom prst="rect">
+            <a:avLst/>
+          </a:prstGeom>
+          <a:noFill/>
+        </p:spPr>
+        <p:txBody>
+          <a:bodyPr wrap="none" rtlCol="0">
+            <a:spAutoFit/>
+          </a:bodyPr>
+          <a:lstStyle/>
+          <a:p>
+            <a:r>
+              <a:rPr kumimoji="1" lang="en-US" altLang="ja-JP" sz="3600" dirty="0" smtClean="0"/>
+              <a:t>7.0x - 15.4x speed up compared to </a:t>
+            </a:r>
+            <a:r>
+              <a:rPr kumimoji="1" lang="en-US" altLang="ja-JP" sz="3600" dirty="0" err="1" smtClean="0"/>
+              <a:t>Zend</a:t>
+            </a:r>
+            <a:r>
+              <a:rPr kumimoji="1" lang="en-US" altLang="ja-JP" sz="3600" dirty="0" smtClean="0"/>
+              <a:t>,</a:t>
+            </a:r>
+          </a:p>
+          <a:p>
+            <a:r>
+              <a:rPr lang="en-US" altLang="ja-JP" sz="3600" dirty="0" smtClean="0"/>
+              <a:t>1.3x - 5.3x speed up compared to </a:t>
+            </a:r>
+            <a:r>
+              <a:rPr lang="en-US" altLang="ja-JP" sz="3600" dirty="0" err="1" smtClean="0"/>
+              <a:t>HipHop</a:t>
+            </a:r>
+            <a:endParaRPr kumimoji="1" lang="ja-JP" altLang="en-US" sz="3600" dirty="0"/>
+          </a:p>
+        </p:txBody>
+      </p:sp>
+      <p:sp>
+        <p:nvSpPr>
+          <p:cNvPr id="6" name="テキスト ボックス 5"/>
+          <p:cNvSpPr txBox="1"/>
+          <p:nvPr/>
+        </p:nvSpPr>
+        <p:spPr>
+          <a:xfrm>
+            <a:off x="467544" y="5517232"/>
+            <a:ext cx="8208912" cy="1077218"/>
+          </a:xfrm>
+          <a:prstGeom prst="rect">
+            <a:avLst/>
+          </a:prstGeom>
+          <a:noFill/>
+        </p:spPr>
+        <p:txBody>
+          <a:bodyPr wrap="square" rtlCol="0">
+            <a:spAutoFit/>
+          </a:bodyPr>
+          <a:lstStyle/>
+          <a:p>
+            <a:r>
+              <a:rPr kumimoji="1" lang="en-US" altLang="ja-JP" sz="3200" dirty="0" smtClean="0"/>
+              <a:t>It's still under development, but, it is possible that your web application will be much efficient!</a:t>
+            </a:r>
+            <a:endParaRPr kumimoji="1" lang="ja-JP" altLang="en-US" sz="3200" dirty="0"/>
+          </a:p>
+        </p:txBody>
+      </p:sp>
+    </p:spTree>
+  </p:cSld>
+  <p:clrMapOvr>
+    <a:masterClrMapping/>
+  </p:clrMapOvr>
+</p:sld>
+</file>
+
+<file path=ppt/slides/slide56.xml><?xml version="1.0" encoding="utf-8"?>
+<p:sld xmlns:a="http://schemas.openxmlformats.org/drawingml/2006/main" xmlns:r="http://schemas.openxmlformats.org/officeDocument/2006/relationships" xmlns:p="http://schemas.openxmlformats.org/presentationml/2006/main">
+  <p:cSld>
+    <p:spTree>
+      <p:nvGrpSpPr>
+        <p:cNvPr id="1" name=""/>
+        <p:cNvGrpSpPr/>
+        <p:nvPr/>
+      </p:nvGrpSpPr>
+      <p:grpSpPr>
+        <a:xfrm>
+          <a:off x="0" y="0"/>
+          <a:ext cx="0" cy="0"/>
+          <a:chOff x="0" y="0"/>
+          <a:chExt cx="0" cy="0"/>
+        </a:xfrm>
+      </p:grpSpPr>
+      <p:sp>
+        <p:nvSpPr>
+          <p:cNvPr id="2" name="タイトル 1"/>
+          <p:cNvSpPr>
+            <a:spLocks noGrp="1"/>
+          </p:cNvSpPr>
+          <p:nvPr>
+            <p:ph type="title"/>
+          </p:nvPr>
+        </p:nvSpPr>
+        <p:spPr/>
+        <p:txBody>
+          <a:bodyPr/>
+          <a:lstStyle/>
+          <a:p>
+            <a:r>
+              <a:rPr kumimoji="1" lang="en-US" altLang="ja-JP" dirty="0" smtClean="0"/>
+              <a:t>Conclusion</a:t>
+            </a:r>
+            <a:endParaRPr kumimoji="1" lang="ja-JP" altLang="en-US" dirty="0"/>
+          </a:p>
+        </p:txBody>
+      </p:sp>
+      <p:sp>
+        <p:nvSpPr>
+          <p:cNvPr id="3" name="コンテンツ プレースホルダ 2"/>
+          <p:cNvSpPr>
+            <a:spLocks noGrp="1"/>
+          </p:cNvSpPr>
+          <p:nvPr>
+            <p:ph idx="1"/>
+          </p:nvPr>
+        </p:nvSpPr>
+        <p:spPr>
+          <a:xfrm>
+            <a:off x="457200" y="1268760"/>
+            <a:ext cx="8229600" cy="5257800"/>
+          </a:xfrm>
+        </p:spPr>
+        <p:txBody>
+          <a:bodyPr/>
+          <a:lstStyle/>
+          <a:p>
+            <a:r>
+              <a:rPr kumimoji="1" lang="en-US" altLang="ja-JP" dirty="0" err="1" smtClean="0"/>
+              <a:t>PyPy</a:t>
+            </a:r>
+            <a:r>
+              <a:rPr kumimoji="1" lang="en-US" altLang="ja-JP" dirty="0" smtClean="0"/>
+              <a:t> is a framework for implementing VM in Dynamic language easily , without giving up performance</a:t>
+            </a:r>
+          </a:p>
+          <a:p>
+            <a:r>
+              <a:rPr lang="en-US" altLang="ja-JP" dirty="0" err="1" smtClean="0"/>
+              <a:t>PyPy</a:t>
+            </a:r>
+            <a:r>
+              <a:rPr lang="en-US" altLang="ja-JP" dirty="0" smtClean="0"/>
+              <a:t> uses JIT compiler , which uses meta-tracing, hinting mechanism to achieve great performance (even programmer don't have to implement JIT compiler)</a:t>
+            </a:r>
+          </a:p>
+          <a:p>
+            <a:r>
+              <a:rPr kumimoji="1" lang="en-US" altLang="ja-JP" dirty="0" smtClean="0"/>
+              <a:t>It might be real that all existing interpreter can improve their performance by implement it by </a:t>
+            </a:r>
+            <a:r>
+              <a:rPr kumimoji="1" lang="en-US" altLang="ja-JP" dirty="0" err="1" smtClean="0"/>
+              <a:t>PyPy</a:t>
+            </a:r>
+            <a:r>
+              <a:rPr kumimoji="1" lang="en-US" altLang="ja-JP" dirty="0" smtClean="0"/>
+              <a:t> (such as PHP)</a:t>
+            </a:r>
+            <a:endParaRPr kumimoji="1" lang="ja-JP" altLang="en-US" dirty="0"/>
+          </a:p>
+        </p:txBody>
+      </p:sp>
+    </p:spTree>
+  </p:cSld>
+  <p:clrMapOvr>
+    <a:masterClrMapping/>
+  </p:clrMapOvr>
+</p:sld>
+</file>
+
+<file path=ppt/slides/slide57.xml><?xml version="1.0" encoding="utf-8"?>
+<p:sld xmlns:a="http://schemas.openxmlformats.org/drawingml/2006/main" xmlns:r="http://schemas.openxmlformats.org/officeDocument/2006/relationships" xmlns:p="http://schemas.openxmlformats.org/presentationml/2006/main">
+  <p:cSld>
+    <p:spTree>
+      <p:nvGrpSpPr>
+        <p:cNvPr id="1" name=""/>
+        <p:cNvGrpSpPr/>
+        <p:nvPr/>
+      </p:nvGrpSpPr>
+      <p:grpSpPr>
+        <a:xfrm>
+          <a:off x="0" y="0"/>
+          <a:ext cx="0" cy="0"/>
+          <a:chOff x="0" y="0"/>
+          <a:chExt cx="0" cy="0"/>
+        </a:xfrm>
+      </p:grpSpPr>
+      <p:sp>
+        <p:nvSpPr>
+          <p:cNvPr id="2" name="タイトル 1"/>
+          <p:cNvSpPr>
+            <a:spLocks noGrp="1"/>
+          </p:cNvSpPr>
+          <p:nvPr>
+            <p:ph type="title"/>
+          </p:nvPr>
+        </p:nvSpPr>
+        <p:spPr>
+          <a:xfrm>
+            <a:off x="457200" y="-186010"/>
+            <a:ext cx="8229600" cy="1143000"/>
+          </a:xfrm>
+        </p:spPr>
+        <p:txBody>
+          <a:bodyPr/>
+          <a:lstStyle/>
+          <a:p>
+            <a:r>
+              <a:rPr kumimoji="1" lang="en-US" altLang="ja-JP" dirty="0" smtClean="0"/>
+              <a:t>Q&amp;A</a:t>
+            </a:r>
+            <a:endParaRPr kumimoji="1" lang="ja-JP" altLang="en-US" dirty="0"/>
+          </a:p>
+        </p:txBody>
+      </p:sp>
+      <p:sp>
+        <p:nvSpPr>
+          <p:cNvPr id="3" name="コンテンツ プレースホルダ 2"/>
+          <p:cNvSpPr>
+            <a:spLocks noGrp="1"/>
+          </p:cNvSpPr>
+          <p:nvPr>
+            <p:ph idx="1"/>
+          </p:nvPr>
+        </p:nvSpPr>
+        <p:spPr>
+          <a:xfrm>
+            <a:off x="457200" y="808112"/>
+            <a:ext cx="8229600" cy="6049888"/>
+          </a:xfrm>
+        </p:spPr>
+        <p:txBody>
+          <a:bodyPr>
+            <a:noAutofit/>
+          </a:bodyPr>
+          <a:lstStyle/>
+          <a:p>
+            <a:r>
+              <a:rPr kumimoji="1" lang="en-US" altLang="ja-JP" sz="3600" dirty="0" smtClean="0"/>
+              <a:t>Of course you can ask me now</a:t>
+            </a:r>
+            <a:br>
+              <a:rPr kumimoji="1" lang="en-US" altLang="ja-JP" sz="3600" dirty="0" smtClean="0"/>
+            </a:br>
+            <a:r>
+              <a:rPr kumimoji="1" lang="en-US" altLang="ja-JP" sz="3600" dirty="0" smtClean="0"/>
+              <a:t>(please feel free and don't hesitate !)</a:t>
+            </a:r>
+          </a:p>
+          <a:p>
+            <a:r>
+              <a:rPr lang="en-US" altLang="ja-JP" sz="3600" dirty="0" smtClean="0"/>
+              <a:t>I will answer your question in these social site</a:t>
+            </a:r>
+          </a:p>
+          <a:p>
+            <a:endParaRPr lang="en-US" altLang="ja-JP" sz="3600" dirty="0" smtClean="0"/>
+          </a:p>
+          <a:p>
+            <a:pPr lvl="1"/>
+            <a:r>
+              <a:rPr kumimoji="1" lang="en-US" altLang="ja-JP" sz="3600" dirty="0" err="1" smtClean="0"/>
+              <a:t>Facebook</a:t>
+            </a:r>
+            <a:endParaRPr kumimoji="1" lang="en-US" altLang="ja-JP" sz="3600" dirty="0" smtClean="0"/>
+          </a:p>
+          <a:p>
+            <a:pPr lvl="1"/>
+            <a:r>
+              <a:rPr lang="en-US" altLang="ja-JP" sz="3600" dirty="0" smtClean="0"/>
+              <a:t>Twitter</a:t>
+            </a:r>
+          </a:p>
+          <a:p>
+            <a:pPr lvl="1"/>
+            <a:endParaRPr lang="en-US" altLang="ja-JP" sz="3200" dirty="0" smtClean="0"/>
+          </a:p>
+          <a:p>
+            <a:pPr lvl="1">
+              <a:buNone/>
+            </a:pPr>
+            <a:r>
+              <a:rPr kumimoji="1" lang="en-US" altLang="ja-JP" sz="3200" dirty="0" smtClean="0"/>
+              <a:t>.... My account can be easily found through PyConJP2012's page!</a:t>
+            </a:r>
+            <a:endParaRPr kumimoji="1" lang="ja-JP" altLang="en-US" sz="3200" dirty="0"/>
+          </a:p>
+        </p:txBody>
+      </p:sp>
+    </p:spTree>
+  </p:cSld>
+  <p:clrMapOvr>
+    <a:masterClrMapping/>
+  </p:clrMapOvr>
+</p:sld>
+</file>
+
+<file path=ppt/slides/slide58.xml><?xml version="1.0" encoding="utf-8"?>
+<p:sld xmlns:a="http://schemas.openxmlformats.org/drawingml/2006/main" xmlns:r="http://schemas.openxmlformats.org/officeDocument/2006/relationships" xmlns:p="http://schemas.openxmlformats.org/presentationml/2006/main">
+  <p:cSld>
+    <p:spTree>
+      <p:nvGrpSpPr>
+        <p:cNvPr id="1" name=""/>
+        <p:cNvGrpSpPr/>
+        <p:nvPr/>
+      </p:nvGrpSpPr>
+      <p:grpSpPr>
+        <a:xfrm>
+          <a:off x="0" y="0"/>
+          <a:ext cx="0" cy="0"/>
+          <a:chOff x="0" y="0"/>
+          <a:chExt cx="0" cy="0"/>
+        </a:xfrm>
+      </p:grpSpPr>
+      <p:sp>
+        <p:nvSpPr>
+          <p:cNvPr id="2" name="タイトル 1"/>
+          <p:cNvSpPr>
+            <a:spLocks noGrp="1"/>
+          </p:cNvSpPr>
+          <p:nvPr>
+            <p:ph type="title"/>
+          </p:nvPr>
+        </p:nvSpPr>
+        <p:spPr/>
+        <p:txBody>
+          <a:bodyPr>
+            <a:normAutofit/>
+          </a:bodyPr>
+          <a:lstStyle/>
+          <a:p>
+            <a:r>
+              <a:rPr kumimoji="1" lang="en-US" altLang="ja-JP" sz="6600" dirty="0" smtClean="0"/>
+              <a:t>Fin</a:t>
+            </a:r>
+            <a:endParaRPr kumimoji="1" lang="ja-JP" altLang="en-US" sz="6600" dirty="0"/>
+          </a:p>
+        </p:txBody>
+      </p:sp>
+    </p:spTree>
+  </p:cSld>
+  <p:clrMapOvr>
+    <a:masterClrMapping/>
+  </p:clrMapOvr>
+</p:sld>
+</file>
+
+<file path=ppt/slides/slide59.xml><?xml version="1.0" encoding="utf-8"?>
+<p:sld xmlns:a="http://schemas.openxmlformats.org/drawingml/2006/main" xmlns:r="http://schemas.openxmlformats.org/officeDocument/2006/relationships" xmlns:p="http://schemas.openxmlformats.org/presentationml/2006/main">
+  <p:cSld>
+    <p:spTree>
+      <p:nvGrpSpPr>
+        <p:cNvPr id="1" name=""/>
+        <p:cNvGrpSpPr/>
+        <p:nvPr/>
+      </p:nvGrpSpPr>
+      <p:grpSpPr>
+        <a:xfrm>
+          <a:off x="0" y="0"/>
+          <a:ext cx="0" cy="0"/>
+          <a:chOff x="0" y="0"/>
+          <a:chExt cx="0" cy="0"/>
+        </a:xfrm>
+      </p:grpSpPr>
+      <p:sp>
+        <p:nvSpPr>
+          <p:cNvPr id="2" name="タイトル 1"/>
+          <p:cNvSpPr>
+            <a:spLocks noGrp="1"/>
+          </p:cNvSpPr>
+          <p:nvPr>
+            <p:ph type="title"/>
+          </p:nvPr>
+        </p:nvSpPr>
+        <p:spPr/>
+        <p:txBody>
+          <a:bodyPr/>
+          <a:lstStyle/>
+          <a:p>
+            <a:r>
+              <a:rPr lang="en-US" altLang="ja-JP" dirty="0" smtClean="0"/>
+              <a:t>Suggestion</a:t>
+            </a:r>
+            <a:endParaRPr kumimoji="1" lang="ja-JP" altLang="en-US" dirty="0"/>
+          </a:p>
+        </p:txBody>
+      </p:sp>
+      <p:sp>
+        <p:nvSpPr>
+          <p:cNvPr id="3" name="コンテンツ プレースホルダー 2"/>
+          <p:cNvSpPr>
+            <a:spLocks noGrp="1"/>
+          </p:cNvSpPr>
+          <p:nvPr>
+            <p:ph idx="1"/>
+          </p:nvPr>
+        </p:nvSpPr>
+        <p:spPr/>
+        <p:txBody>
+          <a:bodyPr/>
+          <a:lstStyle/>
+          <a:p>
+            <a:endParaRPr kumimoji="1" lang="ja-JP" altLang="en-US"/>
+          </a:p>
+        </p:txBody>
+      </p:sp>
+    </p:spTree>
+    <p:extLst>
+      <p:ext uri="{BB962C8B-B14F-4D97-AF65-F5344CB8AC3E}">
+        <p14:creationId xmlns:p14="http://schemas.microsoft.com/office/powerpoint/2010/main" xmlns="" val="2951407745"/>
+      </p:ext>
+    </p:extLst>
   </p:cSld>
   <p:clrMapOvr>
     <a:masterClrMapping/>
@@ -16299,6 +18396,566 @@
       </p:par>
     </p:tnLst>
   </p:timing>
+</p:sld>
+</file>
+
+<file path=ppt/slides/slide60.xml><?xml version="1.0" encoding="utf-8"?>
+<p:sld xmlns:a="http://schemas.openxmlformats.org/drawingml/2006/main" xmlns:r="http://schemas.openxmlformats.org/officeDocument/2006/relationships" xmlns:p="http://schemas.openxmlformats.org/presentationml/2006/main">
+  <p:cSld>
+    <p:spTree>
+      <p:nvGrpSpPr>
+        <p:cNvPr id="1" name=""/>
+        <p:cNvGrpSpPr/>
+        <p:nvPr/>
+      </p:nvGrpSpPr>
+      <p:grpSpPr>
+        <a:xfrm>
+          <a:off x="0" y="0"/>
+          <a:ext cx="0" cy="0"/>
+          <a:chOff x="0" y="0"/>
+          <a:chExt cx="0" cy="0"/>
+        </a:xfrm>
+      </p:grpSpPr>
+      <p:sp>
+        <p:nvSpPr>
+          <p:cNvPr id="2" name="タイトル 1"/>
+          <p:cNvSpPr>
+            <a:spLocks noGrp="1"/>
+          </p:cNvSpPr>
+          <p:nvPr>
+            <p:ph type="title"/>
+          </p:nvPr>
+        </p:nvSpPr>
+        <p:spPr/>
+        <p:txBody>
+          <a:bodyPr/>
+          <a:lstStyle/>
+          <a:p>
+            <a:r>
+              <a:rPr kumimoji="1" lang="en-US" altLang="ja-JP" dirty="0" smtClean="0"/>
+              <a:t>Templates</a:t>
+            </a:r>
+            <a:endParaRPr kumimoji="1" lang="ja-JP" altLang="en-US" dirty="0"/>
+          </a:p>
+        </p:txBody>
+      </p:sp>
+      <p:sp>
+        <p:nvSpPr>
+          <p:cNvPr id="5" name="正方形/長方形 4"/>
+          <p:cNvSpPr/>
+          <p:nvPr/>
+        </p:nvSpPr>
+        <p:spPr>
+          <a:xfrm>
+            <a:off x="323528" y="1412776"/>
+            <a:ext cx="4032448" cy="1728192"/>
+          </a:xfrm>
+          <a:prstGeom prst="rect">
+            <a:avLst/>
+          </a:prstGeom>
+          <a:solidFill>
+            <a:schemeClr val="accent5">
+              <a:lumMod val="20000"/>
+              <a:lumOff val="80000"/>
+            </a:schemeClr>
+          </a:solidFill>
+        </p:spPr>
+        <p:style>
+          <a:lnRef idx="1">
+            <a:schemeClr val="accent1"/>
+          </a:lnRef>
+          <a:fillRef idx="3">
+            <a:schemeClr val="accent1"/>
+          </a:fillRef>
+          <a:effectRef idx="2">
+            <a:schemeClr val="accent1"/>
+          </a:effectRef>
+          <a:fontRef idx="minor">
+            <a:schemeClr val="lt1"/>
+          </a:fontRef>
+        </p:style>
+        <p:txBody>
+          <a:bodyPr rtlCol="0" anchor="ctr"/>
+          <a:lstStyle/>
+          <a:p>
+            <a:pPr algn="ctr"/>
+            <a:endParaRPr kumimoji="1" lang="ja-JP" altLang="en-US"/>
+          </a:p>
+        </p:txBody>
+      </p:sp>
+      <p:sp>
+        <p:nvSpPr>
+          <p:cNvPr id="4" name="テキスト ボックス 3"/>
+          <p:cNvSpPr txBox="1"/>
+          <p:nvPr/>
+        </p:nvSpPr>
+        <p:spPr>
+          <a:xfrm>
+            <a:off x="323528" y="1412776"/>
+            <a:ext cx="1951225" cy="707886"/>
+          </a:xfrm>
+          <a:prstGeom prst="rect">
+            <a:avLst/>
+          </a:prstGeom>
+        </p:spPr>
+        <p:style>
+          <a:lnRef idx="1">
+            <a:schemeClr val="accent1"/>
+          </a:lnRef>
+          <a:fillRef idx="3">
+            <a:schemeClr val="accent1"/>
+          </a:fillRef>
+          <a:effectRef idx="2">
+            <a:schemeClr val="accent1"/>
+          </a:effectRef>
+          <a:fontRef idx="minor">
+            <a:schemeClr val="lt1"/>
+          </a:fontRef>
+        </p:style>
+        <p:txBody>
+          <a:bodyPr wrap="none" rtlCol="0">
+            <a:spAutoFit/>
+          </a:bodyPr>
+          <a:lstStyle/>
+          <a:p>
+            <a:r>
+              <a:rPr kumimoji="1" lang="en-US" altLang="ja-JP" sz="4000" dirty="0" smtClean="0"/>
+              <a:t>Problem</a:t>
+            </a:r>
+            <a:endParaRPr kumimoji="1" lang="ja-JP" altLang="en-US" sz="4000" dirty="0"/>
+          </a:p>
+        </p:txBody>
+      </p:sp>
+      <p:sp>
+        <p:nvSpPr>
+          <p:cNvPr id="6" name="正方形/長方形 5"/>
+          <p:cNvSpPr/>
+          <p:nvPr/>
+        </p:nvSpPr>
+        <p:spPr>
+          <a:xfrm>
+            <a:off x="4644008" y="1412776"/>
+            <a:ext cx="4032448" cy="1728192"/>
+          </a:xfrm>
+          <a:prstGeom prst="rect">
+            <a:avLst/>
+          </a:prstGeom>
+          <a:solidFill>
+            <a:schemeClr val="accent3">
+              <a:lumMod val="20000"/>
+              <a:lumOff val="80000"/>
+            </a:schemeClr>
+          </a:solidFill>
+        </p:spPr>
+        <p:style>
+          <a:lnRef idx="1">
+            <a:schemeClr val="accent1"/>
+          </a:lnRef>
+          <a:fillRef idx="3">
+            <a:schemeClr val="accent1"/>
+          </a:fillRef>
+          <a:effectRef idx="2">
+            <a:schemeClr val="accent1"/>
+          </a:effectRef>
+          <a:fontRef idx="minor">
+            <a:schemeClr val="lt1"/>
+          </a:fontRef>
+        </p:style>
+        <p:txBody>
+          <a:bodyPr rtlCol="0" anchor="ctr"/>
+          <a:lstStyle/>
+          <a:p>
+            <a:pPr algn="ctr"/>
+            <a:endParaRPr kumimoji="1" lang="ja-JP" altLang="en-US"/>
+          </a:p>
+        </p:txBody>
+      </p:sp>
+      <p:sp>
+        <p:nvSpPr>
+          <p:cNvPr id="7" name="テキスト ボックス 6"/>
+          <p:cNvSpPr txBox="1"/>
+          <p:nvPr/>
+        </p:nvSpPr>
+        <p:spPr>
+          <a:xfrm>
+            <a:off x="4644008" y="1412776"/>
+            <a:ext cx="1951225" cy="707886"/>
+          </a:xfrm>
+          <a:prstGeom prst="rect">
+            <a:avLst/>
+          </a:prstGeom>
+        </p:spPr>
+        <p:style>
+          <a:lnRef idx="1">
+            <a:schemeClr val="accent3"/>
+          </a:lnRef>
+          <a:fillRef idx="3">
+            <a:schemeClr val="accent3"/>
+          </a:fillRef>
+          <a:effectRef idx="2">
+            <a:schemeClr val="accent3"/>
+          </a:effectRef>
+          <a:fontRef idx="minor">
+            <a:schemeClr val="lt1"/>
+          </a:fontRef>
+        </p:style>
+        <p:txBody>
+          <a:bodyPr wrap="none" rtlCol="0">
+            <a:spAutoFit/>
+          </a:bodyPr>
+          <a:lstStyle/>
+          <a:p>
+            <a:r>
+              <a:rPr kumimoji="1" lang="en-US" altLang="ja-JP" sz="4000" dirty="0" smtClean="0"/>
+              <a:t>Problem</a:t>
+            </a:r>
+            <a:endParaRPr kumimoji="1" lang="ja-JP" altLang="en-US" sz="4000" dirty="0"/>
+          </a:p>
+        </p:txBody>
+      </p:sp>
+      <p:sp>
+        <p:nvSpPr>
+          <p:cNvPr id="8" name="下矢印 7"/>
+          <p:cNvSpPr/>
+          <p:nvPr/>
+        </p:nvSpPr>
+        <p:spPr>
+          <a:xfrm>
+            <a:off x="251520" y="3717032"/>
+            <a:ext cx="4536504" cy="504056"/>
+          </a:xfrm>
+          <a:prstGeom prst="downArrow">
+            <a:avLst/>
+          </a:prstGeom>
+        </p:spPr>
+        <p:style>
+          <a:lnRef idx="1">
+            <a:schemeClr val="dk1"/>
+          </a:lnRef>
+          <a:fillRef idx="3">
+            <a:schemeClr val="dk1"/>
+          </a:fillRef>
+          <a:effectRef idx="2">
+            <a:schemeClr val="dk1"/>
+          </a:effectRef>
+          <a:fontRef idx="minor">
+            <a:schemeClr val="lt1"/>
+          </a:fontRef>
+        </p:style>
+        <p:txBody>
+          <a:bodyPr rtlCol="0" anchor="ctr"/>
+          <a:lstStyle/>
+          <a:p>
+            <a:pPr algn="ctr"/>
+            <a:endParaRPr kumimoji="1" lang="ja-JP" altLang="en-US"/>
+          </a:p>
+        </p:txBody>
+      </p:sp>
+      <p:sp>
+        <p:nvSpPr>
+          <p:cNvPr id="9" name="直角三角形 8"/>
+          <p:cNvSpPr/>
+          <p:nvPr/>
+        </p:nvSpPr>
+        <p:spPr>
+          <a:xfrm rot="13500000">
+            <a:off x="133031" y="4717780"/>
+            <a:ext cx="654689" cy="647451"/>
+          </a:xfrm>
+          <a:prstGeom prst="rtTriangle">
+            <a:avLst/>
+          </a:prstGeom>
+        </p:spPr>
+        <p:style>
+          <a:lnRef idx="1">
+            <a:schemeClr val="accent1"/>
+          </a:lnRef>
+          <a:fillRef idx="3">
+            <a:schemeClr val="accent1"/>
+          </a:fillRef>
+          <a:effectRef idx="2">
+            <a:schemeClr val="accent1"/>
+          </a:effectRef>
+          <a:fontRef idx="minor">
+            <a:schemeClr val="lt1"/>
+          </a:fontRef>
+        </p:style>
+        <p:txBody>
+          <a:bodyPr rtlCol="0" anchor="ctr"/>
+          <a:lstStyle/>
+          <a:p>
+            <a:pPr algn="ctr"/>
+            <a:endParaRPr kumimoji="1" lang="ja-JP" altLang="en-US"/>
+          </a:p>
+        </p:txBody>
+      </p:sp>
+      <p:sp>
+        <p:nvSpPr>
+          <p:cNvPr id="10" name="直角三角形 9"/>
+          <p:cNvSpPr/>
+          <p:nvPr/>
+        </p:nvSpPr>
+        <p:spPr>
+          <a:xfrm rot="13500000">
+            <a:off x="744591" y="4717779"/>
+            <a:ext cx="654689" cy="647451"/>
+          </a:xfrm>
+          <a:prstGeom prst="rtTriangle">
+            <a:avLst/>
+          </a:prstGeom>
+        </p:spPr>
+        <p:style>
+          <a:lnRef idx="1">
+            <a:schemeClr val="accent2"/>
+          </a:lnRef>
+          <a:fillRef idx="3">
+            <a:schemeClr val="accent2"/>
+          </a:fillRef>
+          <a:effectRef idx="2">
+            <a:schemeClr val="accent2"/>
+          </a:effectRef>
+          <a:fontRef idx="minor">
+            <a:schemeClr val="lt1"/>
+          </a:fontRef>
+        </p:style>
+        <p:txBody>
+          <a:bodyPr rtlCol="0" anchor="ctr"/>
+          <a:lstStyle/>
+          <a:p>
+            <a:pPr algn="ctr"/>
+            <a:endParaRPr kumimoji="1" lang="ja-JP" altLang="en-US"/>
+          </a:p>
+        </p:txBody>
+      </p:sp>
+      <p:sp>
+        <p:nvSpPr>
+          <p:cNvPr id="11" name="直角三角形 10"/>
+          <p:cNvSpPr/>
+          <p:nvPr/>
+        </p:nvSpPr>
+        <p:spPr>
+          <a:xfrm rot="13500000">
+            <a:off x="1392665" y="4717779"/>
+            <a:ext cx="654689" cy="647451"/>
+          </a:xfrm>
+          <a:prstGeom prst="rtTriangle">
+            <a:avLst/>
+          </a:prstGeom>
+        </p:spPr>
+        <p:style>
+          <a:lnRef idx="1">
+            <a:schemeClr val="accent3"/>
+          </a:lnRef>
+          <a:fillRef idx="3">
+            <a:schemeClr val="accent3"/>
+          </a:fillRef>
+          <a:effectRef idx="2">
+            <a:schemeClr val="accent3"/>
+          </a:effectRef>
+          <a:fontRef idx="minor">
+            <a:schemeClr val="lt1"/>
+          </a:fontRef>
+        </p:style>
+        <p:txBody>
+          <a:bodyPr rtlCol="0" anchor="ctr"/>
+          <a:lstStyle/>
+          <a:p>
+            <a:pPr algn="ctr"/>
+            <a:endParaRPr kumimoji="1" lang="ja-JP" altLang="en-US"/>
+          </a:p>
+        </p:txBody>
+      </p:sp>
+      <p:sp>
+        <p:nvSpPr>
+          <p:cNvPr id="3" name="下矢印 2"/>
+          <p:cNvSpPr/>
+          <p:nvPr/>
+        </p:nvSpPr>
+        <p:spPr>
+          <a:xfrm>
+            <a:off x="3275856" y="3861048"/>
+            <a:ext cx="484632" cy="978408"/>
+          </a:xfrm>
+          <a:prstGeom prst="downArrow">
+            <a:avLst/>
+          </a:prstGeom>
+        </p:spPr>
+        <p:style>
+          <a:lnRef idx="1">
+            <a:schemeClr val="accent1"/>
+          </a:lnRef>
+          <a:fillRef idx="3">
+            <a:schemeClr val="accent1"/>
+          </a:fillRef>
+          <a:effectRef idx="2">
+            <a:schemeClr val="accent1"/>
+          </a:effectRef>
+          <a:fontRef idx="minor">
+            <a:schemeClr val="lt1"/>
+          </a:fontRef>
+        </p:style>
+        <p:txBody>
+          <a:bodyPr rtlCol="0" anchor="ctr"/>
+          <a:lstStyle/>
+          <a:p>
+            <a:pPr algn="ctr"/>
+            <a:endParaRPr kumimoji="1" lang="ja-JP" altLang="en-US"/>
+          </a:p>
+        </p:txBody>
+      </p:sp>
+    </p:spTree>
+    <p:extLst>
+      <p:ext uri="{BB962C8B-B14F-4D97-AF65-F5344CB8AC3E}">
+        <p14:creationId xmlns:p14="http://schemas.microsoft.com/office/powerpoint/2010/main" xmlns="" val="1477573084"/>
+      </p:ext>
+    </p:extLst>
+  </p:cSld>
+  <p:clrMapOvr>
+    <a:masterClrMapping/>
+  </p:clrMapOvr>
+  <p:timing>
+    <p:tnLst>
+      <p:par>
+        <p:cTn id="1" dur="indefinite" restart="never" nodeType="tmRoot"/>
+      </p:par>
+    </p:tnLst>
+  </p:timing>
+</p:sld>
+</file>
+
+<file path=ppt/slides/slide61.xml><?xml version="1.0" encoding="utf-8"?>
+<p:sld xmlns:a="http://schemas.openxmlformats.org/drawingml/2006/main" xmlns:r="http://schemas.openxmlformats.org/officeDocument/2006/relationships" xmlns:p="http://schemas.openxmlformats.org/presentationml/2006/main">
+  <p:cSld>
+    <p:spTree>
+      <p:nvGrpSpPr>
+        <p:cNvPr id="1" name=""/>
+        <p:cNvGrpSpPr/>
+        <p:nvPr/>
+      </p:nvGrpSpPr>
+      <p:grpSpPr>
+        <a:xfrm>
+          <a:off x="0" y="0"/>
+          <a:ext cx="0" cy="0"/>
+          <a:chOff x="0" y="0"/>
+          <a:chExt cx="0" cy="0"/>
+        </a:xfrm>
+      </p:grpSpPr>
+      <p:sp>
+        <p:nvSpPr>
+          <p:cNvPr id="2" name="タイトル 1"/>
+          <p:cNvSpPr>
+            <a:spLocks noGrp="1"/>
+          </p:cNvSpPr>
+          <p:nvPr>
+            <p:ph type="title"/>
+          </p:nvPr>
+        </p:nvSpPr>
+        <p:spPr/>
+        <p:txBody>
+          <a:bodyPr/>
+          <a:lstStyle/>
+          <a:p>
+            <a:endParaRPr kumimoji="1" lang="ja-JP" altLang="en-US"/>
+          </a:p>
+        </p:txBody>
+      </p:sp>
+      <p:sp>
+        <p:nvSpPr>
+          <p:cNvPr id="3" name="コンテンツ プレースホルダー 2"/>
+          <p:cNvSpPr>
+            <a:spLocks noGrp="1"/>
+          </p:cNvSpPr>
+          <p:nvPr>
+            <p:ph idx="1"/>
+          </p:nvPr>
+        </p:nvSpPr>
+        <p:spPr/>
+        <p:txBody>
+          <a:bodyPr/>
+          <a:lstStyle/>
+          <a:p>
+            <a:endParaRPr kumimoji="1" lang="ja-JP" altLang="en-US"/>
+          </a:p>
+        </p:txBody>
+      </p:sp>
+    </p:spTree>
+    <p:extLst>
+      <p:ext uri="{BB962C8B-B14F-4D97-AF65-F5344CB8AC3E}">
+        <p14:creationId xmlns:p14="http://schemas.microsoft.com/office/powerpoint/2010/main" xmlns="" val="2094830404"/>
+      </p:ext>
+    </p:extLst>
+  </p:cSld>
+  <p:clrMapOvr>
+    <a:masterClrMapping/>
+  </p:clrMapOvr>
+</p:sld>
+</file>
+
+<file path=ppt/slides/slide62.xml><?xml version="1.0" encoding="utf-8"?>
+<p:sld xmlns:a="http://schemas.openxmlformats.org/drawingml/2006/main" xmlns:r="http://schemas.openxmlformats.org/officeDocument/2006/relationships" xmlns:p="http://schemas.openxmlformats.org/presentationml/2006/main">
+  <p:cSld>
+    <p:spTree>
+      <p:nvGrpSpPr>
+        <p:cNvPr id="1" name=""/>
+        <p:cNvGrpSpPr/>
+        <p:nvPr/>
+      </p:nvGrpSpPr>
+      <p:grpSpPr>
+        <a:xfrm>
+          <a:off x="0" y="0"/>
+          <a:ext cx="0" cy="0"/>
+          <a:chOff x="0" y="0"/>
+          <a:chExt cx="0" cy="0"/>
+        </a:xfrm>
+      </p:grpSpPr>
+      <p:sp>
+        <p:nvSpPr>
+          <p:cNvPr id="2" name="タイトル 1"/>
+          <p:cNvSpPr>
+            <a:spLocks noGrp="1"/>
+          </p:cNvSpPr>
+          <p:nvPr>
+            <p:ph type="title"/>
+          </p:nvPr>
+        </p:nvSpPr>
+        <p:spPr/>
+        <p:txBody>
+          <a:bodyPr/>
+          <a:lstStyle/>
+          <a:p>
+            <a:endParaRPr kumimoji="1" lang="ja-JP" altLang="en-US" dirty="0"/>
+          </a:p>
+        </p:txBody>
+      </p:sp>
+      <p:sp>
+        <p:nvSpPr>
+          <p:cNvPr id="3" name="コンテンツ プレースホルダー 2"/>
+          <p:cNvSpPr>
+            <a:spLocks noGrp="1"/>
+          </p:cNvSpPr>
+          <p:nvPr>
+            <p:ph idx="1"/>
+          </p:nvPr>
+        </p:nvSpPr>
+        <p:spPr/>
+        <p:txBody>
+          <a:bodyPr/>
+          <a:lstStyle/>
+          <a:p>
+            <a:endParaRPr kumimoji="1" lang="ja-JP" altLang="en-US" dirty="0"/>
+          </a:p>
+        </p:txBody>
+      </p:sp>
+    </p:spTree>
+    <p:extLst>
+      <p:ext uri="{BB962C8B-B14F-4D97-AF65-F5344CB8AC3E}">
+        <p14:creationId xmlns:p14="http://schemas.microsoft.com/office/powerpoint/2010/main" xmlns="" val="519101280"/>
+      </p:ext>
+    </p:extLst>
+  </p:cSld>
+  <p:clrMapOvr>
+    <a:masterClrMapping/>
+  </p:clrMapOvr>
 </p:sld>
 </file>
 

</xml_diff>